<commit_message>
added some stuff to ppt
</commit_message>
<xml_diff>
--- a/induktiv_sensoren.pptx
+++ b/induktiv_sensoren.pptx
@@ -7,10 +7,13 @@
   <p:sldIdLst>
     <p:sldId id="256" r:id="rId2"/>
     <p:sldId id="257" r:id="rId3"/>
-    <p:sldId id="258" r:id="rId4"/>
-    <p:sldId id="259" r:id="rId5"/>
-    <p:sldId id="260" r:id="rId6"/>
-    <p:sldId id="261" r:id="rId7"/>
+    <p:sldId id="259" r:id="rId4"/>
+    <p:sldId id="262" r:id="rId5"/>
+    <p:sldId id="258" r:id="rId6"/>
+    <p:sldId id="260" r:id="rId7"/>
+    <p:sldId id="263" r:id="rId8"/>
+    <p:sldId id="264" r:id="rId9"/>
+    <p:sldId id="261" r:id="rId10"/>
   </p:sldIdLst>
   <p:sldSz cx="9144000" cy="6858000" type="screen4x3"/>
   <p:notesSz cx="6858000" cy="9144000"/>
@@ -3495,6 +3498,13 @@
   <p:clrMapOvr>
     <a:masterClrMapping/>
   </p:clrMapOvr>
+  <p:timing>
+    <p:tnLst>
+      <p:par>
+        <p:cTn xmlns:p14="http://schemas.microsoft.com/office/powerpoint/2010/main" id="1" dur="indefinite" restart="never" nodeType="tmRoot"/>
+      </p:par>
+    </p:tnLst>
+  </p:timing>
 </p:sld>
 </file>
 
@@ -3653,12 +3663,8 @@
           <a:lstStyle/>
           <a:p>
             <a:r>
-              <a:rPr lang="de-DE" dirty="0" err="1" smtClean="0"/>
-              <a:t>Funktions</a:t>
-            </a:r>
-            <a:r>
-              <a:rPr lang="de-DE" dirty="0" smtClean="0"/>
-              <a:t> Prinzip</a:t>
+              <a:rPr lang="de-DE" dirty="0" smtClean="0"/>
+              <a:t>Aufbau</a:t>
             </a:r>
             <a:endParaRPr lang="de-DE" dirty="0"/>
           </a:p>
@@ -3674,25 +3680,15 @@
             <p:ph idx="1"/>
           </p:nvPr>
         </p:nvSpPr>
-        <p:spPr/>
-        <p:txBody>
-          <a:bodyPr/>
-          <a:lstStyle/>
-          <a:p>
-            <a:endParaRPr lang="de-DE" dirty="0" smtClean="0"/>
-          </a:p>
-          <a:p>
-            <a:endParaRPr lang="de-DE" dirty="0"/>
-          </a:p>
-          <a:p>
-            <a:endParaRPr lang="de-DE" dirty="0" smtClean="0"/>
-          </a:p>
-          <a:p>
-            <a:endParaRPr lang="de-DE" dirty="0"/>
-          </a:p>
-          <a:p>
-            <a:endParaRPr lang="de-DE" dirty="0" smtClean="0"/>
-          </a:p>
+        <p:spPr>
+          <a:xfrm>
+            <a:off x="457200" y="1752600"/>
+            <a:ext cx="4114800" cy="4373563"/>
+          </a:xfrm>
+        </p:spPr>
+        <p:txBody>
+          <a:bodyPr/>
+          <a:lstStyle/>
           <a:p>
             <a:pPr marL="342900" indent="-342900">
               <a:buFontTx/>
@@ -3700,11 +3696,7 @@
             </a:pPr>
             <a:r>
               <a:rPr lang="de-DE" dirty="0" smtClean="0"/>
-              <a:t>LC-</a:t>
-            </a:r>
-            <a:r>
-              <a:rPr lang="de-DE" dirty="0" smtClean="0"/>
-              <a:t>Schwingkreis</a:t>
+              <a:t>Durch Spule erzeugtes Wechselfeld</a:t>
             </a:r>
             <a:endParaRPr lang="de-DE" dirty="0" smtClean="0"/>
           </a:p>
@@ -3715,9 +3707,19 @@
             </a:pPr>
             <a:r>
               <a:rPr lang="de-DE" dirty="0" smtClean="0"/>
-              <a:t>Schmitt-Trigger</a:t>
-            </a:r>
-            <a:endParaRPr lang="de-DE" dirty="0" smtClean="0"/>
+              <a:t>Richten des Magnetfelds </a:t>
+            </a:r>
+          </a:p>
+          <a:p>
+            <a:r>
+              <a:rPr lang="de-DE" dirty="0"/>
+              <a:t> </a:t>
+            </a:r>
+            <a:r>
+              <a:rPr lang="de-DE" dirty="0" smtClean="0"/>
+              <a:t>    Durch Ferrit Kern</a:t>
+            </a:r>
+            <a:endParaRPr lang="de-DE" dirty="0"/>
           </a:p>
           <a:p>
             <a:pPr marL="342900" indent="-342900">
@@ -3726,7 +3728,302 @@
             </a:pPr>
             <a:r>
               <a:rPr lang="de-DE" dirty="0" smtClean="0"/>
+              <a:t>Gehäuse zum </a:t>
+            </a:r>
+            <a:r>
+              <a:rPr lang="de-DE" dirty="0" smtClean="0"/>
+              <a:t>Schutz </a:t>
+            </a:r>
+            <a:r>
+              <a:rPr lang="de-DE" dirty="0" smtClean="0"/>
+              <a:t>gegen </a:t>
+            </a:r>
+            <a:endParaRPr lang="de-DE" dirty="0" smtClean="0"/>
+          </a:p>
+          <a:p>
+            <a:r>
+              <a:rPr lang="de-DE" dirty="0"/>
+              <a:t> </a:t>
+            </a:r>
+            <a:r>
+              <a:rPr lang="de-DE" dirty="0" smtClean="0"/>
+              <a:t>     </a:t>
+            </a:r>
+            <a:r>
+              <a:rPr lang="de-DE" dirty="0" smtClean="0"/>
+              <a:t>mechanische Einflüsse</a:t>
+            </a:r>
+            <a:endParaRPr lang="de-DE" dirty="0" smtClean="0"/>
+          </a:p>
+          <a:p>
+            <a:pPr marL="342900" indent="-342900">
+              <a:buFontTx/>
+              <a:buChar char="-"/>
+            </a:pPr>
+            <a:endParaRPr lang="de-DE" dirty="0" smtClean="0"/>
+          </a:p>
+        </p:txBody>
+      </p:sp>
+      <p:pic>
+        <p:nvPicPr>
+          <p:cNvPr id="4" name="Bild 3" descr="magnetfeld_sensor.PNG"/>
+          <p:cNvPicPr>
+            <a:picLocks noChangeAspect="1"/>
+          </p:cNvPicPr>
+          <p:nvPr/>
+        </p:nvPicPr>
+        <p:blipFill rotWithShape="1">
+          <a:blip r:embed="rId2">
+            <a:extLst>
+              <a:ext uri="{28A0092B-C50C-407E-A947-70E740481C1C}">
+                <a14:useLocalDpi xmlns:a14="http://schemas.microsoft.com/office/drawing/2010/main" val="0"/>
+              </a:ext>
+            </a:extLst>
+          </a:blip>
+          <a:srcRect l="11023" r="8386"/>
+          <a:stretch/>
+        </p:blipFill>
+        <p:spPr>
+          <a:xfrm>
+            <a:off x="4572000" y="1752600"/>
+            <a:ext cx="4102100" cy="4499394"/>
+          </a:xfrm>
+          <a:prstGeom prst="rect">
+            <a:avLst/>
+          </a:prstGeom>
+        </p:spPr>
+      </p:pic>
+    </p:spTree>
+    <p:extLst>
+      <p:ext uri="{BB962C8B-B14F-4D97-AF65-F5344CB8AC3E}">
+        <p14:creationId xmlns:p14="http://schemas.microsoft.com/office/powerpoint/2010/main" val="420837564"/>
+      </p:ext>
+    </p:extLst>
+  </p:cSld>
+  <p:clrMapOvr>
+    <a:masterClrMapping/>
+  </p:clrMapOvr>
+</p:sld>
+</file>
+
+<file path=ppt/slides/slide4.xml><?xml version="1.0" encoding="utf-8"?>
+<p:sld xmlns:a="http://schemas.openxmlformats.org/drawingml/2006/main" xmlns:r="http://schemas.openxmlformats.org/officeDocument/2006/relationships" xmlns:p="http://schemas.openxmlformats.org/presentationml/2006/main">
+  <p:cSld>
+    <p:spTree>
+      <p:nvGrpSpPr>
+        <p:cNvPr id="1" name=""/>
+        <p:cNvGrpSpPr/>
+        <p:nvPr/>
+      </p:nvGrpSpPr>
+      <p:grpSpPr>
+        <a:xfrm>
+          <a:off x="0" y="0"/>
+          <a:ext cx="0" cy="0"/>
+          <a:chOff x="0" y="0"/>
+          <a:chExt cx="0" cy="0"/>
+        </a:xfrm>
+      </p:grpSpPr>
+      <p:sp>
+        <p:nvSpPr>
+          <p:cNvPr id="2" name="Titel 1"/>
+          <p:cNvSpPr>
+            <a:spLocks noGrp="1"/>
+          </p:cNvSpPr>
+          <p:nvPr>
+            <p:ph type="title"/>
+          </p:nvPr>
+        </p:nvSpPr>
+        <p:spPr/>
+        <p:txBody>
+          <a:bodyPr/>
+          <a:lstStyle/>
+          <a:p>
+            <a:r>
+              <a:rPr lang="de-DE" dirty="0" smtClean="0"/>
+              <a:t>Luftspule mit FERRITKERN</a:t>
+            </a:r>
+            <a:endParaRPr lang="de-DE" dirty="0"/>
+          </a:p>
+        </p:txBody>
+      </p:sp>
+      <p:pic>
+        <p:nvPicPr>
+          <p:cNvPr id="5" name="Bild 4"/>
+          <p:cNvPicPr>
+            <a:picLocks noChangeAspect="1"/>
+          </p:cNvPicPr>
+          <p:nvPr/>
+        </p:nvPicPr>
+        <p:blipFill>
+          <a:blip r:embed="rId2"/>
+          <a:stretch>
+            <a:fillRect/>
+          </a:stretch>
+        </p:blipFill>
+        <p:spPr>
+          <a:xfrm>
+            <a:off x="1339163" y="2114550"/>
+            <a:ext cx="6465673" cy="2628900"/>
+          </a:xfrm>
+          <a:prstGeom prst="rect">
+            <a:avLst/>
+          </a:prstGeom>
+        </p:spPr>
+      </p:pic>
+      <p:pic>
+        <p:nvPicPr>
+          <p:cNvPr id="6" name="Bild 5"/>
+          <p:cNvPicPr>
+            <a:picLocks noChangeAspect="1"/>
+          </p:cNvPicPr>
+          <p:nvPr/>
+        </p:nvPicPr>
+        <p:blipFill>
+          <a:blip r:embed="rId3"/>
+          <a:stretch>
+            <a:fillRect/>
+          </a:stretch>
+        </p:blipFill>
+        <p:spPr>
+          <a:xfrm>
+            <a:off x="1016000" y="4345844"/>
+            <a:ext cx="3454400" cy="2321656"/>
+          </a:xfrm>
+          <a:prstGeom prst="rect">
+            <a:avLst/>
+          </a:prstGeom>
+        </p:spPr>
+      </p:pic>
+    </p:spTree>
+    <p:extLst>
+      <p:ext uri="{BB962C8B-B14F-4D97-AF65-F5344CB8AC3E}">
+        <p14:creationId xmlns:p14="http://schemas.microsoft.com/office/powerpoint/2010/main" val="4065280768"/>
+      </p:ext>
+    </p:extLst>
+  </p:cSld>
+  <p:clrMapOvr>
+    <a:masterClrMapping/>
+  </p:clrMapOvr>
+</p:sld>
+</file>
+
+<file path=ppt/slides/slide5.xml><?xml version="1.0" encoding="utf-8"?>
+<p:sld xmlns:a="http://schemas.openxmlformats.org/drawingml/2006/main" xmlns:r="http://schemas.openxmlformats.org/officeDocument/2006/relationships" xmlns:p="http://schemas.openxmlformats.org/presentationml/2006/main">
+  <p:cSld>
+    <p:spTree>
+      <p:nvGrpSpPr>
+        <p:cNvPr id="1" name=""/>
+        <p:cNvGrpSpPr/>
+        <p:nvPr/>
+      </p:nvGrpSpPr>
+      <p:grpSpPr>
+        <a:xfrm>
+          <a:off x="0" y="0"/>
+          <a:ext cx="0" cy="0"/>
+          <a:chOff x="0" y="0"/>
+          <a:chExt cx="0" cy="0"/>
+        </a:xfrm>
+      </p:grpSpPr>
+      <p:sp>
+        <p:nvSpPr>
+          <p:cNvPr id="2" name="Titel 1"/>
+          <p:cNvSpPr>
+            <a:spLocks noGrp="1"/>
+          </p:cNvSpPr>
+          <p:nvPr>
+            <p:ph type="title"/>
+          </p:nvPr>
+        </p:nvSpPr>
+        <p:spPr/>
+        <p:txBody>
+          <a:bodyPr/>
+          <a:lstStyle/>
+          <a:p>
+            <a:r>
+              <a:rPr lang="de-DE" dirty="0" err="1" smtClean="0"/>
+              <a:t>FunktionsPrinzip</a:t>
+            </a:r>
+            <a:endParaRPr lang="de-DE" dirty="0"/>
+          </a:p>
+        </p:txBody>
+      </p:sp>
+      <p:sp>
+        <p:nvSpPr>
+          <p:cNvPr id="3" name="Inhaltsplatzhalter 2"/>
+          <p:cNvSpPr>
+            <a:spLocks noGrp="1"/>
+          </p:cNvSpPr>
+          <p:nvPr>
+            <p:ph idx="1"/>
+          </p:nvPr>
+        </p:nvSpPr>
+        <p:spPr/>
+        <p:txBody>
+          <a:bodyPr/>
+          <a:lstStyle/>
+          <a:p>
+            <a:endParaRPr lang="de-DE" dirty="0" smtClean="0"/>
+          </a:p>
+          <a:p>
+            <a:endParaRPr lang="de-DE" dirty="0"/>
+          </a:p>
+          <a:p>
+            <a:endParaRPr lang="de-DE" dirty="0" smtClean="0"/>
+          </a:p>
+          <a:p>
+            <a:endParaRPr lang="de-DE" dirty="0"/>
+          </a:p>
+          <a:p>
+            <a:endParaRPr lang="de-DE" dirty="0" smtClean="0"/>
+          </a:p>
+          <a:p>
+            <a:pPr marL="342900" indent="-342900">
+              <a:buFontTx/>
+              <a:buChar char="-"/>
+            </a:pPr>
+            <a:r>
+              <a:rPr lang="de-DE" dirty="0" smtClean="0"/>
+              <a:t>LC-</a:t>
+            </a:r>
+            <a:r>
+              <a:rPr lang="de-DE" dirty="0" smtClean="0"/>
+              <a:t>Schwingkreis</a:t>
+            </a:r>
+            <a:endParaRPr lang="de-DE" dirty="0" smtClean="0"/>
+          </a:p>
+          <a:p>
+            <a:pPr marL="342900" indent="-342900">
+              <a:buFontTx/>
+              <a:buChar char="-"/>
+            </a:pPr>
+            <a:r>
+              <a:rPr lang="de-DE" dirty="0" smtClean="0"/>
+              <a:t>Schmitt-Trigger</a:t>
+            </a:r>
+            <a:endParaRPr lang="de-DE" dirty="0" smtClean="0"/>
+          </a:p>
+          <a:p>
+            <a:pPr marL="342900" indent="-342900">
+              <a:buFontTx/>
+              <a:buChar char="-"/>
+            </a:pPr>
+            <a:r>
+              <a:rPr lang="de-DE" dirty="0" smtClean="0"/>
               <a:t>Ausgangstreiber</a:t>
+            </a:r>
+          </a:p>
+          <a:p>
+            <a:pPr marL="342900" indent="-342900">
+              <a:buFontTx/>
+              <a:buChar char="-"/>
+            </a:pPr>
+            <a:r>
+              <a:rPr lang="de-DE" dirty="0" smtClean="0"/>
+              <a:t>Z.B. </a:t>
+            </a:r>
+            <a:r>
+              <a:rPr lang="de-DE" dirty="0" err="1" smtClean="0"/>
+              <a:t>Optokoppler</a:t>
             </a:r>
             <a:endParaRPr lang="de-DE" dirty="0"/>
           </a:p>
@@ -3775,182 +4072,7 @@
 </p:sld>
 </file>
 
-<file path=ppt/slides/slide4.xml><?xml version="1.0" encoding="utf-8"?>
-<p:sld xmlns:a="http://schemas.openxmlformats.org/drawingml/2006/main" xmlns:r="http://schemas.openxmlformats.org/officeDocument/2006/relationships" xmlns:p="http://schemas.openxmlformats.org/presentationml/2006/main">
-  <p:cSld>
-    <p:spTree>
-      <p:nvGrpSpPr>
-        <p:cNvPr id="1" name=""/>
-        <p:cNvGrpSpPr/>
-        <p:nvPr/>
-      </p:nvGrpSpPr>
-      <p:grpSpPr>
-        <a:xfrm>
-          <a:off x="0" y="0"/>
-          <a:ext cx="0" cy="0"/>
-          <a:chOff x="0" y="0"/>
-          <a:chExt cx="0" cy="0"/>
-        </a:xfrm>
-      </p:grpSpPr>
-      <p:sp>
-        <p:nvSpPr>
-          <p:cNvPr id="2" name="Titel 1"/>
-          <p:cNvSpPr>
-            <a:spLocks noGrp="1"/>
-          </p:cNvSpPr>
-          <p:nvPr>
-            <p:ph type="title"/>
-          </p:nvPr>
-        </p:nvSpPr>
-        <p:spPr/>
-        <p:txBody>
-          <a:bodyPr/>
-          <a:lstStyle/>
-          <a:p>
-            <a:r>
-              <a:rPr lang="de-DE" dirty="0" err="1" smtClean="0"/>
-              <a:t>FunktionsPrinzip</a:t>
-            </a:r>
-            <a:endParaRPr lang="de-DE" dirty="0"/>
-          </a:p>
-        </p:txBody>
-      </p:sp>
-      <p:sp>
-        <p:nvSpPr>
-          <p:cNvPr id="3" name="Inhaltsplatzhalter 2"/>
-          <p:cNvSpPr>
-            <a:spLocks noGrp="1"/>
-          </p:cNvSpPr>
-          <p:nvPr>
-            <p:ph idx="1"/>
-          </p:nvPr>
-        </p:nvSpPr>
-        <p:spPr>
-          <a:xfrm>
-            <a:off x="457200" y="1752600"/>
-            <a:ext cx="4114800" cy="4373563"/>
-          </a:xfrm>
-        </p:spPr>
-        <p:txBody>
-          <a:bodyPr/>
-          <a:lstStyle/>
-          <a:p>
-            <a:pPr marL="342900" indent="-342900">
-              <a:buFontTx/>
-              <a:buChar char="-"/>
-            </a:pPr>
-            <a:r>
-              <a:rPr lang="de-DE" dirty="0" smtClean="0"/>
-              <a:t>Anlegen eines Wechselfeld an eine Spule</a:t>
-            </a:r>
-          </a:p>
-          <a:p>
-            <a:pPr marL="342900" indent="-342900">
-              <a:buFontTx/>
-              <a:buChar char="-"/>
-            </a:pPr>
-            <a:r>
-              <a:rPr lang="de-DE" dirty="0" smtClean="0"/>
-              <a:t>Richten des Magnetfelds </a:t>
-            </a:r>
-          </a:p>
-          <a:p>
-            <a:r>
-              <a:rPr lang="de-DE" dirty="0"/>
-              <a:t> </a:t>
-            </a:r>
-            <a:r>
-              <a:rPr lang="de-DE" dirty="0" smtClean="0"/>
-              <a:t>    Durch Ferrit Kern</a:t>
-            </a:r>
-            <a:endParaRPr lang="de-DE" dirty="0"/>
-          </a:p>
-          <a:p>
-            <a:pPr marL="342900" indent="-342900">
-              <a:buFontTx/>
-              <a:buChar char="-"/>
-            </a:pPr>
-            <a:r>
-              <a:rPr lang="de-DE" dirty="0" smtClean="0"/>
-              <a:t>Gehäuse zum </a:t>
-            </a:r>
-            <a:r>
-              <a:rPr lang="de-DE" dirty="0" smtClean="0"/>
-              <a:t>Schutz </a:t>
-            </a:r>
-            <a:r>
-              <a:rPr lang="de-DE" dirty="0" smtClean="0"/>
-              <a:t>gegen </a:t>
-            </a:r>
-            <a:endParaRPr lang="de-DE" dirty="0" smtClean="0"/>
-          </a:p>
-          <a:p>
-            <a:r>
-              <a:rPr lang="de-DE" dirty="0"/>
-              <a:t> </a:t>
-            </a:r>
-            <a:r>
-              <a:rPr lang="de-DE" dirty="0" smtClean="0"/>
-              <a:t>     </a:t>
-            </a:r>
-            <a:r>
-              <a:rPr lang="de-DE" dirty="0" smtClean="0"/>
-              <a:t>mechanische Einflüsse</a:t>
-            </a:r>
-            <a:endParaRPr lang="de-DE" dirty="0" smtClean="0"/>
-          </a:p>
-          <a:p>
-            <a:pPr marL="342900" indent="-342900">
-              <a:buFontTx/>
-              <a:buChar char="-"/>
-            </a:pPr>
-            <a:endParaRPr lang="de-DE" dirty="0" smtClean="0"/>
-          </a:p>
-        </p:txBody>
-      </p:sp>
-      <p:pic>
-        <p:nvPicPr>
-          <p:cNvPr id="4" name="Bild 3" descr="magnetfeld_sensor.PNG"/>
-          <p:cNvPicPr>
-            <a:picLocks noChangeAspect="1"/>
-          </p:cNvPicPr>
-          <p:nvPr/>
-        </p:nvPicPr>
-        <p:blipFill rotWithShape="1">
-          <a:blip r:embed="rId2">
-            <a:extLst>
-              <a:ext uri="{28A0092B-C50C-407E-A947-70E740481C1C}">
-                <a14:useLocalDpi xmlns:a14="http://schemas.microsoft.com/office/drawing/2010/main" val="0"/>
-              </a:ext>
-            </a:extLst>
-          </a:blip>
-          <a:srcRect l="11023" r="8386"/>
-          <a:stretch/>
-        </p:blipFill>
-        <p:spPr>
-          <a:xfrm>
-            <a:off x="4572000" y="1752600"/>
-            <a:ext cx="4102100" cy="4499394"/>
-          </a:xfrm>
-          <a:prstGeom prst="rect">
-            <a:avLst/>
-          </a:prstGeom>
-        </p:spPr>
-      </p:pic>
-    </p:spTree>
-    <p:extLst>
-      <p:ext uri="{BB962C8B-B14F-4D97-AF65-F5344CB8AC3E}">
-        <p14:creationId xmlns:p14="http://schemas.microsoft.com/office/powerpoint/2010/main" val="420837564"/>
-      </p:ext>
-    </p:extLst>
-  </p:cSld>
-  <p:clrMapOvr>
-    <a:masterClrMapping/>
-  </p:clrMapOvr>
-</p:sld>
-</file>
-
-<file path=ppt/slides/slide5.xml><?xml version="1.0" encoding="utf-8"?>
+<file path=ppt/slides/slide6.xml><?xml version="1.0" encoding="utf-8"?>
 <p:sld xmlns:a="http://schemas.openxmlformats.org/drawingml/2006/main" xmlns:r="http://schemas.openxmlformats.org/officeDocument/2006/relationships" xmlns:p="http://schemas.openxmlformats.org/presentationml/2006/main">
   <p:cSld>
     <p:spTree>
@@ -4191,7 +4313,291 @@
 </p:sld>
 </file>
 
-<file path=ppt/slides/slide6.xml><?xml version="1.0" encoding="utf-8"?>
+<file path=ppt/slides/slide7.xml><?xml version="1.0" encoding="utf-8"?>
+<p:sld xmlns:a="http://schemas.openxmlformats.org/drawingml/2006/main" xmlns:r="http://schemas.openxmlformats.org/officeDocument/2006/relationships" xmlns:p="http://schemas.openxmlformats.org/presentationml/2006/main">
+  <p:cSld>
+    <p:spTree>
+      <p:nvGrpSpPr>
+        <p:cNvPr id="1" name=""/>
+        <p:cNvGrpSpPr/>
+        <p:nvPr/>
+      </p:nvGrpSpPr>
+      <p:grpSpPr>
+        <a:xfrm>
+          <a:off x="0" y="0"/>
+          <a:ext cx="0" cy="0"/>
+          <a:chOff x="0" y="0"/>
+          <a:chExt cx="0" cy="0"/>
+        </a:xfrm>
+      </p:grpSpPr>
+      <p:sp>
+        <p:nvSpPr>
+          <p:cNvPr id="2" name="Titel 1"/>
+          <p:cNvSpPr>
+            <a:spLocks noGrp="1"/>
+          </p:cNvSpPr>
+          <p:nvPr>
+            <p:ph type="title"/>
+          </p:nvPr>
+        </p:nvSpPr>
+        <p:spPr/>
+        <p:txBody>
+          <a:bodyPr/>
+          <a:lstStyle/>
+          <a:p>
+            <a:r>
+              <a:rPr lang="de-DE" dirty="0" smtClean="0"/>
+              <a:t>VOR-</a:t>
+            </a:r>
+            <a:br>
+              <a:rPr lang="de-DE" dirty="0" smtClean="0"/>
+            </a:br>
+            <a:r>
+              <a:rPr lang="de-DE" dirty="0" smtClean="0"/>
+              <a:t>und Nachteile</a:t>
+            </a:r>
+            <a:endParaRPr lang="de-DE" dirty="0"/>
+          </a:p>
+        </p:txBody>
+      </p:sp>
+      <p:sp>
+        <p:nvSpPr>
+          <p:cNvPr id="3" name="Inhaltsplatzhalter 2"/>
+          <p:cNvSpPr>
+            <a:spLocks noGrp="1"/>
+          </p:cNvSpPr>
+          <p:nvPr>
+            <p:ph idx="1"/>
+          </p:nvPr>
+        </p:nvSpPr>
+        <p:spPr/>
+        <p:txBody>
+          <a:bodyPr>
+            <a:normAutofit fontScale="92500" lnSpcReduction="10000"/>
+          </a:bodyPr>
+          <a:lstStyle/>
+          <a:p>
+            <a:r>
+              <a:rPr lang="de-DE" dirty="0"/>
+              <a:t>Wiederholgenauigkeit, sehr hohe Zuverlässigkeit und kompakte </a:t>
+            </a:r>
+            <a:r>
+              <a:rPr lang="de-DE" dirty="0" smtClean="0"/>
+              <a:t>Bauart</a:t>
+            </a:r>
+          </a:p>
+          <a:p>
+            <a:r>
+              <a:rPr lang="de-DE" dirty="0"/>
+              <a:t>unempfindlich gegenüber Einflüssen wie Beleuchtung, Schall, Temperaturschwankungen oder </a:t>
+            </a:r>
+            <a:r>
+              <a:rPr lang="de-DE" dirty="0" smtClean="0"/>
+              <a:t>Feuchtigkeit</a:t>
+            </a:r>
+          </a:p>
+          <a:p>
+            <a:r>
+              <a:rPr lang="de-DE" dirty="0" smtClean="0"/>
+              <a:t>Schmutzunempfindlicher als optische Sensoren</a:t>
+            </a:r>
+          </a:p>
+          <a:p>
+            <a:r>
+              <a:rPr lang="de-DE" dirty="0" smtClean="0"/>
+              <a:t>Berührungsfrei</a:t>
+            </a:r>
+          </a:p>
+          <a:p>
+            <a:endParaRPr lang="de-DE" dirty="0"/>
+          </a:p>
+          <a:p>
+            <a:r>
+              <a:rPr lang="de-DE" dirty="0" smtClean="0"/>
+              <a:t>Nachteile:</a:t>
+            </a:r>
+          </a:p>
+          <a:p>
+            <a:r>
+              <a:rPr lang="de-DE" dirty="0" smtClean="0"/>
+              <a:t>Schaltabstände abhängig vom Material und vom Einbauort</a:t>
+            </a:r>
+          </a:p>
+          <a:p>
+            <a:r>
+              <a:rPr lang="de-DE" dirty="0"/>
+              <a:t>Für spezielle Anwendungen wie z. B. im Schweißbereich mit starken magnetischen Feldern sind geschützte Ausführungen erforderlich.</a:t>
+            </a:r>
+          </a:p>
+          <a:p>
+            <a:endParaRPr lang="de-DE" dirty="0" smtClean="0"/>
+          </a:p>
+        </p:txBody>
+      </p:sp>
+      <p:sp>
+        <p:nvSpPr>
+          <p:cNvPr id="4" name="Textfeld 3"/>
+          <p:cNvSpPr txBox="1"/>
+          <p:nvPr/>
+        </p:nvSpPr>
+        <p:spPr>
+          <a:xfrm>
+            <a:off x="945815" y="6403727"/>
+            <a:ext cx="6959620" cy="369332"/>
+          </a:xfrm>
+          <a:prstGeom prst="rect">
+            <a:avLst/>
+          </a:prstGeom>
+          <a:noFill/>
+        </p:spPr>
+        <p:txBody>
+          <a:bodyPr wrap="none" rtlCol="0">
+            <a:spAutoFit/>
+          </a:bodyPr>
+          <a:lstStyle/>
+          <a:p>
+            <a:r>
+              <a:rPr lang="de-DE" dirty="0"/>
+              <a:t>Quelle: http://</a:t>
+            </a:r>
+            <a:r>
+              <a:rPr lang="de-DE" dirty="0" err="1"/>
+              <a:t>www.xpertgate.de</a:t>
+            </a:r>
+            <a:r>
+              <a:rPr lang="de-DE" dirty="0"/>
+              <a:t>/</a:t>
+            </a:r>
+            <a:r>
+              <a:rPr lang="de-DE" dirty="0" err="1"/>
+              <a:t>produkte</a:t>
+            </a:r>
+            <a:r>
+              <a:rPr lang="de-DE" dirty="0"/>
+              <a:t>/</a:t>
+            </a:r>
+            <a:r>
+              <a:rPr lang="de-DE" dirty="0" err="1"/>
+              <a:t>Induktive_Sensoren.html</a:t>
+            </a:r>
+            <a:endParaRPr lang="de-DE" dirty="0"/>
+          </a:p>
+        </p:txBody>
+      </p:sp>
+    </p:spTree>
+    <p:extLst>
+      <p:ext uri="{BB962C8B-B14F-4D97-AF65-F5344CB8AC3E}">
+        <p14:creationId xmlns:p14="http://schemas.microsoft.com/office/powerpoint/2010/main" val="2931010684"/>
+      </p:ext>
+    </p:extLst>
+  </p:cSld>
+  <p:clrMapOvr>
+    <a:masterClrMapping/>
+  </p:clrMapOvr>
+</p:sld>
+</file>
+
+<file path=ppt/slides/slide8.xml><?xml version="1.0" encoding="utf-8"?>
+<p:sld xmlns:a="http://schemas.openxmlformats.org/drawingml/2006/main" xmlns:r="http://schemas.openxmlformats.org/officeDocument/2006/relationships" xmlns:p="http://schemas.openxmlformats.org/presentationml/2006/main">
+  <p:cSld>
+    <p:spTree>
+      <p:nvGrpSpPr>
+        <p:cNvPr id="1" name=""/>
+        <p:cNvGrpSpPr/>
+        <p:nvPr/>
+      </p:nvGrpSpPr>
+      <p:grpSpPr>
+        <a:xfrm>
+          <a:off x="0" y="0"/>
+          <a:ext cx="0" cy="0"/>
+          <a:chOff x="0" y="0"/>
+          <a:chExt cx="0" cy="0"/>
+        </a:xfrm>
+      </p:grpSpPr>
+      <p:sp>
+        <p:nvSpPr>
+          <p:cNvPr id="2" name="Titel 1"/>
+          <p:cNvSpPr>
+            <a:spLocks noGrp="1"/>
+          </p:cNvSpPr>
+          <p:nvPr>
+            <p:ph type="title"/>
+          </p:nvPr>
+        </p:nvSpPr>
+        <p:spPr/>
+        <p:txBody>
+          <a:bodyPr/>
+          <a:lstStyle/>
+          <a:p>
+            <a:r>
+              <a:rPr lang="de-DE" dirty="0" smtClean="0"/>
+              <a:t>Anwendungen</a:t>
+            </a:r>
+            <a:endParaRPr lang="de-DE" dirty="0"/>
+          </a:p>
+        </p:txBody>
+      </p:sp>
+      <p:sp>
+        <p:nvSpPr>
+          <p:cNvPr id="3" name="Inhaltsplatzhalter 2"/>
+          <p:cNvSpPr>
+            <a:spLocks noGrp="1"/>
+          </p:cNvSpPr>
+          <p:nvPr>
+            <p:ph idx="1"/>
+          </p:nvPr>
+        </p:nvSpPr>
+        <p:spPr/>
+        <p:txBody>
+          <a:bodyPr/>
+          <a:lstStyle/>
+          <a:p>
+            <a:pPr marL="342900" indent="-342900">
+              <a:buFontTx/>
+              <a:buChar char="-"/>
+            </a:pPr>
+            <a:r>
+              <a:rPr lang="de-DE" dirty="0" smtClean="0"/>
+              <a:t>Ersatz von mechanischen Schaltern</a:t>
+            </a:r>
+          </a:p>
+          <a:p>
+            <a:pPr marL="342900" indent="-342900">
+              <a:buFontTx/>
+              <a:buChar char="-"/>
+            </a:pPr>
+            <a:r>
+              <a:rPr lang="de-DE" dirty="0" smtClean="0"/>
+              <a:t>Abstandsmessung</a:t>
+            </a:r>
+          </a:p>
+          <a:p>
+            <a:pPr marL="342900" indent="-342900">
+              <a:buFontTx/>
+              <a:buChar char="-"/>
+            </a:pPr>
+            <a:r>
+              <a:rPr lang="de-DE" dirty="0" smtClean="0"/>
+              <a:t>Unwucht Erkennung in Waschmaschinen</a:t>
+            </a:r>
+            <a:endParaRPr lang="de-DE" dirty="0"/>
+          </a:p>
+        </p:txBody>
+      </p:sp>
+    </p:spTree>
+    <p:extLst>
+      <p:ext uri="{BB962C8B-B14F-4D97-AF65-F5344CB8AC3E}">
+        <p14:creationId xmlns:p14="http://schemas.microsoft.com/office/powerpoint/2010/main" val="3305900296"/>
+      </p:ext>
+    </p:extLst>
+  </p:cSld>
+  <p:clrMapOvr>
+    <a:masterClrMapping/>
+  </p:clrMapOvr>
+</p:sld>
+</file>
+
+<file path=ppt/slides/slide9.xml><?xml version="1.0" encoding="utf-8"?>
 <p:sld xmlns:a="http://schemas.openxmlformats.org/drawingml/2006/main" xmlns:r="http://schemas.openxmlformats.org/officeDocument/2006/relationships" xmlns:p="http://schemas.openxmlformats.org/presentationml/2006/main">
   <p:cSld>
     <p:spTree>

</xml_diff>

<commit_message>
Power Point verschoenert .... denke ich. Ah und Quellen hinzugefuegt
</commit_message>
<xml_diff>
--- a/induktiv_sensoren.pptx
+++ b/induktiv_sensoren.pptx
@@ -309,7 +309,7 @@
             <a:fld id="{451DEABC-D766-4322-8E78-B830FAE35C72}" type="datetime4">
               <a:rPr lang="en-US" smtClean="0"/>
               <a:pPr/>
-              <a:t>Oktober 22, 2015</a:t>
+              <a:t>October 25, 2015</a:t>
             </a:fld>
             <a:endParaRPr lang="en-US" dirty="0"/>
           </a:p>
@@ -576,7 +576,7 @@
             <a:fld id="{F3131F9E-604E-4343-9F29-EF72E8231CAD}" type="datetime4">
               <a:rPr lang="en-US" smtClean="0"/>
               <a:pPr/>
-              <a:t>Oktober 22, 2015</a:t>
+              <a:t>October 25, 2015</a:t>
             </a:fld>
             <a:endParaRPr lang="en-US"/>
           </a:p>
@@ -753,7 +753,7 @@
             <a:fld id="{34A8E1CE-37F8-4102-8DF9-852A0A51F293}" type="datetime4">
               <a:rPr lang="en-US" smtClean="0"/>
               <a:pPr/>
-              <a:t>Oktober 22, 2015</a:t>
+              <a:t>October 25, 2015</a:t>
             </a:fld>
             <a:endParaRPr lang="en-US"/>
           </a:p>
@@ -920,7 +920,7 @@
             <a:fld id="{93333F43-3E86-47E4-BFBB-2476D384E1C6}" type="datetime4">
               <a:rPr lang="en-US" smtClean="0"/>
               <a:pPr/>
-              <a:t>Oktober 22, 2015</a:t>
+              <a:t>October 25, 2015</a:t>
             </a:fld>
             <a:endParaRPr lang="en-US"/>
           </a:p>
@@ -1171,7 +1171,7 @@
             <a:fld id="{751663BA-01FC-4367-B6F3-ABB2645D55F1}" type="datetime4">
               <a:rPr lang="en-US" smtClean="0"/>
               <a:pPr/>
-              <a:t>Oktober 22, 2015</a:t>
+              <a:t>October 25, 2015</a:t>
             </a:fld>
             <a:endParaRPr lang="en-US" dirty="0"/>
           </a:p>
@@ -1456,7 +1456,7 @@
             <a:fld id="{79B19C71-EC74-44AF-B27E-FC7DC3C3A61D}" type="datetime4">
               <a:rPr lang="en-US" smtClean="0"/>
               <a:pPr/>
-              <a:t>Oktober 22, 2015</a:t>
+              <a:t>October 25, 2015</a:t>
             </a:fld>
             <a:endParaRPr lang="en-US"/>
           </a:p>
@@ -1897,7 +1897,7 @@
             <a:fld id="{6A5CDA29-3CBE-48EA-92AE-A996835462BA}" type="datetime4">
               <a:rPr lang="en-US" smtClean="0"/>
               <a:pPr/>
-              <a:t>Oktober 22, 2015</a:t>
+              <a:t>October 25, 2015</a:t>
             </a:fld>
             <a:endParaRPr lang="en-US"/>
           </a:p>
@@ -2012,7 +2012,7 @@
             <a:fld id="{E29EC054-3869-4501-B163-1BBFDE8DCE04}" type="datetime4">
               <a:rPr lang="en-US" smtClean="0"/>
               <a:pPr/>
-              <a:t>Oktober 22, 2015</a:t>
+              <a:t>October 25, 2015</a:t>
             </a:fld>
             <a:endParaRPr lang="en-US"/>
           </a:p>
@@ -2104,7 +2104,7 @@
             <a:fld id="{0A63D831-56C1-49CF-8EF7-8B9A98402BCD}" type="datetime4">
               <a:rPr lang="en-US" smtClean="0"/>
               <a:pPr/>
-              <a:t>Oktober 22, 2015</a:t>
+              <a:t>October 25, 2015</a:t>
             </a:fld>
             <a:endParaRPr lang="en-US"/>
           </a:p>
@@ -2348,7 +2348,7 @@
             <a:fld id="{6EAD5615-7F4F-4584-84D5-CC95918C321F}" type="datetime4">
               <a:rPr lang="en-US" smtClean="0"/>
               <a:pPr/>
-              <a:t>Oktober 22, 2015</a:t>
+              <a:t>October 25, 2015</a:t>
             </a:fld>
             <a:endParaRPr lang="en-US"/>
           </a:p>
@@ -2644,7 +2644,7 @@
             <a:fld id="{76EEA923-9BEE-48CE-9F28-5B525F399BAD}" type="datetime4">
               <a:rPr lang="en-US" smtClean="0"/>
               <a:pPr/>
-              <a:t>Oktober 22, 2015</a:t>
+              <a:t>October 25, 2015</a:t>
             </a:fld>
             <a:endParaRPr lang="en-US"/>
           </a:p>
@@ -2940,7 +2940,7 @@
             <a:fld id="{17D0EFEE-2756-4A20-BF2A-63F0A94F99AC}" type="datetime4">
               <a:rPr lang="en-US" smtClean="0"/>
               <a:pPr/>
-              <a:t>Oktober 22, 2015</a:t>
+              <a:t>October 25, 2015</a:t>
             </a:fld>
             <a:endParaRPr lang="en-US" dirty="0"/>
           </a:p>
@@ -3469,22 +3469,84 @@
         </p:nvSpPr>
         <p:spPr/>
         <p:txBody>
-          <a:bodyPr/>
+          <a:bodyPr>
+            <a:normAutofit fontScale="70000" lnSpcReduction="20000"/>
+          </a:bodyPr>
           <a:lstStyle/>
           <a:p>
             <a:r>
               <a:rPr lang="de-DE" dirty="0" smtClean="0"/>
-              <a:t>Antonio </a:t>
-            </a:r>
-            <a:r>
-              <a:rPr lang="de-DE" dirty="0" err="1" smtClean="0"/>
-              <a:t>Parrotta</a:t>
+              <a:t>Antonio Parrotta &amp; Ulf </a:t>
             </a:r>
             <a:r>
               <a:rPr lang="de-DE" dirty="0" smtClean="0"/>
-              <a:t> &amp; Ulf Schmelzer</a:t>
+              <a:t>Schmelzer</a:t>
+            </a:r>
+          </a:p>
+          <a:p>
+            <a:r>
+              <a:rPr lang="de-DE" dirty="0" smtClean="0"/>
+              <a:t>Embedded Systems Software</a:t>
+            </a:r>
+            <a:endParaRPr lang="de-DE" dirty="0" smtClean="0"/>
+          </a:p>
+          <a:p>
+            <a:r>
+              <a:rPr lang="de-DE" dirty="0" smtClean="0"/>
+              <a:t>26.10.2015</a:t>
             </a:r>
             <a:endParaRPr lang="de-DE" dirty="0"/>
+          </a:p>
+        </p:txBody>
+      </p:sp>
+      <p:sp>
+        <p:nvSpPr>
+          <p:cNvPr id="4" name="Rechteck 3"/>
+          <p:cNvSpPr/>
+          <p:nvPr/>
+        </p:nvSpPr>
+        <p:spPr>
+          <a:xfrm>
+            <a:off x="0" y="6504971"/>
+            <a:ext cx="9144000" cy="393539"/>
+          </a:xfrm>
+          <a:prstGeom prst="rect">
+            <a:avLst/>
+          </a:prstGeom>
+          <a:solidFill>
+            <a:schemeClr val="tx1"/>
+          </a:solidFill>
+          <a:ln>
+            <a:noFill/>
+          </a:ln>
+        </p:spPr>
+        <p:style>
+          <a:lnRef idx="2">
+            <a:schemeClr val="accent1">
+              <a:shade val="50000"/>
+            </a:schemeClr>
+          </a:lnRef>
+          <a:fillRef idx="1">
+            <a:schemeClr val="accent1"/>
+          </a:fillRef>
+          <a:effectRef idx="0">
+            <a:schemeClr val="accent1"/>
+          </a:effectRef>
+          <a:fontRef idx="minor">
+            <a:schemeClr val="lt1"/>
+          </a:fontRef>
+        </p:style>
+        <p:txBody>
+          <a:bodyPr rtlCol="0" anchor="ctr"/>
+          <a:lstStyle/>
+          <a:p>
+            <a:r>
+              <a:rPr lang="de-DE" sz="900" dirty="0" smtClean="0"/>
+              <a:t>Antonio Parrotta &amp; Ulf Schmelzer, Embedded Systems Software, Vortrag: Induktive Sensoren 26.10.2015</a:t>
+            </a:r>
+          </a:p>
+          <a:p>
+            <a:endParaRPr lang="de-DE" sz="900" dirty="0"/>
           </a:p>
         </p:txBody>
       </p:sp>
@@ -3501,7 +3563,7 @@
   <p:timing>
     <p:tnLst>
       <p:par>
-        <p:cTn xmlns:p14="http://schemas.microsoft.com/office/powerpoint/2010/main" id="1" dur="indefinite" restart="never" nodeType="tmRoot"/>
+        <p:cTn id="1" dur="indefinite" restart="never" nodeType="tmRoot"/>
       </p:par>
     </p:tnLst>
   </p:timing>
@@ -3617,6 +3679,80 @@
           </a:p>
         </p:txBody>
       </p:sp>
+      <p:sp>
+        <p:nvSpPr>
+          <p:cNvPr id="5" name="Rechteck 4"/>
+          <p:cNvSpPr/>
+          <p:nvPr/>
+        </p:nvSpPr>
+        <p:spPr>
+          <a:xfrm>
+            <a:off x="0" y="6504971"/>
+            <a:ext cx="9144000" cy="393539"/>
+          </a:xfrm>
+          <a:prstGeom prst="rect">
+            <a:avLst/>
+          </a:prstGeom>
+          <a:solidFill>
+            <a:schemeClr val="tx1"/>
+          </a:solidFill>
+          <a:ln>
+            <a:noFill/>
+          </a:ln>
+        </p:spPr>
+        <p:style>
+          <a:lnRef idx="2">
+            <a:schemeClr val="accent1">
+              <a:shade val="50000"/>
+            </a:schemeClr>
+          </a:lnRef>
+          <a:fillRef idx="1">
+            <a:schemeClr val="accent1"/>
+          </a:fillRef>
+          <a:effectRef idx="0">
+            <a:schemeClr val="accent1"/>
+          </a:effectRef>
+          <a:fontRef idx="minor">
+            <a:schemeClr val="lt1"/>
+          </a:fontRef>
+        </p:style>
+        <p:txBody>
+          <a:bodyPr rtlCol="0" anchor="ctr"/>
+          <a:lstStyle/>
+          <a:p>
+            <a:r>
+              <a:rPr lang="de-DE" sz="900" dirty="0" smtClean="0"/>
+              <a:t>Antonio Parrotta &amp; Ulf Schmelzer, Embedded Systems Software, Vortrag: Induktive Sensoren 26.10.2015</a:t>
+            </a:r>
+          </a:p>
+          <a:p>
+            <a:r>
+              <a:rPr lang="de-DE" sz="900" dirty="0" smtClean="0"/>
+              <a:t>Quelle: </a:t>
+            </a:r>
+            <a:r>
+              <a:rPr lang="de-DE" sz="900" dirty="0" err="1" smtClean="0"/>
+              <a:t>process.vogel</a:t>
+            </a:r>
+            <a:r>
+              <a:rPr lang="de-DE" sz="900" dirty="0" smtClean="0"/>
+              <a:t>, „Vergangenheit und Zukunft des </a:t>
+            </a:r>
+            <a:r>
+              <a:rPr lang="de-DE" sz="900" dirty="0"/>
+              <a:t>induktiven </a:t>
+            </a:r>
+            <a:r>
+              <a:rPr lang="de-DE" sz="900" dirty="0" smtClean="0"/>
+              <a:t>Näherungsschalters“, </a:t>
+            </a:r>
+            <a:r>
+              <a:rPr lang="de-DE" sz="900" dirty="0"/>
+              <a:t>http://www.process.vogel.de/automatisierung_prozessleittechnik/articles/145538/</a:t>
+            </a:r>
+          </a:p>
+        </p:txBody>
+      </p:sp>
     </p:spTree>
     <p:extLst>
       <p:ext uri="{BB962C8B-B14F-4D97-AF65-F5344CB8AC3E}">
@@ -3627,6 +3763,13 @@
   <p:clrMapOvr>
     <a:masterClrMapping/>
   </p:clrMapOvr>
+  <p:timing>
+    <p:tnLst>
+      <p:par>
+        <p:cTn id="1" dur="indefinite" restart="never" nodeType="tmRoot"/>
+      </p:par>
+    </p:tnLst>
+  </p:timing>
 </p:sld>
 </file>
 
@@ -3698,7 +3841,6 @@
               <a:rPr lang="de-DE" dirty="0" smtClean="0"/>
               <a:t>Durch Spule erzeugtes Wechselfeld</a:t>
             </a:r>
-            <a:endParaRPr lang="de-DE" dirty="0" smtClean="0"/>
           </a:p>
           <a:p>
             <a:pPr marL="342900" indent="-342900">
@@ -3728,17 +3870,8 @@
             </a:pPr>
             <a:r>
               <a:rPr lang="de-DE" dirty="0" smtClean="0"/>
-              <a:t>Gehäuse zum </a:t>
-            </a:r>
-            <a:r>
-              <a:rPr lang="de-DE" dirty="0" smtClean="0"/>
-              <a:t>Schutz </a:t>
-            </a:r>
-            <a:r>
-              <a:rPr lang="de-DE" dirty="0" smtClean="0"/>
-              <a:t>gegen </a:t>
-            </a:r>
-            <a:endParaRPr lang="de-DE" dirty="0" smtClean="0"/>
+              <a:t>Gehäuse zum Schutz gegen </a:t>
+            </a:r>
           </a:p>
           <a:p>
             <a:r>
@@ -3747,13 +3880,8 @@
             </a:r>
             <a:r>
               <a:rPr lang="de-DE" dirty="0" smtClean="0"/>
-              <a:t>     </a:t>
-            </a:r>
-            <a:r>
-              <a:rPr lang="de-DE" dirty="0" smtClean="0"/>
-              <a:t>mechanische Einflüsse</a:t>
-            </a:r>
-            <a:endParaRPr lang="de-DE" dirty="0" smtClean="0"/>
+              <a:t>     mechanische Einflüsse</a:t>
+            </a:r>
           </a:p>
           <a:p>
             <a:pPr marL="342900" indent="-342900">
@@ -3773,7 +3901,7 @@
           <p:nvPr/>
         </p:nvPicPr>
         <p:blipFill rotWithShape="1">
-          <a:blip r:embed="rId2">
+          <a:blip r:embed="rId2" cstate="email">
             <a:extLst>
               <a:ext uri="{28A0092B-C50C-407E-A947-70E740481C1C}">
                 <a14:useLocalDpi xmlns:a14="http://schemas.microsoft.com/office/drawing/2010/main" val="0"/>
@@ -3793,6 +3921,72 @@
           </a:prstGeom>
         </p:spPr>
       </p:pic>
+      <p:sp>
+        <p:nvSpPr>
+          <p:cNvPr id="6" name="Rechteck 5"/>
+          <p:cNvSpPr/>
+          <p:nvPr/>
+        </p:nvSpPr>
+        <p:spPr>
+          <a:xfrm>
+            <a:off x="0" y="6504971"/>
+            <a:ext cx="9144000" cy="393539"/>
+          </a:xfrm>
+          <a:prstGeom prst="rect">
+            <a:avLst/>
+          </a:prstGeom>
+          <a:solidFill>
+            <a:schemeClr val="tx1"/>
+          </a:solidFill>
+          <a:ln>
+            <a:noFill/>
+          </a:ln>
+        </p:spPr>
+        <p:style>
+          <a:lnRef idx="2">
+            <a:schemeClr val="accent1">
+              <a:shade val="50000"/>
+            </a:schemeClr>
+          </a:lnRef>
+          <a:fillRef idx="1">
+            <a:schemeClr val="accent1"/>
+          </a:fillRef>
+          <a:effectRef idx="0">
+            <a:schemeClr val="accent1"/>
+          </a:effectRef>
+          <a:fontRef idx="minor">
+            <a:schemeClr val="lt1"/>
+          </a:fontRef>
+        </p:style>
+        <p:txBody>
+          <a:bodyPr rtlCol="0" anchor="ctr"/>
+          <a:lstStyle/>
+          <a:p>
+            <a:r>
+              <a:rPr lang="de-DE" sz="900" dirty="0" smtClean="0"/>
+              <a:t>Antonio Parrotta &amp; Ulf Schmelzer, Embedded Systems Software, Vortrag: Induktive Sensoren 26.10.2015</a:t>
+            </a:r>
+          </a:p>
+          <a:p>
+            <a:r>
+              <a:rPr lang="de-DE" sz="900" dirty="0" smtClean="0"/>
+              <a:t>Quelle: </a:t>
+            </a:r>
+            <a:r>
+              <a:rPr lang="de-DE" sz="900" dirty="0" err="1" smtClean="0"/>
+              <a:t>ifm</a:t>
+            </a:r>
+            <a:r>
+              <a:rPr lang="de-DE" sz="900" dirty="0" smtClean="0"/>
+              <a:t> electronic, „Schulungsunterlagen efector100“,  http</a:t>
+            </a:r>
+            <a:r>
+              <a:rPr lang="de-DE" sz="900" dirty="0"/>
+              <a:t>://www.ifm.com/obj/S100d.pdf</a:t>
+            </a:r>
+          </a:p>
+        </p:txBody>
+      </p:sp>
     </p:spTree>
     <p:extLst>
       <p:ext uri="{BB962C8B-B14F-4D97-AF65-F5344CB8AC3E}">
@@ -3803,6 +3997,13 @@
   <p:clrMapOvr>
     <a:masterClrMapping/>
   </p:clrMapOvr>
+  <p:timing>
+    <p:tnLst>
+      <p:par>
+        <p:cTn id="1" dur="indefinite" restart="never" nodeType="tmRoot"/>
+      </p:par>
+    </p:tnLst>
+  </p:timing>
 </p:sld>
 </file>
 
@@ -3862,7 +4063,7 @@
         </p:blipFill>
         <p:spPr>
           <a:xfrm>
-            <a:off x="1339163" y="2114550"/>
+            <a:off x="1339163" y="1558950"/>
             <a:ext cx="6465673" cy="2628900"/>
           </a:xfrm>
           <a:prstGeom prst="rect">
@@ -3886,7 +4087,7 @@
         </p:blipFill>
         <p:spPr>
           <a:xfrm>
-            <a:off x="1016000" y="4345844"/>
+            <a:off x="1016000" y="4010169"/>
             <a:ext cx="3454400" cy="2321656"/>
           </a:xfrm>
           <a:prstGeom prst="rect">
@@ -3894,6 +4095,72 @@
           </a:prstGeom>
         </p:spPr>
       </p:pic>
+      <p:sp>
+        <p:nvSpPr>
+          <p:cNvPr id="10" name="Rechteck 9"/>
+          <p:cNvSpPr/>
+          <p:nvPr/>
+        </p:nvSpPr>
+        <p:spPr>
+          <a:xfrm>
+            <a:off x="0" y="6504971"/>
+            <a:ext cx="9144000" cy="393539"/>
+          </a:xfrm>
+          <a:prstGeom prst="rect">
+            <a:avLst/>
+          </a:prstGeom>
+          <a:solidFill>
+            <a:schemeClr val="tx1"/>
+          </a:solidFill>
+          <a:ln>
+            <a:noFill/>
+          </a:ln>
+        </p:spPr>
+        <p:style>
+          <a:lnRef idx="2">
+            <a:schemeClr val="accent1">
+              <a:shade val="50000"/>
+            </a:schemeClr>
+          </a:lnRef>
+          <a:fillRef idx="1">
+            <a:schemeClr val="accent1"/>
+          </a:fillRef>
+          <a:effectRef idx="0">
+            <a:schemeClr val="accent1"/>
+          </a:effectRef>
+          <a:fontRef idx="minor">
+            <a:schemeClr val="lt1"/>
+          </a:fontRef>
+        </p:style>
+        <p:txBody>
+          <a:bodyPr rtlCol="0" anchor="ctr"/>
+          <a:lstStyle/>
+          <a:p>
+            <a:r>
+              <a:rPr lang="de-DE" sz="900" dirty="0" smtClean="0"/>
+              <a:t>Antonio Parrotta &amp; Ulf Schmelzer, Embedded Systems Software, Vortrag: Induktive Sensoren 26.10.2015</a:t>
+            </a:r>
+          </a:p>
+          <a:p>
+            <a:r>
+              <a:rPr lang="de-DE" sz="900" dirty="0" smtClean="0"/>
+              <a:t>Quelle: </a:t>
+            </a:r>
+            <a:r>
+              <a:rPr lang="de-DE" sz="900" dirty="0" err="1" smtClean="0"/>
+              <a:t>ifm</a:t>
+            </a:r>
+            <a:r>
+              <a:rPr lang="de-DE" sz="900" dirty="0" smtClean="0"/>
+              <a:t> electronic, „Schulungsunterlagen efector100“,  http</a:t>
+            </a:r>
+            <a:r>
+              <a:rPr lang="de-DE" sz="900" dirty="0"/>
+              <a:t>://www.ifm.com/obj/S100d.pdf</a:t>
+            </a:r>
+          </a:p>
+        </p:txBody>
+      </p:sp>
     </p:spTree>
     <p:extLst>
       <p:ext uri="{BB962C8B-B14F-4D97-AF65-F5344CB8AC3E}">
@@ -3983,13 +4250,8 @@
             </a:pPr>
             <a:r>
               <a:rPr lang="de-DE" dirty="0" smtClean="0"/>
-              <a:t>LC-</a:t>
-            </a:r>
-            <a:r>
-              <a:rPr lang="de-DE" dirty="0" smtClean="0"/>
-              <a:t>Schwingkreis</a:t>
-            </a:r>
-            <a:endParaRPr lang="de-DE" dirty="0" smtClean="0"/>
+              <a:t>LC-Schwingkreis</a:t>
+            </a:r>
           </a:p>
           <a:p>
             <a:pPr marL="342900" indent="-342900">
@@ -4000,7 +4262,6 @@
               <a:rPr lang="de-DE" dirty="0" smtClean="0"/>
               <a:t>Schmitt-Trigger</a:t>
             </a:r>
-            <a:endParaRPr lang="de-DE" dirty="0" smtClean="0"/>
           </a:p>
           <a:p>
             <a:pPr marL="342900" indent="-342900">
@@ -4038,7 +4299,7 @@
           <p:nvPr/>
         </p:nvPicPr>
         <p:blipFill>
-          <a:blip r:embed="rId2">
+          <a:blip r:embed="rId2" cstate="email">
             <a:extLst>
               <a:ext uri="{28A0092B-C50C-407E-A947-70E740481C1C}">
                 <a14:useLocalDpi xmlns:a14="http://schemas.microsoft.com/office/drawing/2010/main" val="0"/>
@@ -4059,6 +4320,72 @@
           </a:prstGeom>
         </p:spPr>
       </p:pic>
+      <p:sp>
+        <p:nvSpPr>
+          <p:cNvPr id="8" name="Rechteck 7"/>
+          <p:cNvSpPr/>
+          <p:nvPr/>
+        </p:nvSpPr>
+        <p:spPr>
+          <a:xfrm>
+            <a:off x="0" y="6504971"/>
+            <a:ext cx="9144000" cy="393539"/>
+          </a:xfrm>
+          <a:prstGeom prst="rect">
+            <a:avLst/>
+          </a:prstGeom>
+          <a:solidFill>
+            <a:schemeClr val="tx1"/>
+          </a:solidFill>
+          <a:ln>
+            <a:noFill/>
+          </a:ln>
+        </p:spPr>
+        <p:style>
+          <a:lnRef idx="2">
+            <a:schemeClr val="accent1">
+              <a:shade val="50000"/>
+            </a:schemeClr>
+          </a:lnRef>
+          <a:fillRef idx="1">
+            <a:schemeClr val="accent1"/>
+          </a:fillRef>
+          <a:effectRef idx="0">
+            <a:schemeClr val="accent1"/>
+          </a:effectRef>
+          <a:fontRef idx="minor">
+            <a:schemeClr val="lt1"/>
+          </a:fontRef>
+        </p:style>
+        <p:txBody>
+          <a:bodyPr rtlCol="0" anchor="ctr"/>
+          <a:lstStyle/>
+          <a:p>
+            <a:r>
+              <a:rPr lang="de-DE" sz="900" dirty="0" smtClean="0"/>
+              <a:t>Antonio Parrotta &amp; Ulf Schmelzer, Embedded Systems Software, Vortrag: Induktive Sensoren 26.10.2015</a:t>
+            </a:r>
+          </a:p>
+          <a:p>
+            <a:r>
+              <a:rPr lang="de-DE" sz="900" dirty="0" smtClean="0"/>
+              <a:t>Quelle: </a:t>
+            </a:r>
+            <a:r>
+              <a:rPr lang="de-DE" sz="900" dirty="0" err="1" smtClean="0"/>
+              <a:t>ifm</a:t>
+            </a:r>
+            <a:r>
+              <a:rPr lang="de-DE" sz="900" dirty="0" smtClean="0"/>
+              <a:t> electronic, „Schulungsunterlagen efector100“,  http</a:t>
+            </a:r>
+            <a:r>
+              <a:rPr lang="de-DE" sz="900" dirty="0"/>
+              <a:t>://www.ifm.com/obj/S100d.pdf</a:t>
+            </a:r>
+          </a:p>
+        </p:txBody>
+      </p:sp>
     </p:spTree>
     <p:extLst>
       <p:ext uri="{BB962C8B-B14F-4D97-AF65-F5344CB8AC3E}">
@@ -4164,15 +4491,7 @@
             </a:pPr>
             <a:r>
               <a:rPr lang="de-DE" dirty="0" smtClean="0"/>
-              <a:t>Wenn die Amplitude unter das eingestellte Level des </a:t>
-            </a:r>
-            <a:r>
-              <a:rPr lang="de-DE" dirty="0" smtClean="0"/>
-              <a:t>Schmitt-Trigger fällt </a:t>
-            </a:r>
-            <a:r>
-              <a:rPr lang="de-DE" dirty="0" smtClean="0"/>
-              <a:t>schaltet der Ausgang</a:t>
+              <a:t>Wenn die Amplitude unter das eingestellte Level des Schmitt-Trigger fällt schaltet der Ausgang</a:t>
             </a:r>
           </a:p>
           <a:p>
@@ -4193,7 +4512,7 @@
           <p:nvPr/>
         </p:nvPicPr>
         <p:blipFill>
-          <a:blip r:embed="rId2">
+          <a:blip r:embed="rId2" cstate="email">
             <a:extLst>
               <a:ext uri="{28A0092B-C50C-407E-A947-70E740481C1C}">
                 <a14:useLocalDpi xmlns:a14="http://schemas.microsoft.com/office/drawing/2010/main" val="0"/>
@@ -4206,7 +4525,7 @@
         </p:blipFill>
         <p:spPr>
           <a:xfrm flipH="1">
-            <a:off x="6342402" y="2027652"/>
+            <a:off x="6342402" y="1622527"/>
             <a:ext cx="1363425" cy="3254914"/>
           </a:xfrm>
           <a:prstGeom prst="rect">
@@ -4222,7 +4541,7 @@
         </p:nvSpPr>
         <p:spPr>
           <a:xfrm>
-            <a:off x="5422182" y="2027652"/>
+            <a:off x="5422182" y="1796152"/>
             <a:ext cx="826218" cy="369332"/>
           </a:xfrm>
           <a:prstGeom prst="rect">
@@ -4252,7 +4571,7 @@
         </p:nvCxnSpPr>
         <p:spPr>
           <a:xfrm>
-            <a:off x="6062203" y="2396984"/>
+            <a:off x="6062203" y="2211784"/>
             <a:ext cx="280199" cy="289079"/>
           </a:xfrm>
           <a:prstGeom prst="straightConnector1">
@@ -4292,7 +4611,7 @@
         </p:blipFill>
         <p:spPr>
           <a:xfrm>
-            <a:off x="5941232" y="4631323"/>
+            <a:off x="5941232" y="4260923"/>
             <a:ext cx="2135968" cy="1803805"/>
           </a:xfrm>
           <a:prstGeom prst="rect">
@@ -4300,6 +4619,72 @@
           </a:prstGeom>
         </p:spPr>
       </p:pic>
+      <p:sp>
+        <p:nvSpPr>
+          <p:cNvPr id="11" name="Rechteck 10"/>
+          <p:cNvSpPr/>
+          <p:nvPr/>
+        </p:nvSpPr>
+        <p:spPr>
+          <a:xfrm>
+            <a:off x="0" y="6504971"/>
+            <a:ext cx="9144000" cy="393539"/>
+          </a:xfrm>
+          <a:prstGeom prst="rect">
+            <a:avLst/>
+          </a:prstGeom>
+          <a:solidFill>
+            <a:schemeClr val="tx1"/>
+          </a:solidFill>
+          <a:ln>
+            <a:noFill/>
+          </a:ln>
+        </p:spPr>
+        <p:style>
+          <a:lnRef idx="2">
+            <a:schemeClr val="accent1">
+              <a:shade val="50000"/>
+            </a:schemeClr>
+          </a:lnRef>
+          <a:fillRef idx="1">
+            <a:schemeClr val="accent1"/>
+          </a:fillRef>
+          <a:effectRef idx="0">
+            <a:schemeClr val="accent1"/>
+          </a:effectRef>
+          <a:fontRef idx="minor">
+            <a:schemeClr val="lt1"/>
+          </a:fontRef>
+        </p:style>
+        <p:txBody>
+          <a:bodyPr rtlCol="0" anchor="ctr"/>
+          <a:lstStyle/>
+          <a:p>
+            <a:r>
+              <a:rPr lang="de-DE" sz="900" dirty="0" smtClean="0"/>
+              <a:t>Antonio Parrotta &amp; Ulf Schmelzer, Embedded Systems Software, Vortrag: Induktive Sensoren 26.10.2015</a:t>
+            </a:r>
+          </a:p>
+          <a:p>
+            <a:r>
+              <a:rPr lang="de-DE" sz="900" dirty="0" smtClean="0"/>
+              <a:t>Quelle: </a:t>
+            </a:r>
+            <a:r>
+              <a:rPr lang="de-DE" sz="900" dirty="0" err="1" smtClean="0"/>
+              <a:t>ifm</a:t>
+            </a:r>
+            <a:r>
+              <a:rPr lang="de-DE" sz="900" dirty="0" smtClean="0"/>
+              <a:t> electronic, „Schulungsunterlagen efector100“,  http</a:t>
+            </a:r>
+            <a:r>
+              <a:rPr lang="de-DE" sz="900" dirty="0"/>
+              <a:t>://www.ifm.com/obj/S100d.pdf</a:t>
+            </a:r>
+          </a:p>
+        </p:txBody>
+      </p:sp>
     </p:spTree>
     <p:extLst>
       <p:ext uri="{BB962C8B-B14F-4D97-AF65-F5344CB8AC3E}">
@@ -4436,51 +4821,72 @@
       </p:sp>
       <p:sp>
         <p:nvSpPr>
-          <p:cNvPr id="4" name="Textfeld 3"/>
-          <p:cNvSpPr txBox="1"/>
+          <p:cNvPr id="6" name="Rechteck 5"/>
+          <p:cNvSpPr/>
           <p:nvPr/>
         </p:nvSpPr>
         <p:spPr>
           <a:xfrm>
-            <a:off x="945815" y="6403727"/>
-            <a:ext cx="6959620" cy="369332"/>
+            <a:off x="-11575" y="6476036"/>
+            <a:ext cx="9144000" cy="393539"/>
           </a:xfrm>
           <a:prstGeom prst="rect">
             <a:avLst/>
           </a:prstGeom>
-          <a:noFill/>
+          <a:solidFill>
+            <a:schemeClr val="tx1"/>
+          </a:solidFill>
+          <a:ln>
+            <a:noFill/>
+          </a:ln>
         </p:spPr>
-        <p:txBody>
-          <a:bodyPr wrap="none" rtlCol="0">
-            <a:spAutoFit/>
-          </a:bodyPr>
-          <a:lstStyle/>
-          <a:p>
-            <a:r>
-              <a:rPr lang="de-DE" dirty="0"/>
-              <a:t>Quelle: http://</a:t>
-            </a:r>
-            <a:r>
-              <a:rPr lang="de-DE" dirty="0" err="1"/>
-              <a:t>www.xpertgate.de</a:t>
-            </a:r>
-            <a:r>
-              <a:rPr lang="de-DE" dirty="0"/>
-              <a:t>/</a:t>
-            </a:r>
-            <a:r>
-              <a:rPr lang="de-DE" dirty="0" err="1"/>
-              <a:t>produkte</a:t>
-            </a:r>
-            <a:r>
-              <a:rPr lang="de-DE" dirty="0"/>
-              <a:t>/</a:t>
-            </a:r>
-            <a:r>
-              <a:rPr lang="de-DE" dirty="0" err="1"/>
-              <a:t>Induktive_Sensoren.html</a:t>
-            </a:r>
-            <a:endParaRPr lang="de-DE" dirty="0"/>
+        <p:style>
+          <a:lnRef idx="2">
+            <a:schemeClr val="accent1">
+              <a:shade val="50000"/>
+            </a:schemeClr>
+          </a:lnRef>
+          <a:fillRef idx="1">
+            <a:schemeClr val="accent1"/>
+          </a:fillRef>
+          <a:effectRef idx="0">
+            <a:schemeClr val="accent1"/>
+          </a:effectRef>
+          <a:fontRef idx="minor">
+            <a:schemeClr val="lt1"/>
+          </a:fontRef>
+        </p:style>
+        <p:txBody>
+          <a:bodyPr rtlCol="0" anchor="ctr"/>
+          <a:lstStyle/>
+          <a:p>
+            <a:r>
+              <a:rPr lang="de-DE" sz="900" dirty="0" smtClean="0"/>
+              <a:t>Antonio Parrotta &amp; Ulf Schmelzer, Embedded Systems Software, Vortrag: Induktive Sensoren 26.10.2015</a:t>
+            </a:r>
+          </a:p>
+          <a:p>
+            <a:r>
+              <a:rPr lang="de-DE" sz="900" dirty="0"/>
+              <a:t>Quelle: </a:t>
+            </a:r>
+            <a:r>
+              <a:rPr lang="de-DE" sz="900" dirty="0" err="1" smtClean="0"/>
+              <a:t>xpertgate</a:t>
+            </a:r>
+            <a:r>
+              <a:rPr lang="de-DE" sz="900" dirty="0" smtClean="0"/>
+              <a:t>, „induktive Sensoren“, http</a:t>
+            </a:r>
+            <a:r>
+              <a:rPr lang="de-DE" sz="900" dirty="0"/>
+              <a:t>://</a:t>
+            </a:r>
+            <a:r>
+              <a:rPr lang="de-DE" sz="900" dirty="0" smtClean="0"/>
+              <a:t>www.xpertgate.de/produkte/Induktive_Sensoren.html</a:t>
+            </a:r>
+            <a:endParaRPr lang="de-DE" sz="900" dirty="0"/>
           </a:p>
         </p:txBody>
       </p:sp>
@@ -4584,6 +4990,57 @@
           </a:p>
         </p:txBody>
       </p:sp>
+      <p:sp>
+        <p:nvSpPr>
+          <p:cNvPr id="5" name="Rechteck 4"/>
+          <p:cNvSpPr/>
+          <p:nvPr/>
+        </p:nvSpPr>
+        <p:spPr>
+          <a:xfrm>
+            <a:off x="0" y="6504971"/>
+            <a:ext cx="9144000" cy="393539"/>
+          </a:xfrm>
+          <a:prstGeom prst="rect">
+            <a:avLst/>
+          </a:prstGeom>
+          <a:solidFill>
+            <a:schemeClr val="tx1"/>
+          </a:solidFill>
+          <a:ln>
+            <a:noFill/>
+          </a:ln>
+        </p:spPr>
+        <p:style>
+          <a:lnRef idx="2">
+            <a:schemeClr val="accent1">
+              <a:shade val="50000"/>
+            </a:schemeClr>
+          </a:lnRef>
+          <a:fillRef idx="1">
+            <a:schemeClr val="accent1"/>
+          </a:fillRef>
+          <a:effectRef idx="0">
+            <a:schemeClr val="accent1"/>
+          </a:effectRef>
+          <a:fontRef idx="minor">
+            <a:schemeClr val="lt1"/>
+          </a:fontRef>
+        </p:style>
+        <p:txBody>
+          <a:bodyPr rtlCol="0" anchor="ctr"/>
+          <a:lstStyle/>
+          <a:p>
+            <a:r>
+              <a:rPr lang="de-DE" sz="900" dirty="0" smtClean="0"/>
+              <a:t>Antonio Parrotta &amp; Ulf Schmelzer, Embedded Systems Software, Vortrag: Induktive Sensoren 26.10.2015</a:t>
+            </a:r>
+          </a:p>
+          <a:p>
+            <a:endParaRPr lang="de-DE" sz="900" dirty="0"/>
+          </a:p>
+        </p:txBody>
+      </p:sp>
     </p:spTree>
     <p:extLst>
       <p:ext uri="{BB962C8B-B14F-4D97-AF65-F5344CB8AC3E}">
@@ -4701,6 +5158,57 @@
               <a:t>(anpait00@hs-esslingen.de)</a:t>
             </a:r>
             <a:endParaRPr lang="de-DE" dirty="0"/>
+          </a:p>
+        </p:txBody>
+      </p:sp>
+      <p:sp>
+        <p:nvSpPr>
+          <p:cNvPr id="5" name="Rechteck 4"/>
+          <p:cNvSpPr/>
+          <p:nvPr/>
+        </p:nvSpPr>
+        <p:spPr>
+          <a:xfrm>
+            <a:off x="0" y="6504971"/>
+            <a:ext cx="9144000" cy="393539"/>
+          </a:xfrm>
+          <a:prstGeom prst="rect">
+            <a:avLst/>
+          </a:prstGeom>
+          <a:solidFill>
+            <a:schemeClr val="tx1"/>
+          </a:solidFill>
+          <a:ln>
+            <a:noFill/>
+          </a:ln>
+        </p:spPr>
+        <p:style>
+          <a:lnRef idx="2">
+            <a:schemeClr val="accent1">
+              <a:shade val="50000"/>
+            </a:schemeClr>
+          </a:lnRef>
+          <a:fillRef idx="1">
+            <a:schemeClr val="accent1"/>
+          </a:fillRef>
+          <a:effectRef idx="0">
+            <a:schemeClr val="accent1"/>
+          </a:effectRef>
+          <a:fontRef idx="minor">
+            <a:schemeClr val="lt1"/>
+          </a:fontRef>
+        </p:style>
+        <p:txBody>
+          <a:bodyPr rtlCol="0" anchor="ctr"/>
+          <a:lstStyle/>
+          <a:p>
+            <a:r>
+              <a:rPr lang="de-DE" sz="900" dirty="0" smtClean="0"/>
+              <a:t>Antonio Parrotta &amp; Ulf Schmelzer, Embedded Systems Software, Vortrag: Induktive Sensoren 26.10.2015</a:t>
+            </a:r>
+          </a:p>
+          <a:p>
+            <a:endParaRPr lang="de-DE" sz="900" dirty="0"/>
           </a:p>
         </p:txBody>
       </p:sp>

</xml_diff>

<commit_message>
added some stuff to pptx
</commit_message>
<xml_diff>
--- a/induktiv_sensoren.pptx
+++ b/induktiv_sensoren.pptx
@@ -11,9 +11,10 @@
     <p:sldId id="262" r:id="rId5"/>
     <p:sldId id="258" r:id="rId6"/>
     <p:sldId id="260" r:id="rId7"/>
-    <p:sldId id="263" r:id="rId8"/>
-    <p:sldId id="264" r:id="rId9"/>
-    <p:sldId id="261" r:id="rId10"/>
+    <p:sldId id="265" r:id="rId8"/>
+    <p:sldId id="263" r:id="rId9"/>
+    <p:sldId id="264" r:id="rId10"/>
+    <p:sldId id="261" r:id="rId11"/>
   </p:sldIdLst>
   <p:sldSz cx="9144000" cy="6858000" type="screen4x3"/>
   <p:notesSz cx="6858000" cy="9144000"/>
@@ -309,7 +310,7 @@
             <a:fld id="{451DEABC-D766-4322-8E78-B830FAE35C72}" type="datetime4">
               <a:rPr lang="en-US" smtClean="0"/>
               <a:pPr/>
-              <a:t>October 25, 2015</a:t>
+              <a:t>Oktober 25, 2015</a:t>
             </a:fld>
             <a:endParaRPr lang="en-US" dirty="0"/>
           </a:p>
@@ -576,7 +577,7 @@
             <a:fld id="{F3131F9E-604E-4343-9F29-EF72E8231CAD}" type="datetime4">
               <a:rPr lang="en-US" smtClean="0"/>
               <a:pPr/>
-              <a:t>October 25, 2015</a:t>
+              <a:t>Oktober 25, 2015</a:t>
             </a:fld>
             <a:endParaRPr lang="en-US"/>
           </a:p>
@@ -753,7 +754,7 @@
             <a:fld id="{34A8E1CE-37F8-4102-8DF9-852A0A51F293}" type="datetime4">
               <a:rPr lang="en-US" smtClean="0"/>
               <a:pPr/>
-              <a:t>October 25, 2015</a:t>
+              <a:t>Oktober 25, 2015</a:t>
             </a:fld>
             <a:endParaRPr lang="en-US"/>
           </a:p>
@@ -920,7 +921,7 @@
             <a:fld id="{93333F43-3E86-47E4-BFBB-2476D384E1C6}" type="datetime4">
               <a:rPr lang="en-US" smtClean="0"/>
               <a:pPr/>
-              <a:t>October 25, 2015</a:t>
+              <a:t>Oktober 25, 2015</a:t>
             </a:fld>
             <a:endParaRPr lang="en-US"/>
           </a:p>
@@ -1171,7 +1172,7 @@
             <a:fld id="{751663BA-01FC-4367-B6F3-ABB2645D55F1}" type="datetime4">
               <a:rPr lang="en-US" smtClean="0"/>
               <a:pPr/>
-              <a:t>October 25, 2015</a:t>
+              <a:t>Oktober 25, 2015</a:t>
             </a:fld>
             <a:endParaRPr lang="en-US" dirty="0"/>
           </a:p>
@@ -1456,7 +1457,7 @@
             <a:fld id="{79B19C71-EC74-44AF-B27E-FC7DC3C3A61D}" type="datetime4">
               <a:rPr lang="en-US" smtClean="0"/>
               <a:pPr/>
-              <a:t>October 25, 2015</a:t>
+              <a:t>Oktober 25, 2015</a:t>
             </a:fld>
             <a:endParaRPr lang="en-US"/>
           </a:p>
@@ -1897,7 +1898,7 @@
             <a:fld id="{6A5CDA29-3CBE-48EA-92AE-A996835462BA}" type="datetime4">
               <a:rPr lang="en-US" smtClean="0"/>
               <a:pPr/>
-              <a:t>October 25, 2015</a:t>
+              <a:t>Oktober 25, 2015</a:t>
             </a:fld>
             <a:endParaRPr lang="en-US"/>
           </a:p>
@@ -2012,7 +2013,7 @@
             <a:fld id="{E29EC054-3869-4501-B163-1BBFDE8DCE04}" type="datetime4">
               <a:rPr lang="en-US" smtClean="0"/>
               <a:pPr/>
-              <a:t>October 25, 2015</a:t>
+              <a:t>Oktober 25, 2015</a:t>
             </a:fld>
             <a:endParaRPr lang="en-US"/>
           </a:p>
@@ -2104,7 +2105,7 @@
             <a:fld id="{0A63D831-56C1-49CF-8EF7-8B9A98402BCD}" type="datetime4">
               <a:rPr lang="en-US" smtClean="0"/>
               <a:pPr/>
-              <a:t>October 25, 2015</a:t>
+              <a:t>Oktober 25, 2015</a:t>
             </a:fld>
             <a:endParaRPr lang="en-US"/>
           </a:p>
@@ -2348,7 +2349,7 @@
             <a:fld id="{6EAD5615-7F4F-4584-84D5-CC95918C321F}" type="datetime4">
               <a:rPr lang="en-US" smtClean="0"/>
               <a:pPr/>
-              <a:t>October 25, 2015</a:t>
+              <a:t>Oktober 25, 2015</a:t>
             </a:fld>
             <a:endParaRPr lang="en-US"/>
           </a:p>
@@ -2644,7 +2645,7 @@
             <a:fld id="{76EEA923-9BEE-48CE-9F28-5B525F399BAD}" type="datetime4">
               <a:rPr lang="en-US" smtClean="0"/>
               <a:pPr/>
-              <a:t>October 25, 2015</a:t>
+              <a:t>Oktober 25, 2015</a:t>
             </a:fld>
             <a:endParaRPr lang="en-US"/>
           </a:p>
@@ -2940,7 +2941,7 @@
             <a:fld id="{17D0EFEE-2756-4A20-BF2A-63F0A94F99AC}" type="datetime4">
               <a:rPr lang="en-US" smtClean="0"/>
               <a:pPr/>
-              <a:t>October 25, 2015</a:t>
+              <a:t>Oktober 25, 2015</a:t>
             </a:fld>
             <a:endParaRPr lang="en-US" dirty="0"/>
           </a:p>
@@ -3476,11 +3477,7 @@
           <a:p>
             <a:r>
               <a:rPr lang="de-DE" dirty="0" smtClean="0"/>
-              <a:t>Antonio Parrotta &amp; Ulf </a:t>
-            </a:r>
-            <a:r>
-              <a:rPr lang="de-DE" dirty="0" smtClean="0"/>
-              <a:t>Schmelzer</a:t>
+              <a:t>Antonio Parrotta &amp; Ulf Schmelzer</a:t>
             </a:r>
           </a:p>
           <a:p>
@@ -3488,7 +3485,6 @@
               <a:rPr lang="de-DE" dirty="0" smtClean="0"/>
               <a:t>Embedded Systems Software</a:t>
             </a:r>
-            <a:endParaRPr lang="de-DE" dirty="0" smtClean="0"/>
           </a:p>
           <a:p>
             <a:r>
@@ -3563,14 +3559,14 @@
   <p:timing>
     <p:tnLst>
       <p:par>
-        <p:cTn id="1" dur="indefinite" restart="never" nodeType="tmRoot"/>
+        <p:cTn xmlns:p14="http://schemas.microsoft.com/office/powerpoint/2010/main" id="1" dur="indefinite" restart="never" nodeType="tmRoot"/>
       </p:par>
     </p:tnLst>
   </p:timing>
 </p:sld>
 </file>
 
-<file path=ppt/slides/slide2.xml><?xml version="1.0" encoding="utf-8"?>
+<file path=ppt/slides/slide10.xml><?xml version="1.0" encoding="utf-8"?>
 <p:sld xmlns:a="http://schemas.openxmlformats.org/drawingml/2006/main" xmlns:r="http://schemas.openxmlformats.org/officeDocument/2006/relationships" xmlns:p="http://schemas.openxmlformats.org/presentationml/2006/main">
   <p:cSld>
     <p:spTree>
@@ -3599,12 +3595,14 @@
         </p:nvSpPr>
         <p:spPr/>
         <p:txBody>
-          <a:bodyPr/>
-          <a:lstStyle/>
-          <a:p>
-            <a:r>
-              <a:rPr lang="de-DE" dirty="0" smtClean="0"/>
-              <a:t>Geschichte</a:t>
+          <a:bodyPr>
+            <a:normAutofit fontScale="90000"/>
+          </a:bodyPr>
+          <a:lstStyle/>
+          <a:p>
+            <a:r>
+              <a:rPr lang="de-DE" dirty="0" smtClean="0"/>
+              <a:t>Vielen dank für ihre Aufmerksamkeit</a:t>
             </a:r>
             <a:endParaRPr lang="de-DE" dirty="0"/>
           </a:p>
@@ -3625,55 +3623,51 @@
           <a:bodyPr/>
           <a:lstStyle/>
           <a:p>
-            <a:pPr marL="342900" indent="-342900">
-              <a:buFontTx/>
-              <a:buChar char="-"/>
-            </a:pPr>
+            <a:r>
+              <a:rPr lang="de-DE" dirty="0" smtClean="0"/>
+              <a:t>Fragen?</a:t>
+            </a:r>
+          </a:p>
+          <a:p>
+            <a:endParaRPr lang="de-DE" dirty="0"/>
+          </a:p>
+          <a:p>
             <a:endParaRPr lang="de-DE" dirty="0" smtClean="0"/>
           </a:p>
           <a:p>
-            <a:pPr marL="342900" indent="-342900">
-              <a:buFontTx/>
-              <a:buChar char="-"/>
-            </a:pPr>
             <a:endParaRPr lang="de-DE" dirty="0"/>
           </a:p>
           <a:p>
-            <a:pPr marL="342900" indent="-342900">
-              <a:buFontTx/>
-              <a:buChar char="-"/>
-            </a:pPr>
-            <a:r>
-              <a:rPr lang="de-DE" dirty="0" smtClean="0"/>
-              <a:t>Entwicklung durch </a:t>
+            <a:endParaRPr lang="de-DE" dirty="0" smtClean="0"/>
+          </a:p>
+          <a:p>
+            <a:r>
+              <a:rPr lang="de-DE" dirty="0" smtClean="0"/>
+              <a:t>Kontakt:</a:t>
+            </a:r>
+          </a:p>
+          <a:p>
+            <a:r>
+              <a:rPr lang="de-DE" dirty="0" smtClean="0"/>
+              <a:t>Ulf Schmelzer (ulscit01@hs-esslingen.de)</a:t>
+            </a:r>
+          </a:p>
+          <a:p>
+            <a:r>
+              <a:rPr lang="de-DE" dirty="0" smtClean="0"/>
+              <a:t>Antonio </a:t>
             </a:r>
             <a:r>
               <a:rPr lang="de-DE" dirty="0" err="1" smtClean="0"/>
-              <a:t>Pepperl</a:t>
-            </a:r>
-            <a:r>
-              <a:rPr lang="de-DE" dirty="0" smtClean="0"/>
-              <a:t> und Fuchs</a:t>
-            </a:r>
-          </a:p>
-          <a:p>
-            <a:pPr marL="342900" indent="-342900">
-              <a:buFontTx/>
-              <a:buChar char="-"/>
-            </a:pPr>
-            <a:r>
-              <a:rPr lang="de-DE" dirty="0" smtClean="0"/>
-              <a:t>Anfrage durch BASF</a:t>
-            </a:r>
-          </a:p>
-          <a:p>
-            <a:pPr marL="342900" indent="-342900">
-              <a:buFontTx/>
-              <a:buChar char="-"/>
-            </a:pPr>
-            <a:r>
-              <a:rPr lang="de-DE" dirty="0" smtClean="0"/>
-              <a:t>Ablösung mechanischer Schalter</a:t>
+              <a:t>Parrotta</a:t>
+            </a:r>
+            <a:r>
+              <a:rPr lang="de-DE" dirty="0"/>
+              <a:t> </a:t>
+            </a:r>
+            <a:r>
+              <a:rPr lang="de-DE" dirty="0" smtClean="0"/>
+              <a:t>(anpait00@hs-esslingen.de)</a:t>
             </a:r>
             <a:endParaRPr lang="de-DE" dirty="0"/>
           </a:p>
@@ -3726,54 +3720,24 @@
             </a:r>
           </a:p>
           <a:p>
-            <a:r>
-              <a:rPr lang="de-DE" sz="900" dirty="0" smtClean="0"/>
-              <a:t>Quelle: </a:t>
-            </a:r>
-            <a:r>
-              <a:rPr lang="de-DE" sz="900" dirty="0" err="1" smtClean="0"/>
-              <a:t>process.vogel</a:t>
-            </a:r>
-            <a:r>
-              <a:rPr lang="de-DE" sz="900" dirty="0" smtClean="0"/>
-              <a:t>, „Vergangenheit und Zukunft des </a:t>
-            </a:r>
-            <a:r>
-              <a:rPr lang="de-DE" sz="900" dirty="0"/>
-              <a:t>induktiven </a:t>
-            </a:r>
-            <a:r>
-              <a:rPr lang="de-DE" sz="900" dirty="0" smtClean="0"/>
-              <a:t>Näherungsschalters“, </a:t>
-            </a:r>
-            <a:r>
-              <a:rPr lang="de-DE" sz="900" dirty="0"/>
-              <a:t>http://www.process.vogel.de/automatisierung_prozessleittechnik/articles/145538/</a:t>
-            </a:r>
+            <a:endParaRPr lang="de-DE" sz="900" dirty="0"/>
           </a:p>
         </p:txBody>
       </p:sp>
     </p:spTree>
     <p:extLst>
       <p:ext uri="{BB962C8B-B14F-4D97-AF65-F5344CB8AC3E}">
-        <p14:creationId xmlns:p14="http://schemas.microsoft.com/office/powerpoint/2010/main" val="2516342943"/>
+        <p14:creationId xmlns:p14="http://schemas.microsoft.com/office/powerpoint/2010/main" val="202598775"/>
       </p:ext>
     </p:extLst>
   </p:cSld>
   <p:clrMapOvr>
     <a:masterClrMapping/>
   </p:clrMapOvr>
-  <p:timing>
-    <p:tnLst>
-      <p:par>
-        <p:cTn id="1" dur="indefinite" restart="never" nodeType="tmRoot"/>
-      </p:par>
-    </p:tnLst>
-  </p:timing>
 </p:sld>
 </file>
 
-<file path=ppt/slides/slide3.xml><?xml version="1.0" encoding="utf-8"?>
+<file path=ppt/slides/slide2.xml><?xml version="1.0" encoding="utf-8"?>
 <p:sld xmlns:a="http://schemas.openxmlformats.org/drawingml/2006/main" xmlns:r="http://schemas.openxmlformats.org/officeDocument/2006/relationships" xmlns:p="http://schemas.openxmlformats.org/presentationml/2006/main">
   <p:cSld>
     <p:spTree>
@@ -3807,7 +3771,7 @@
           <a:p>
             <a:r>
               <a:rPr lang="de-DE" dirty="0" smtClean="0"/>
-              <a:t>Aufbau</a:t>
+              <a:t>Geschichte</a:t>
             </a:r>
             <a:endParaRPr lang="de-DE" dirty="0"/>
           </a:p>
@@ -3823,66 +3787,10 @@
             <p:ph idx="1"/>
           </p:nvPr>
         </p:nvSpPr>
-        <p:spPr>
-          <a:xfrm>
-            <a:off x="457200" y="1752600"/>
-            <a:ext cx="4114800" cy="4373563"/>
-          </a:xfrm>
-        </p:spPr>
-        <p:txBody>
-          <a:bodyPr/>
-          <a:lstStyle/>
-          <a:p>
-            <a:pPr marL="342900" indent="-342900">
-              <a:buFontTx/>
-              <a:buChar char="-"/>
-            </a:pPr>
-            <a:r>
-              <a:rPr lang="de-DE" dirty="0" smtClean="0"/>
-              <a:t>Durch Spule erzeugtes Wechselfeld</a:t>
-            </a:r>
-          </a:p>
-          <a:p>
-            <a:pPr marL="342900" indent="-342900">
-              <a:buFontTx/>
-              <a:buChar char="-"/>
-            </a:pPr>
-            <a:r>
-              <a:rPr lang="de-DE" dirty="0" smtClean="0"/>
-              <a:t>Richten des Magnetfelds </a:t>
-            </a:r>
-          </a:p>
-          <a:p>
-            <a:r>
-              <a:rPr lang="de-DE" dirty="0"/>
-              <a:t> </a:t>
-            </a:r>
-            <a:r>
-              <a:rPr lang="de-DE" dirty="0" smtClean="0"/>
-              <a:t>    Durch Ferrit Kern</a:t>
-            </a:r>
-            <a:endParaRPr lang="de-DE" dirty="0"/>
-          </a:p>
-          <a:p>
-            <a:pPr marL="342900" indent="-342900">
-              <a:buFontTx/>
-              <a:buChar char="-"/>
-            </a:pPr>
-            <a:r>
-              <a:rPr lang="de-DE" dirty="0" smtClean="0"/>
-              <a:t>Gehäuse zum Schutz gegen </a:t>
-            </a:r>
-          </a:p>
-          <a:p>
-            <a:r>
-              <a:rPr lang="de-DE" dirty="0"/>
-              <a:t> </a:t>
-            </a:r>
-            <a:r>
-              <a:rPr lang="de-DE" dirty="0" smtClean="0"/>
-              <a:t>     mechanische Einflüsse</a:t>
-            </a:r>
-          </a:p>
+        <p:spPr/>
+        <p:txBody>
+          <a:bodyPr/>
+          <a:lstStyle/>
           <a:p>
             <a:pPr marL="342900" indent="-342900">
               <a:buFontTx/>
@@ -3890,40 +3798,57 @@
             </a:pPr>
             <a:endParaRPr lang="de-DE" dirty="0" smtClean="0"/>
           </a:p>
-        </p:txBody>
-      </p:sp>
-      <p:pic>
-        <p:nvPicPr>
-          <p:cNvPr id="4" name="Bild 3" descr="magnetfeld_sensor.PNG"/>
-          <p:cNvPicPr>
-            <a:picLocks noChangeAspect="1"/>
-          </p:cNvPicPr>
-          <p:nvPr/>
-        </p:nvPicPr>
-        <p:blipFill rotWithShape="1">
-          <a:blip r:embed="rId2" cstate="email">
-            <a:extLst>
-              <a:ext uri="{28A0092B-C50C-407E-A947-70E740481C1C}">
-                <a14:useLocalDpi xmlns:a14="http://schemas.microsoft.com/office/drawing/2010/main" val="0"/>
-              </a:ext>
-            </a:extLst>
-          </a:blip>
-          <a:srcRect l="11023" r="8386"/>
-          <a:stretch/>
-        </p:blipFill>
-        <p:spPr>
-          <a:xfrm>
-            <a:off x="4572000" y="1752600"/>
-            <a:ext cx="4102100" cy="4499394"/>
-          </a:xfrm>
-          <a:prstGeom prst="rect">
-            <a:avLst/>
-          </a:prstGeom>
-        </p:spPr>
-      </p:pic>
-      <p:sp>
-        <p:nvSpPr>
-          <p:cNvPr id="6" name="Rechteck 5"/>
+          <a:p>
+            <a:pPr marL="342900" indent="-342900">
+              <a:buFontTx/>
+              <a:buChar char="-"/>
+            </a:pPr>
+            <a:endParaRPr lang="de-DE" dirty="0"/>
+          </a:p>
+          <a:p>
+            <a:pPr marL="342900" indent="-342900">
+              <a:buFontTx/>
+              <a:buChar char="-"/>
+            </a:pPr>
+            <a:r>
+              <a:rPr lang="de-DE" dirty="0" smtClean="0"/>
+              <a:t>Entwicklung durch </a:t>
+            </a:r>
+            <a:r>
+              <a:rPr lang="de-DE" dirty="0" err="1" smtClean="0"/>
+              <a:t>Pepperl</a:t>
+            </a:r>
+            <a:r>
+              <a:rPr lang="de-DE" dirty="0" smtClean="0"/>
+              <a:t> und Fuchs</a:t>
+            </a:r>
+          </a:p>
+          <a:p>
+            <a:pPr marL="342900" indent="-342900">
+              <a:buFontTx/>
+              <a:buChar char="-"/>
+            </a:pPr>
+            <a:r>
+              <a:rPr lang="de-DE" dirty="0" smtClean="0"/>
+              <a:t>Anfrage durch BASF</a:t>
+            </a:r>
+          </a:p>
+          <a:p>
+            <a:pPr marL="342900" indent="-342900">
+              <a:buFontTx/>
+              <a:buChar char="-"/>
+            </a:pPr>
+            <a:r>
+              <a:rPr lang="de-DE" dirty="0" smtClean="0"/>
+              <a:t>Ablösung mechanischer Schalter</a:t>
+            </a:r>
+            <a:endParaRPr lang="de-DE" dirty="0"/>
+          </a:p>
+        </p:txBody>
+      </p:sp>
+      <p:sp>
+        <p:nvSpPr>
+          <p:cNvPr id="5" name="Rechteck 4"/>
           <p:cNvSpPr/>
           <p:nvPr/>
         </p:nvSpPr>
@@ -3974,6 +3899,248 @@
             </a:r>
             <a:r>
               <a:rPr lang="de-DE" sz="900" dirty="0" err="1" smtClean="0"/>
+              <a:t>process.vogel</a:t>
+            </a:r>
+            <a:r>
+              <a:rPr lang="de-DE" sz="900" dirty="0" smtClean="0"/>
+              <a:t>, „Vergangenheit und Zukunft des </a:t>
+            </a:r>
+            <a:r>
+              <a:rPr lang="de-DE" sz="900" dirty="0"/>
+              <a:t>induktiven </a:t>
+            </a:r>
+            <a:r>
+              <a:rPr lang="de-DE" sz="900" dirty="0" smtClean="0"/>
+              <a:t>Näherungsschalters“, </a:t>
+            </a:r>
+            <a:r>
+              <a:rPr lang="de-DE" sz="900" dirty="0"/>
+              <a:t>http://www.process.vogel.de/automatisierung_prozessleittechnik/articles/145538/</a:t>
+            </a:r>
+          </a:p>
+        </p:txBody>
+      </p:sp>
+    </p:spTree>
+    <p:extLst>
+      <p:ext uri="{BB962C8B-B14F-4D97-AF65-F5344CB8AC3E}">
+        <p14:creationId xmlns:p14="http://schemas.microsoft.com/office/powerpoint/2010/main" val="2516342943"/>
+      </p:ext>
+    </p:extLst>
+  </p:cSld>
+  <p:clrMapOvr>
+    <a:masterClrMapping/>
+  </p:clrMapOvr>
+  <p:timing>
+    <p:tnLst>
+      <p:par>
+        <p:cTn xmlns:p14="http://schemas.microsoft.com/office/powerpoint/2010/main" id="1" dur="indefinite" restart="never" nodeType="tmRoot"/>
+      </p:par>
+    </p:tnLst>
+  </p:timing>
+</p:sld>
+</file>
+
+<file path=ppt/slides/slide3.xml><?xml version="1.0" encoding="utf-8"?>
+<p:sld xmlns:a="http://schemas.openxmlformats.org/drawingml/2006/main" xmlns:r="http://schemas.openxmlformats.org/officeDocument/2006/relationships" xmlns:p="http://schemas.openxmlformats.org/presentationml/2006/main">
+  <p:cSld>
+    <p:spTree>
+      <p:nvGrpSpPr>
+        <p:cNvPr id="1" name=""/>
+        <p:cNvGrpSpPr/>
+        <p:nvPr/>
+      </p:nvGrpSpPr>
+      <p:grpSpPr>
+        <a:xfrm>
+          <a:off x="0" y="0"/>
+          <a:ext cx="0" cy="0"/>
+          <a:chOff x="0" y="0"/>
+          <a:chExt cx="0" cy="0"/>
+        </a:xfrm>
+      </p:grpSpPr>
+      <p:sp>
+        <p:nvSpPr>
+          <p:cNvPr id="2" name="Titel 1"/>
+          <p:cNvSpPr>
+            <a:spLocks noGrp="1"/>
+          </p:cNvSpPr>
+          <p:nvPr>
+            <p:ph type="title"/>
+          </p:nvPr>
+        </p:nvSpPr>
+        <p:spPr/>
+        <p:txBody>
+          <a:bodyPr/>
+          <a:lstStyle/>
+          <a:p>
+            <a:r>
+              <a:rPr lang="de-DE" dirty="0" smtClean="0"/>
+              <a:t>Aufbau</a:t>
+            </a:r>
+            <a:endParaRPr lang="de-DE" dirty="0"/>
+          </a:p>
+        </p:txBody>
+      </p:sp>
+      <p:sp>
+        <p:nvSpPr>
+          <p:cNvPr id="3" name="Inhaltsplatzhalter 2"/>
+          <p:cNvSpPr>
+            <a:spLocks noGrp="1"/>
+          </p:cNvSpPr>
+          <p:nvPr>
+            <p:ph idx="1"/>
+          </p:nvPr>
+        </p:nvSpPr>
+        <p:spPr>
+          <a:xfrm>
+            <a:off x="457200" y="1752600"/>
+            <a:ext cx="4114800" cy="4373563"/>
+          </a:xfrm>
+        </p:spPr>
+        <p:txBody>
+          <a:bodyPr/>
+          <a:lstStyle/>
+          <a:p>
+            <a:pPr marL="342900" indent="-342900">
+              <a:buFontTx/>
+              <a:buChar char="-"/>
+            </a:pPr>
+            <a:r>
+              <a:rPr lang="de-DE" dirty="0" smtClean="0"/>
+              <a:t>Durch Spule erzeugtes Wechselfeld</a:t>
+            </a:r>
+          </a:p>
+          <a:p>
+            <a:pPr marL="342900" indent="-342900">
+              <a:buFontTx/>
+              <a:buChar char="-"/>
+            </a:pPr>
+            <a:r>
+              <a:rPr lang="de-DE" dirty="0" smtClean="0"/>
+              <a:t>Richten des Magnetfelds </a:t>
+            </a:r>
+          </a:p>
+          <a:p>
+            <a:r>
+              <a:rPr lang="de-DE" dirty="0"/>
+              <a:t> </a:t>
+            </a:r>
+            <a:r>
+              <a:rPr lang="de-DE" dirty="0" smtClean="0"/>
+              <a:t>    Durch Ferrit Kern</a:t>
+            </a:r>
+            <a:endParaRPr lang="de-DE" dirty="0"/>
+          </a:p>
+          <a:p>
+            <a:pPr marL="342900" indent="-342900">
+              <a:buFontTx/>
+              <a:buChar char="-"/>
+            </a:pPr>
+            <a:r>
+              <a:rPr lang="de-DE" dirty="0" smtClean="0"/>
+              <a:t>Gehäuse zum Schutz gegen </a:t>
+            </a:r>
+          </a:p>
+          <a:p>
+            <a:r>
+              <a:rPr lang="de-DE" dirty="0"/>
+              <a:t> </a:t>
+            </a:r>
+            <a:r>
+              <a:rPr lang="de-DE" dirty="0" smtClean="0"/>
+              <a:t>     mechanische Einflüsse</a:t>
+            </a:r>
+          </a:p>
+          <a:p>
+            <a:pPr marL="342900" indent="-342900">
+              <a:buFontTx/>
+              <a:buChar char="-"/>
+            </a:pPr>
+            <a:endParaRPr lang="de-DE" dirty="0" smtClean="0"/>
+          </a:p>
+        </p:txBody>
+      </p:sp>
+      <p:pic>
+        <p:nvPicPr>
+          <p:cNvPr id="4" name="Bild 3" descr="magnetfeld_sensor.PNG"/>
+          <p:cNvPicPr>
+            <a:picLocks noChangeAspect="1"/>
+          </p:cNvPicPr>
+          <p:nvPr/>
+        </p:nvPicPr>
+        <p:blipFill rotWithShape="1">
+          <a:blip r:embed="rId2" cstate="email">
+            <a:extLst>
+              <a:ext uri="{28A0092B-C50C-407E-A947-70E740481C1C}">
+                <a14:useLocalDpi xmlns:a14="http://schemas.microsoft.com/office/drawing/2010/main" val="0"/>
+              </a:ext>
+            </a:extLst>
+          </a:blip>
+          <a:srcRect l="11023" r="8386"/>
+          <a:stretch/>
+        </p:blipFill>
+        <p:spPr>
+          <a:xfrm>
+            <a:off x="4572000" y="1752600"/>
+            <a:ext cx="4102100" cy="4499394"/>
+          </a:xfrm>
+          <a:prstGeom prst="rect">
+            <a:avLst/>
+          </a:prstGeom>
+        </p:spPr>
+      </p:pic>
+      <p:sp>
+        <p:nvSpPr>
+          <p:cNvPr id="6" name="Rechteck 5"/>
+          <p:cNvSpPr/>
+          <p:nvPr/>
+        </p:nvSpPr>
+        <p:spPr>
+          <a:xfrm>
+            <a:off x="0" y="6504971"/>
+            <a:ext cx="9144000" cy="393539"/>
+          </a:xfrm>
+          <a:prstGeom prst="rect">
+            <a:avLst/>
+          </a:prstGeom>
+          <a:solidFill>
+            <a:schemeClr val="tx1"/>
+          </a:solidFill>
+          <a:ln>
+            <a:noFill/>
+          </a:ln>
+        </p:spPr>
+        <p:style>
+          <a:lnRef idx="2">
+            <a:schemeClr val="accent1">
+              <a:shade val="50000"/>
+            </a:schemeClr>
+          </a:lnRef>
+          <a:fillRef idx="1">
+            <a:schemeClr val="accent1"/>
+          </a:fillRef>
+          <a:effectRef idx="0">
+            <a:schemeClr val="accent1"/>
+          </a:effectRef>
+          <a:fontRef idx="minor">
+            <a:schemeClr val="lt1"/>
+          </a:fontRef>
+        </p:style>
+        <p:txBody>
+          <a:bodyPr rtlCol="0" anchor="ctr"/>
+          <a:lstStyle/>
+          <a:p>
+            <a:r>
+              <a:rPr lang="de-DE" sz="900" dirty="0" smtClean="0"/>
+              <a:t>Antonio Parrotta &amp; Ulf Schmelzer, Embedded Systems Software, Vortrag: Induktive Sensoren 26.10.2015</a:t>
+            </a:r>
+          </a:p>
+          <a:p>
+            <a:r>
+              <a:rPr lang="de-DE" sz="900" dirty="0" smtClean="0"/>
+              <a:t>Quelle: </a:t>
+            </a:r>
+            <a:r>
+              <a:rPr lang="de-DE" sz="900" dirty="0" err="1" smtClean="0"/>
               <a:t>ifm</a:t>
             </a:r>
             <a:r>
@@ -4000,7 +4167,7 @@
   <p:timing>
     <p:tnLst>
       <p:par>
-        <p:cTn id="1" dur="indefinite" restart="never" nodeType="tmRoot"/>
+        <p:cTn xmlns:p14="http://schemas.microsoft.com/office/powerpoint/2010/main" id="1" dur="indefinite" restart="never" nodeType="tmRoot"/>
       </p:par>
     </p:tnLst>
   </p:timing>
@@ -4435,6 +4602,17 @@
               <a:rPr lang="de-DE" dirty="0" smtClean="0"/>
               <a:t>Funktionsprinzip</a:t>
             </a:r>
+            <a:br>
+              <a:rPr lang="de-DE" dirty="0" smtClean="0"/>
+            </a:br>
+            <a:r>
+              <a:rPr lang="de-DE" dirty="0" smtClean="0"/>
+              <a:t>binär </a:t>
+            </a:r>
+            <a:r>
+              <a:rPr lang="de-DE" dirty="0" err="1" smtClean="0"/>
+              <a:t>sensor</a:t>
+            </a:r>
             <a:endParaRPr lang="de-DE" dirty="0"/>
           </a:p>
         </p:txBody>
@@ -4452,7 +4630,7 @@
         <p:spPr>
           <a:xfrm>
             <a:off x="457200" y="1752600"/>
-            <a:ext cx="5259150" cy="4373563"/>
+            <a:ext cx="4964982" cy="4373563"/>
           </a:xfrm>
         </p:spPr>
         <p:txBody>
@@ -4464,8 +4642,19 @@
             </a:pPr>
             <a:r>
               <a:rPr lang="de-DE" dirty="0" smtClean="0"/>
+              <a:t>Oszillator erzeugt Wechselfeld mit 100 kHz bis 1 MHz</a:t>
+            </a:r>
+            <a:endParaRPr lang="de-DE" dirty="0" smtClean="0"/>
+          </a:p>
+          <a:p>
+            <a:pPr marL="457200" indent="-457200">
+              <a:buAutoNum type="arabicPeriod"/>
+            </a:pPr>
+            <a:r>
+              <a:rPr lang="de-DE" dirty="0" smtClean="0"/>
               <a:t>Target nähert sich</a:t>
             </a:r>
+            <a:endParaRPr lang="de-DE" dirty="0" smtClean="0"/>
           </a:p>
           <a:p>
             <a:pPr marL="457200" indent="-457200">
@@ -4525,8 +4714,8 @@
         </p:blipFill>
         <p:spPr>
           <a:xfrm flipH="1">
-            <a:off x="6342402" y="1622527"/>
-            <a:ext cx="1363425" cy="3254914"/>
+            <a:off x="6074903" y="1266926"/>
+            <a:ext cx="1643624" cy="3923835"/>
           </a:xfrm>
           <a:prstGeom prst="rect">
             <a:avLst/>
@@ -4541,7 +4730,7 @@
         </p:nvSpPr>
         <p:spPr>
           <a:xfrm>
-            <a:off x="5422182" y="1796152"/>
+            <a:off x="5528123" y="2705100"/>
             <a:ext cx="826218" cy="369332"/>
           </a:xfrm>
           <a:prstGeom prst="rect">
@@ -4570,9 +4759,9 @@
           <p:nvPr/>
         </p:nvCxnSpPr>
         <p:spPr>
-          <a:xfrm>
-            <a:off x="6062203" y="2211784"/>
-            <a:ext cx="280199" cy="289079"/>
+          <a:xfrm flipV="1">
+            <a:off x="5941232" y="2500863"/>
+            <a:ext cx="197171" cy="191537"/>
           </a:xfrm>
           <a:prstGeom prst="straightConnector1">
             <a:avLst/>
@@ -4611,8 +4800,8 @@
         </p:blipFill>
         <p:spPr>
           <a:xfrm>
-            <a:off x="5941232" y="4260923"/>
-            <a:ext cx="2135968" cy="1803805"/>
+            <a:off x="5638800" y="4005522"/>
+            <a:ext cx="2844800" cy="2402407"/>
           </a:xfrm>
           <a:prstGeom prst="rect">
             <a:avLst/>
@@ -4732,96 +4921,150 @@
           <a:p>
             <a:r>
               <a:rPr lang="de-DE" dirty="0" smtClean="0"/>
-              <a:t>VOR-</a:t>
+              <a:t>Beispiel </a:t>
+            </a:r>
+            <a:r>
+              <a:rPr lang="de-DE" dirty="0" err="1" smtClean="0"/>
+              <a:t>sensor</a:t>
+            </a:r>
+            <a:endParaRPr lang="de-DE" dirty="0"/>
+          </a:p>
+        </p:txBody>
+      </p:sp>
+      <p:pic>
+        <p:nvPicPr>
+          <p:cNvPr id="8" name="Bild 7"/>
+          <p:cNvPicPr>
+            <a:picLocks noChangeAspect="1"/>
+          </p:cNvPicPr>
+          <p:nvPr/>
+        </p:nvPicPr>
+        <p:blipFill>
+          <a:blip r:embed="rId2"/>
+          <a:stretch>
+            <a:fillRect/>
+          </a:stretch>
+        </p:blipFill>
+        <p:spPr>
+          <a:xfrm>
+            <a:off x="6339838" y="1968500"/>
+            <a:ext cx="1647554" cy="4178300"/>
+          </a:xfrm>
+          <a:prstGeom prst="rect">
+            <a:avLst/>
+          </a:prstGeom>
+        </p:spPr>
+      </p:pic>
+      <p:sp>
+        <p:nvSpPr>
+          <p:cNvPr id="9" name="Textfeld 8"/>
+          <p:cNvSpPr txBox="1"/>
+          <p:nvPr/>
+        </p:nvSpPr>
+        <p:spPr>
+          <a:xfrm>
+            <a:off x="635000" y="1859339"/>
+            <a:ext cx="4352474" cy="3139321"/>
+          </a:xfrm>
+          <a:prstGeom prst="rect">
+            <a:avLst/>
+          </a:prstGeom>
+          <a:noFill/>
+        </p:spPr>
+        <p:txBody>
+          <a:bodyPr wrap="none" rtlCol="0">
+            <a:spAutoFit/>
+          </a:bodyPr>
+          <a:lstStyle/>
+          <a:p>
+            <a:r>
+              <a:rPr lang="de-DE" dirty="0"/>
+              <a:t/>
             </a:r>
             <a:br>
-              <a:rPr lang="de-DE" dirty="0" smtClean="0"/>
+              <a:rPr lang="de-DE" dirty="0"/>
             </a:br>
             <a:r>
-              <a:rPr lang="de-DE" dirty="0" smtClean="0"/>
-              <a:t>und Nachteile</a:t>
-            </a:r>
-            <a:endParaRPr lang="de-DE" dirty="0"/>
-          </a:p>
-        </p:txBody>
-      </p:sp>
-      <p:sp>
-        <p:nvSpPr>
-          <p:cNvPr id="3" name="Inhaltsplatzhalter 2"/>
-          <p:cNvSpPr>
-            <a:spLocks noGrp="1"/>
-          </p:cNvSpPr>
-          <p:nvPr>
-            <p:ph idx="1"/>
-          </p:nvPr>
-        </p:nvSpPr>
-        <p:spPr/>
-        <p:txBody>
-          <a:bodyPr>
-            <a:normAutofit fontScale="92500" lnSpcReduction="10000"/>
-          </a:bodyPr>
-          <a:lstStyle/>
-          <a:p>
-            <a:r>
               <a:rPr lang="de-DE" dirty="0"/>
-              <a:t>Wiederholgenauigkeit, sehr hohe Zuverlässigkeit und kompakte </a:t>
-            </a:r>
-            <a:r>
-              <a:rPr lang="de-DE" dirty="0" smtClean="0"/>
-              <a:t>Bauart</a:t>
-            </a:r>
-          </a:p>
-          <a:p>
+              <a:t>• Maße: </a:t>
+            </a:r>
+            <a:r>
+              <a:rPr lang="de-DE" dirty="0" smtClean="0"/>
+              <a:t>M12</a:t>
+            </a:r>
             <a:r>
               <a:rPr lang="de-DE" dirty="0"/>
-              <a:t>unempfindlich gegenüber Einflüssen wie Beleuchtung, Schall, Temperaturschwankungen oder </a:t>
-            </a:r>
-            <a:r>
-              <a:rPr lang="de-DE" dirty="0" smtClean="0"/>
-              <a:t>Feuchtigkeit</a:t>
-            </a:r>
-          </a:p>
-          <a:p>
-            <a:r>
-              <a:rPr lang="de-DE" dirty="0" smtClean="0"/>
-              <a:t>Schmutzunempfindlicher als optische Sensoren</a:t>
-            </a:r>
-          </a:p>
-          <a:p>
-            <a:r>
-              <a:rPr lang="de-DE" dirty="0" smtClean="0"/>
-              <a:t>Berührungsfrei</a:t>
-            </a:r>
-          </a:p>
-          <a:p>
-            <a:endParaRPr lang="de-DE" dirty="0"/>
-          </a:p>
-          <a:p>
-            <a:r>
-              <a:rPr lang="de-DE" dirty="0" smtClean="0"/>
-              <a:t>Nachteile:</a:t>
-            </a:r>
-          </a:p>
-          <a:p>
-            <a:r>
-              <a:rPr lang="de-DE" dirty="0" smtClean="0"/>
-              <a:t>Schaltabstände abhängig vom Material und vom Einbauort</a:t>
-            </a:r>
-          </a:p>
-          <a:p>
-            <a:r>
+              <a:t/>
+            </a:r>
+            <a:br>
               <a:rPr lang="de-DE" dirty="0"/>
-              <a:t>Für spezielle Anwendungen wie z. B. im Schweißbereich mit starken magnetischen Feldern sind geschützte Ausführungen erforderlich.</a:t>
-            </a:r>
-          </a:p>
-          <a:p>
-            <a:endParaRPr lang="de-DE" dirty="0" smtClean="0"/>
-          </a:p>
-        </p:txBody>
-      </p:sp>
-      <p:sp>
-        <p:nvSpPr>
-          <p:cNvPr id="6" name="Rechteck 5"/>
+            </a:br>
+            <a:r>
+              <a:rPr lang="de-DE" dirty="0"/>
+              <a:t>• Länge: 51 mm</a:t>
+            </a:r>
+            <a:br>
+              <a:rPr lang="de-DE" dirty="0"/>
+            </a:br>
+            <a:r>
+              <a:rPr lang="de-DE" dirty="0"/>
+              <a:t>• Messbereich: 0 … 10 mm</a:t>
+            </a:r>
+            <a:br>
+              <a:rPr lang="de-DE" dirty="0"/>
+            </a:br>
+            <a:r>
+              <a:rPr lang="de-DE" dirty="0"/>
+              <a:t>• Analogausgang: 0 … 10 V / 4 … 20 mA</a:t>
+            </a:r>
+            <a:br>
+              <a:rPr lang="de-DE" dirty="0"/>
+            </a:br>
+            <a:r>
+              <a:rPr lang="de-DE" dirty="0"/>
+              <a:t>• Anschluss: Kabel, 2m</a:t>
+            </a:r>
+            <a:br>
+              <a:rPr lang="de-DE" dirty="0"/>
+            </a:br>
+            <a:r>
+              <a:rPr lang="de-DE" dirty="0"/>
+              <a:t>• Einbau: quasi-bündig</a:t>
+            </a:r>
+            <a:br>
+              <a:rPr lang="de-DE" dirty="0"/>
+            </a:br>
+            <a:r>
+              <a:rPr lang="de-DE" dirty="0"/>
+              <a:t>• Bauform: zylindrisch</a:t>
+            </a:r>
+            <a:br>
+              <a:rPr lang="de-DE" dirty="0"/>
+            </a:br>
+            <a:r>
+              <a:rPr lang="de-DE" dirty="0"/>
+              <a:t>• Versorgungsspannung: 15 … 30 V DC</a:t>
+            </a:r>
+            <a:br>
+              <a:rPr lang="de-DE" dirty="0"/>
+            </a:br>
+            <a:r>
+              <a:rPr lang="de-DE" dirty="0"/>
+              <a:t>• Material: Messing verchromt</a:t>
+            </a:r>
+            <a:br>
+              <a:rPr lang="de-DE" dirty="0"/>
+            </a:br>
+            <a:r>
+              <a:rPr lang="de-DE" dirty="0"/>
+              <a:t>• Schutzart: IP67</a:t>
+            </a:r>
+          </a:p>
+        </p:txBody>
+      </p:sp>
+      <p:sp>
+        <p:nvSpPr>
+          <p:cNvPr id="10" name="Rechteck 9"/>
           <p:cNvSpPr/>
           <p:nvPr/>
         </p:nvSpPr>
@@ -4872,19 +5115,43 @@
             </a:r>
             <a:r>
               <a:rPr lang="de-DE" sz="900" dirty="0" err="1" smtClean="0"/>
-              <a:t>xpertgate</a:t>
+              <a:t>contrinex</a:t>
             </a:r>
             <a:r>
               <a:rPr lang="de-DE" sz="900" dirty="0" smtClean="0"/>
-              <a:t>, „induktive Sensoren“, http</a:t>
+              <a:t>, „Datenblatt DW-AD-504</a:t>
+            </a:r>
+            <a:r>
+              <a:rPr lang="de-DE" sz="900" dirty="0" smtClean="0"/>
+              <a:t>“, http</a:t>
             </a:r>
             <a:r>
               <a:rPr lang="de-DE" sz="900" dirty="0"/>
               <a:t>://</a:t>
             </a:r>
             <a:r>
-              <a:rPr lang="de-DE" sz="900" dirty="0" smtClean="0"/>
-              <a:t>www.xpertgate.de/produkte/Induktive_Sensoren.html</a:t>
+              <a:rPr lang="de-DE" sz="900" dirty="0" err="1"/>
+              <a:t>www.contrinex.com</a:t>
+            </a:r>
+            <a:r>
+              <a:rPr lang="de-DE" sz="900" dirty="0"/>
+              <a:t>/</a:t>
+            </a:r>
+            <a:r>
+              <a:rPr lang="de-DE" sz="900" dirty="0" err="1"/>
+              <a:t>xml</a:t>
+            </a:r>
+            <a:r>
+              <a:rPr lang="de-DE" sz="900" dirty="0"/>
+              <a:t>/</a:t>
+            </a:r>
+            <a:r>
+              <a:rPr lang="de-DE" sz="900" dirty="0" err="1"/>
+              <a:t>productSheet.aspx?src</a:t>
+            </a:r>
+            <a:r>
+              <a:rPr lang="de-DE" sz="900" dirty="0"/>
+              <a:t>=ps_DW-AD-504-M12-120</a:t>
             </a:r>
             <a:endParaRPr lang="de-DE" sz="900" dirty="0"/>
           </a:p>
@@ -4893,7 +5160,7 @@
     </p:spTree>
     <p:extLst>
       <p:ext uri="{BB962C8B-B14F-4D97-AF65-F5344CB8AC3E}">
-        <p14:creationId xmlns:p14="http://schemas.microsoft.com/office/powerpoint/2010/main" val="2931010684"/>
+        <p14:creationId xmlns:p14="http://schemas.microsoft.com/office/powerpoint/2010/main" val="2467044722"/>
       </p:ext>
     </p:extLst>
   </p:cSld>
@@ -4937,7 +5204,14 @@
           <a:p>
             <a:r>
               <a:rPr lang="de-DE" dirty="0" smtClean="0"/>
-              <a:t>Anwendungen</a:t>
+              <a:t>VOR-</a:t>
+            </a:r>
+            <a:br>
+              <a:rPr lang="de-DE" dirty="0" smtClean="0"/>
+            </a:br>
+            <a:r>
+              <a:rPr lang="de-DE" dirty="0" smtClean="0"/>
+              <a:t>und Nachteile</a:t>
             </a:r>
             <a:endParaRPr lang="de-DE" dirty="0"/>
           </a:p>
@@ -4953,9 +5227,16 @@
             <p:ph idx="1"/>
           </p:nvPr>
         </p:nvSpPr>
-        <p:spPr/>
-        <p:txBody>
-          <a:bodyPr/>
+        <p:spPr>
+          <a:xfrm>
+            <a:off x="457200" y="1752600"/>
+            <a:ext cx="3975100" cy="4373563"/>
+          </a:xfrm>
+        </p:spPr>
+        <p:txBody>
+          <a:bodyPr>
+            <a:normAutofit/>
+          </a:bodyPr>
           <a:lstStyle/>
           <a:p>
             <a:pPr marL="342900" indent="-342900">
@@ -4964,7 +5245,7 @@
             </a:pPr>
             <a:r>
               <a:rPr lang="de-DE" dirty="0" smtClean="0"/>
-              <a:t>Ersatz von mechanischen Schaltern</a:t>
+              <a:t>Kein Lichtbogen</a:t>
             </a:r>
           </a:p>
           <a:p>
@@ -4974,7 +5255,11 @@
             </a:pPr>
             <a:r>
               <a:rPr lang="de-DE" dirty="0" smtClean="0"/>
-              <a:t>Abstandsmessung</a:t>
+              <a:t>kompakte </a:t>
+            </a:r>
+            <a:r>
+              <a:rPr lang="de-DE" dirty="0" smtClean="0"/>
+              <a:t>Bauart</a:t>
             </a:r>
           </a:p>
           <a:p>
@@ -4984,9 +5269,534 @@
             </a:pPr>
             <a:r>
               <a:rPr lang="de-DE" dirty="0" smtClean="0"/>
-              <a:t>Unwucht Erkennung in Waschmaschinen</a:t>
+              <a:t>unempfindlich </a:t>
+            </a:r>
+            <a:r>
+              <a:rPr lang="de-DE" dirty="0"/>
+              <a:t>gegenüber Einflüssen wie </a:t>
+            </a:r>
+            <a:endParaRPr lang="de-DE" dirty="0" smtClean="0"/>
+          </a:p>
+          <a:p>
+            <a:pPr marL="800100" lvl="1" indent="-342900">
+              <a:buFontTx/>
+              <a:buChar char="-"/>
+            </a:pPr>
+            <a:r>
+              <a:rPr lang="de-DE" dirty="0" smtClean="0"/>
+              <a:t>Beleuchtung</a:t>
+            </a:r>
+          </a:p>
+          <a:p>
+            <a:pPr marL="800100" lvl="1" indent="-342900">
+              <a:buFontTx/>
+              <a:buChar char="-"/>
+            </a:pPr>
+            <a:r>
+              <a:rPr lang="de-DE" dirty="0" smtClean="0"/>
+              <a:t>Schall</a:t>
+            </a:r>
+          </a:p>
+          <a:p>
+            <a:pPr marL="800100" lvl="1" indent="-342900">
+              <a:buFontTx/>
+              <a:buChar char="-"/>
+            </a:pPr>
+            <a:r>
+              <a:rPr lang="de-DE" dirty="0" smtClean="0"/>
+              <a:t>Temperaturschwankungen</a:t>
+            </a:r>
+          </a:p>
+          <a:p>
+            <a:pPr marL="800100" lvl="1" indent="-342900">
+              <a:buFontTx/>
+              <a:buChar char="-"/>
+            </a:pPr>
+            <a:r>
+              <a:rPr lang="de-DE" dirty="0" smtClean="0"/>
+              <a:t>Feuchtigkeit</a:t>
+            </a:r>
+          </a:p>
+          <a:p>
+            <a:pPr marL="800100" lvl="1" indent="-342900">
+              <a:buFontTx/>
+              <a:buChar char="-"/>
+            </a:pPr>
+            <a:r>
+              <a:rPr lang="de-DE" dirty="0" smtClean="0"/>
+              <a:t>schmutz</a:t>
+            </a:r>
+            <a:endParaRPr lang="de-DE" dirty="0" smtClean="0"/>
+          </a:p>
+          <a:p>
+            <a:pPr marL="342900" indent="-342900">
+              <a:buFontTx/>
+              <a:buChar char="-"/>
+            </a:pPr>
+            <a:r>
+              <a:rPr lang="de-DE" dirty="0" smtClean="0"/>
+              <a:t>Berührungsfrei</a:t>
             </a:r>
             <a:endParaRPr lang="de-DE" dirty="0"/>
+          </a:p>
+        </p:txBody>
+      </p:sp>
+      <p:sp>
+        <p:nvSpPr>
+          <p:cNvPr id="6" name="Rechteck 5"/>
+          <p:cNvSpPr/>
+          <p:nvPr/>
+        </p:nvSpPr>
+        <p:spPr>
+          <a:xfrm>
+            <a:off x="-11575" y="6476036"/>
+            <a:ext cx="9144000" cy="393539"/>
+          </a:xfrm>
+          <a:prstGeom prst="rect">
+            <a:avLst/>
+          </a:prstGeom>
+          <a:solidFill>
+            <a:schemeClr val="tx1"/>
+          </a:solidFill>
+          <a:ln>
+            <a:noFill/>
+          </a:ln>
+        </p:spPr>
+        <p:style>
+          <a:lnRef idx="2">
+            <a:schemeClr val="accent1">
+              <a:shade val="50000"/>
+            </a:schemeClr>
+          </a:lnRef>
+          <a:fillRef idx="1">
+            <a:schemeClr val="accent1"/>
+          </a:fillRef>
+          <a:effectRef idx="0">
+            <a:schemeClr val="accent1"/>
+          </a:effectRef>
+          <a:fontRef idx="minor">
+            <a:schemeClr val="lt1"/>
+          </a:fontRef>
+        </p:style>
+        <p:txBody>
+          <a:bodyPr rtlCol="0" anchor="ctr"/>
+          <a:lstStyle/>
+          <a:p>
+            <a:r>
+              <a:rPr lang="de-DE" sz="900" dirty="0" smtClean="0"/>
+              <a:t>Antonio Parrotta &amp; Ulf Schmelzer, Embedded Systems Software, Vortrag: Induktive Sensoren 26.10.2015</a:t>
+            </a:r>
+          </a:p>
+          <a:p>
+            <a:r>
+              <a:rPr lang="de-DE" sz="900" dirty="0"/>
+              <a:t>Quelle: </a:t>
+            </a:r>
+            <a:r>
+              <a:rPr lang="de-DE" sz="900" dirty="0" err="1" smtClean="0"/>
+              <a:t>xpertgate</a:t>
+            </a:r>
+            <a:r>
+              <a:rPr lang="de-DE" sz="900" dirty="0" smtClean="0"/>
+              <a:t>, „induktive Sensoren“, http</a:t>
+            </a:r>
+            <a:r>
+              <a:rPr lang="de-DE" sz="900" dirty="0"/>
+              <a:t>://</a:t>
+            </a:r>
+            <a:r>
+              <a:rPr lang="de-DE" sz="900" dirty="0" smtClean="0"/>
+              <a:t>www.xpertgate.de/produkte/Induktive_Sensoren.html</a:t>
+            </a:r>
+            <a:endParaRPr lang="de-DE" sz="900" dirty="0"/>
+          </a:p>
+        </p:txBody>
+      </p:sp>
+      <p:sp>
+        <p:nvSpPr>
+          <p:cNvPr id="5" name="Inhaltsplatzhalter 2"/>
+          <p:cNvSpPr txBox="1">
+            <a:spLocks/>
+          </p:cNvSpPr>
+          <p:nvPr/>
+        </p:nvSpPr>
+        <p:spPr>
+          <a:xfrm>
+            <a:off x="4927600" y="1752600"/>
+            <a:ext cx="3810000" cy="4373563"/>
+          </a:xfrm>
+          <a:prstGeom prst="rect">
+            <a:avLst/>
+          </a:prstGeom>
+        </p:spPr>
+        <p:txBody>
+          <a:bodyPr vert="horz" lIns="91440" tIns="45720" rIns="91440" bIns="45720" rtlCol="0">
+            <a:normAutofit/>
+          </a:bodyPr>
+          <a:lstStyle>
+            <a:lvl1pPr marL="0" indent="0" algn="l" defTabSz="914400" rtl="0" eaLnBrk="1" latinLnBrk="0" hangingPunct="1">
+              <a:spcBef>
+                <a:spcPct val="20000"/>
+              </a:spcBef>
+              <a:spcAft>
+                <a:spcPts val="600"/>
+              </a:spcAft>
+              <a:buFont typeface="Arial" pitchFamily="34" charset="0"/>
+              <a:buNone/>
+              <a:defRPr sz="2000" b="1" kern="1200">
+                <a:solidFill>
+                  <a:schemeClr val="tx1"/>
+                </a:solidFill>
+                <a:latin typeface="+mn-lt"/>
+                <a:ea typeface="+mn-ea"/>
+                <a:cs typeface="+mn-cs"/>
+              </a:defRPr>
+            </a:lvl1pPr>
+            <a:lvl2pPr marL="457200" indent="-182880" algn="l" defTabSz="914400" rtl="0" eaLnBrk="1" latinLnBrk="0" hangingPunct="1">
+              <a:spcBef>
+                <a:spcPct val="20000"/>
+              </a:spcBef>
+              <a:buClr>
+                <a:schemeClr val="tx2"/>
+              </a:buClr>
+              <a:buFont typeface="Arial" pitchFamily="34" charset="0"/>
+              <a:buChar char="•"/>
+              <a:defRPr sz="2000" kern="1200">
+                <a:solidFill>
+                  <a:schemeClr val="tx1"/>
+                </a:solidFill>
+                <a:latin typeface="+mn-lt"/>
+                <a:ea typeface="+mn-ea"/>
+                <a:cs typeface="+mn-cs"/>
+              </a:defRPr>
+            </a:lvl2pPr>
+            <a:lvl3pPr marL="1143000" indent="-228600" algn="l" defTabSz="914400" rtl="0" eaLnBrk="1" latinLnBrk="0" hangingPunct="1">
+              <a:spcBef>
+                <a:spcPct val="20000"/>
+              </a:spcBef>
+              <a:buClr>
+                <a:schemeClr val="tx2"/>
+              </a:buClr>
+              <a:buFont typeface="Arial" pitchFamily="34" charset="0"/>
+              <a:buChar char="•"/>
+              <a:defRPr sz="1800" kern="1200">
+                <a:solidFill>
+                  <a:schemeClr val="tx1"/>
+                </a:solidFill>
+                <a:latin typeface="+mn-lt"/>
+                <a:ea typeface="+mn-ea"/>
+                <a:cs typeface="+mn-cs"/>
+              </a:defRPr>
+            </a:lvl3pPr>
+            <a:lvl4pPr marL="1600200" indent="-228600" algn="l" defTabSz="914400" rtl="0" eaLnBrk="1" latinLnBrk="0" hangingPunct="1">
+              <a:spcBef>
+                <a:spcPct val="20000"/>
+              </a:spcBef>
+              <a:buClr>
+                <a:schemeClr val="tx2"/>
+              </a:buClr>
+              <a:buFont typeface="Arial" pitchFamily="34" charset="0"/>
+              <a:buChar char="•"/>
+              <a:defRPr sz="1800" kern="1200">
+                <a:solidFill>
+                  <a:schemeClr val="tx1"/>
+                </a:solidFill>
+                <a:latin typeface="+mn-lt"/>
+                <a:ea typeface="+mn-ea"/>
+                <a:cs typeface="+mn-cs"/>
+              </a:defRPr>
+            </a:lvl4pPr>
+            <a:lvl5pPr marL="2057400" indent="-228600" algn="l" defTabSz="914400" rtl="0" eaLnBrk="1" latinLnBrk="0" hangingPunct="1">
+              <a:spcBef>
+                <a:spcPct val="20000"/>
+              </a:spcBef>
+              <a:buClr>
+                <a:schemeClr val="tx2"/>
+              </a:buClr>
+              <a:buFont typeface="Arial" pitchFamily="34" charset="0"/>
+              <a:buChar char="•"/>
+              <a:defRPr sz="1800" kern="1200" baseline="0">
+                <a:solidFill>
+                  <a:schemeClr val="tx1"/>
+                </a:solidFill>
+                <a:latin typeface="+mn-lt"/>
+                <a:ea typeface="+mn-ea"/>
+                <a:cs typeface="+mn-cs"/>
+              </a:defRPr>
+            </a:lvl5pPr>
+            <a:lvl6pPr marL="2514600" indent="-228600" algn="l" defTabSz="914400" rtl="0" eaLnBrk="1" latinLnBrk="0" hangingPunct="1">
+              <a:spcBef>
+                <a:spcPct val="20000"/>
+              </a:spcBef>
+              <a:buClr>
+                <a:schemeClr val="tx2"/>
+              </a:buClr>
+              <a:buFont typeface="Arial" pitchFamily="34" charset="0"/>
+              <a:buChar char="•"/>
+              <a:defRPr sz="1600" kern="1200">
+                <a:solidFill>
+                  <a:schemeClr val="tx1"/>
+                </a:solidFill>
+                <a:latin typeface="+mn-lt"/>
+                <a:ea typeface="+mn-ea"/>
+                <a:cs typeface="+mn-cs"/>
+              </a:defRPr>
+            </a:lvl6pPr>
+            <a:lvl7pPr marL="2971800" indent="-228600" algn="l" defTabSz="914400" rtl="0" eaLnBrk="1" latinLnBrk="0" hangingPunct="1">
+              <a:spcBef>
+                <a:spcPct val="20000"/>
+              </a:spcBef>
+              <a:buClr>
+                <a:schemeClr val="tx2"/>
+              </a:buClr>
+              <a:buFont typeface="Arial" pitchFamily="34" charset="0"/>
+              <a:buChar char="•"/>
+              <a:defRPr sz="1600" kern="1200">
+                <a:solidFill>
+                  <a:schemeClr val="tx1"/>
+                </a:solidFill>
+                <a:latin typeface="+mn-lt"/>
+                <a:ea typeface="+mn-ea"/>
+                <a:cs typeface="+mn-cs"/>
+              </a:defRPr>
+            </a:lvl7pPr>
+            <a:lvl8pPr marL="3429000" indent="-228600" algn="l" defTabSz="914400" rtl="0" eaLnBrk="1" latinLnBrk="0" hangingPunct="1">
+              <a:spcBef>
+                <a:spcPct val="20000"/>
+              </a:spcBef>
+              <a:buClr>
+                <a:schemeClr val="tx2"/>
+              </a:buClr>
+              <a:buFont typeface="Arial" pitchFamily="34" charset="0"/>
+              <a:buChar char="•"/>
+              <a:defRPr sz="1600" kern="1200">
+                <a:solidFill>
+                  <a:schemeClr val="tx1"/>
+                </a:solidFill>
+                <a:latin typeface="+mn-lt"/>
+                <a:ea typeface="+mn-ea"/>
+                <a:cs typeface="+mn-cs"/>
+              </a:defRPr>
+            </a:lvl8pPr>
+            <a:lvl9pPr marL="3886200" indent="-228600" algn="l" defTabSz="914400" rtl="0" eaLnBrk="1" latinLnBrk="0" hangingPunct="1">
+              <a:spcBef>
+                <a:spcPct val="20000"/>
+              </a:spcBef>
+              <a:buClr>
+                <a:schemeClr val="tx2"/>
+              </a:buClr>
+              <a:buFont typeface="Arial" pitchFamily="34" charset="0"/>
+              <a:buChar char="•"/>
+              <a:defRPr sz="1600" kern="1200">
+                <a:solidFill>
+                  <a:schemeClr val="tx1"/>
+                </a:solidFill>
+                <a:latin typeface="+mn-lt"/>
+                <a:ea typeface="+mn-ea"/>
+                <a:cs typeface="+mn-cs"/>
+              </a:defRPr>
+            </a:lvl9pPr>
+          </a:lstStyle>
+          <a:p>
+            <a:pPr marL="342900" indent="-342900">
+              <a:buFontTx/>
+              <a:buChar char="-"/>
+            </a:pPr>
+            <a:r>
+              <a:rPr lang="de-DE" dirty="0" smtClean="0"/>
+              <a:t>Schaltabstände abhängig von</a:t>
+            </a:r>
+          </a:p>
+          <a:p>
+            <a:pPr marL="800100" lvl="1" indent="-342900">
+              <a:buFontTx/>
+              <a:buChar char="-"/>
+            </a:pPr>
+            <a:r>
+              <a:rPr lang="de-DE" dirty="0" smtClean="0"/>
+              <a:t>Material </a:t>
+            </a:r>
+          </a:p>
+          <a:p>
+            <a:pPr marL="800100" lvl="1" indent="-342900">
+              <a:buFontTx/>
+              <a:buChar char="-"/>
+            </a:pPr>
+            <a:r>
+              <a:rPr lang="de-DE" dirty="0" smtClean="0"/>
+              <a:t>Einbauort (Bündiger </a:t>
+            </a:r>
+            <a:r>
+              <a:rPr lang="de-DE" dirty="0" err="1" smtClean="0"/>
+              <a:t>einbau</a:t>
+            </a:r>
+            <a:r>
+              <a:rPr lang="de-DE" dirty="0" smtClean="0"/>
+              <a:t>)</a:t>
+            </a:r>
+          </a:p>
+          <a:p>
+            <a:pPr marL="800100" lvl="1" indent="-342900">
+              <a:buFontTx/>
+              <a:buChar char="-"/>
+            </a:pPr>
+            <a:r>
+              <a:rPr lang="de-DE" dirty="0" smtClean="0"/>
+              <a:t>Winkel</a:t>
+            </a:r>
+          </a:p>
+          <a:p>
+            <a:pPr marL="342900" indent="-342900">
+              <a:buFontTx/>
+              <a:buChar char="-"/>
+            </a:pPr>
+            <a:endParaRPr lang="de-DE" dirty="0" smtClean="0"/>
+          </a:p>
+          <a:p>
+            <a:pPr marL="342900" indent="-342900">
+              <a:buFontTx/>
+              <a:buChar char="-"/>
+            </a:pPr>
+            <a:r>
+              <a:rPr lang="de-DE" dirty="0" smtClean="0"/>
+              <a:t>Ungeeignete Bereiche</a:t>
+            </a:r>
+          </a:p>
+          <a:p>
+            <a:pPr marL="800100" lvl="1" indent="-342900">
+              <a:buFontTx/>
+              <a:buChar char="-"/>
+            </a:pPr>
+            <a:r>
+              <a:rPr lang="de-DE" dirty="0" smtClean="0"/>
+              <a:t>Linearantriebe</a:t>
+            </a:r>
+          </a:p>
+          <a:p>
+            <a:pPr marL="800100" lvl="1" indent="-342900">
+              <a:buFontTx/>
+              <a:buChar char="-"/>
+            </a:pPr>
+            <a:r>
+              <a:rPr lang="de-DE" dirty="0" smtClean="0"/>
+              <a:t>Schweißbereiche</a:t>
+            </a:r>
+          </a:p>
+          <a:p>
+            <a:pPr marL="800100" lvl="1" indent="-342900">
+              <a:buFontTx/>
+              <a:buChar char="-"/>
+            </a:pPr>
+            <a:r>
+              <a:rPr lang="de-DE" dirty="0" smtClean="0"/>
+              <a:t>Induktionsöfen</a:t>
+            </a:r>
+          </a:p>
+          <a:p>
+            <a:endParaRPr lang="de-DE" dirty="0" smtClean="0"/>
+          </a:p>
+        </p:txBody>
+      </p:sp>
+    </p:spTree>
+    <p:extLst>
+      <p:ext uri="{BB962C8B-B14F-4D97-AF65-F5344CB8AC3E}">
+        <p14:creationId xmlns:p14="http://schemas.microsoft.com/office/powerpoint/2010/main" val="2931010684"/>
+      </p:ext>
+    </p:extLst>
+  </p:cSld>
+  <p:clrMapOvr>
+    <a:masterClrMapping/>
+  </p:clrMapOvr>
+</p:sld>
+</file>
+
+<file path=ppt/slides/slide9.xml><?xml version="1.0" encoding="utf-8"?>
+<p:sld xmlns:a="http://schemas.openxmlformats.org/drawingml/2006/main" xmlns:r="http://schemas.openxmlformats.org/officeDocument/2006/relationships" xmlns:p="http://schemas.openxmlformats.org/presentationml/2006/main">
+  <p:cSld>
+    <p:spTree>
+      <p:nvGrpSpPr>
+        <p:cNvPr id="1" name=""/>
+        <p:cNvGrpSpPr/>
+        <p:nvPr/>
+      </p:nvGrpSpPr>
+      <p:grpSpPr>
+        <a:xfrm>
+          <a:off x="0" y="0"/>
+          <a:ext cx="0" cy="0"/>
+          <a:chOff x="0" y="0"/>
+          <a:chExt cx="0" cy="0"/>
+        </a:xfrm>
+      </p:grpSpPr>
+      <p:sp>
+        <p:nvSpPr>
+          <p:cNvPr id="2" name="Titel 1"/>
+          <p:cNvSpPr>
+            <a:spLocks noGrp="1"/>
+          </p:cNvSpPr>
+          <p:nvPr>
+            <p:ph type="title"/>
+          </p:nvPr>
+        </p:nvSpPr>
+        <p:spPr/>
+        <p:txBody>
+          <a:bodyPr/>
+          <a:lstStyle/>
+          <a:p>
+            <a:r>
+              <a:rPr lang="de-DE" dirty="0" smtClean="0"/>
+              <a:t>Anwendungen</a:t>
+            </a:r>
+            <a:endParaRPr lang="de-DE" dirty="0"/>
+          </a:p>
+        </p:txBody>
+      </p:sp>
+      <p:sp>
+        <p:nvSpPr>
+          <p:cNvPr id="3" name="Inhaltsplatzhalter 2"/>
+          <p:cNvSpPr>
+            <a:spLocks noGrp="1"/>
+          </p:cNvSpPr>
+          <p:nvPr>
+            <p:ph idx="1"/>
+          </p:nvPr>
+        </p:nvSpPr>
+        <p:spPr/>
+        <p:txBody>
+          <a:bodyPr/>
+          <a:lstStyle/>
+          <a:p>
+            <a:pPr marL="342900" indent="-342900">
+              <a:buFontTx/>
+              <a:buChar char="-"/>
+            </a:pPr>
+            <a:r>
+              <a:rPr lang="de-DE" dirty="0" smtClean="0"/>
+              <a:t>Ersatz von mechanischen Schaltern</a:t>
+            </a:r>
+          </a:p>
+          <a:p>
+            <a:pPr marL="342900" indent="-342900">
+              <a:buFontTx/>
+              <a:buChar char="-"/>
+            </a:pPr>
+            <a:r>
+              <a:rPr lang="de-DE" dirty="0" smtClean="0"/>
+              <a:t>Abstandsmessung</a:t>
+            </a:r>
+          </a:p>
+          <a:p>
+            <a:pPr marL="342900" indent="-342900">
+              <a:buFontTx/>
+              <a:buChar char="-"/>
+            </a:pPr>
+            <a:r>
+              <a:rPr lang="de-DE" dirty="0" smtClean="0"/>
+              <a:t>Unwucht Erkennung in </a:t>
+            </a:r>
+            <a:r>
+              <a:rPr lang="de-DE" dirty="0" smtClean="0"/>
+              <a:t>Waschmaschinen</a:t>
+            </a:r>
           </a:p>
         </p:txBody>
       </p:sp>
@@ -5045,177 +5855,6 @@
     <p:extLst>
       <p:ext uri="{BB962C8B-B14F-4D97-AF65-F5344CB8AC3E}">
         <p14:creationId xmlns:p14="http://schemas.microsoft.com/office/powerpoint/2010/main" val="3305900296"/>
-      </p:ext>
-    </p:extLst>
-  </p:cSld>
-  <p:clrMapOvr>
-    <a:masterClrMapping/>
-  </p:clrMapOvr>
-</p:sld>
-</file>
-
-<file path=ppt/slides/slide9.xml><?xml version="1.0" encoding="utf-8"?>
-<p:sld xmlns:a="http://schemas.openxmlformats.org/drawingml/2006/main" xmlns:r="http://schemas.openxmlformats.org/officeDocument/2006/relationships" xmlns:p="http://schemas.openxmlformats.org/presentationml/2006/main">
-  <p:cSld>
-    <p:spTree>
-      <p:nvGrpSpPr>
-        <p:cNvPr id="1" name=""/>
-        <p:cNvGrpSpPr/>
-        <p:nvPr/>
-      </p:nvGrpSpPr>
-      <p:grpSpPr>
-        <a:xfrm>
-          <a:off x="0" y="0"/>
-          <a:ext cx="0" cy="0"/>
-          <a:chOff x="0" y="0"/>
-          <a:chExt cx="0" cy="0"/>
-        </a:xfrm>
-      </p:grpSpPr>
-      <p:sp>
-        <p:nvSpPr>
-          <p:cNvPr id="2" name="Titel 1"/>
-          <p:cNvSpPr>
-            <a:spLocks noGrp="1"/>
-          </p:cNvSpPr>
-          <p:nvPr>
-            <p:ph type="title"/>
-          </p:nvPr>
-        </p:nvSpPr>
-        <p:spPr/>
-        <p:txBody>
-          <a:bodyPr>
-            <a:normAutofit fontScale="90000"/>
-          </a:bodyPr>
-          <a:lstStyle/>
-          <a:p>
-            <a:r>
-              <a:rPr lang="de-DE" dirty="0" smtClean="0"/>
-              <a:t>Vielen dank für ihre Aufmerksamkeit</a:t>
-            </a:r>
-            <a:endParaRPr lang="de-DE" dirty="0"/>
-          </a:p>
-        </p:txBody>
-      </p:sp>
-      <p:sp>
-        <p:nvSpPr>
-          <p:cNvPr id="3" name="Inhaltsplatzhalter 2"/>
-          <p:cNvSpPr>
-            <a:spLocks noGrp="1"/>
-          </p:cNvSpPr>
-          <p:nvPr>
-            <p:ph idx="1"/>
-          </p:nvPr>
-        </p:nvSpPr>
-        <p:spPr/>
-        <p:txBody>
-          <a:bodyPr/>
-          <a:lstStyle/>
-          <a:p>
-            <a:r>
-              <a:rPr lang="de-DE" dirty="0" smtClean="0"/>
-              <a:t>Fragen?</a:t>
-            </a:r>
-          </a:p>
-          <a:p>
-            <a:endParaRPr lang="de-DE" dirty="0"/>
-          </a:p>
-          <a:p>
-            <a:endParaRPr lang="de-DE" dirty="0" smtClean="0"/>
-          </a:p>
-          <a:p>
-            <a:endParaRPr lang="de-DE" dirty="0"/>
-          </a:p>
-          <a:p>
-            <a:endParaRPr lang="de-DE" dirty="0" smtClean="0"/>
-          </a:p>
-          <a:p>
-            <a:r>
-              <a:rPr lang="de-DE" dirty="0" smtClean="0"/>
-              <a:t>Kontakt:</a:t>
-            </a:r>
-          </a:p>
-          <a:p>
-            <a:r>
-              <a:rPr lang="de-DE" dirty="0" smtClean="0"/>
-              <a:t>Ulf Schmelzer (ulscit01@hs-esslingen.de)</a:t>
-            </a:r>
-          </a:p>
-          <a:p>
-            <a:r>
-              <a:rPr lang="de-DE" dirty="0" smtClean="0"/>
-              <a:t>Antonio </a:t>
-            </a:r>
-            <a:r>
-              <a:rPr lang="de-DE" dirty="0" err="1" smtClean="0"/>
-              <a:t>Parrotta</a:t>
-            </a:r>
-            <a:r>
-              <a:rPr lang="de-DE" dirty="0"/>
-              <a:t> </a:t>
-            </a:r>
-            <a:r>
-              <a:rPr lang="de-DE" dirty="0" smtClean="0"/>
-              <a:t>(anpait00@hs-esslingen.de)</a:t>
-            </a:r>
-            <a:endParaRPr lang="de-DE" dirty="0"/>
-          </a:p>
-        </p:txBody>
-      </p:sp>
-      <p:sp>
-        <p:nvSpPr>
-          <p:cNvPr id="5" name="Rechteck 4"/>
-          <p:cNvSpPr/>
-          <p:nvPr/>
-        </p:nvSpPr>
-        <p:spPr>
-          <a:xfrm>
-            <a:off x="0" y="6504971"/>
-            <a:ext cx="9144000" cy="393539"/>
-          </a:xfrm>
-          <a:prstGeom prst="rect">
-            <a:avLst/>
-          </a:prstGeom>
-          <a:solidFill>
-            <a:schemeClr val="tx1"/>
-          </a:solidFill>
-          <a:ln>
-            <a:noFill/>
-          </a:ln>
-        </p:spPr>
-        <p:style>
-          <a:lnRef idx="2">
-            <a:schemeClr val="accent1">
-              <a:shade val="50000"/>
-            </a:schemeClr>
-          </a:lnRef>
-          <a:fillRef idx="1">
-            <a:schemeClr val="accent1"/>
-          </a:fillRef>
-          <a:effectRef idx="0">
-            <a:schemeClr val="accent1"/>
-          </a:effectRef>
-          <a:fontRef idx="minor">
-            <a:schemeClr val="lt1"/>
-          </a:fontRef>
-        </p:style>
-        <p:txBody>
-          <a:bodyPr rtlCol="0" anchor="ctr"/>
-          <a:lstStyle/>
-          <a:p>
-            <a:r>
-              <a:rPr lang="de-DE" sz="900" dirty="0" smtClean="0"/>
-              <a:t>Antonio Parrotta &amp; Ulf Schmelzer, Embedded Systems Software, Vortrag: Induktive Sensoren 26.10.2015</a:t>
-            </a:r>
-          </a:p>
-          <a:p>
-            <a:endParaRPr lang="de-DE" sz="900" dirty="0"/>
-          </a:p>
-        </p:txBody>
-      </p:sp>
-    </p:spTree>
-    <p:extLst>
-      <p:ext uri="{BB962C8B-B14F-4D97-AF65-F5344CB8AC3E}">
-        <p14:creationId xmlns:p14="http://schemas.microsoft.com/office/powerpoint/2010/main" val="202598775"/>
       </p:ext>
     </p:extLst>
   </p:cSld>

</xml_diff>

<commit_message>
Agenda und Seitennummern hinzugefuegt
</commit_message>
<xml_diff>
--- a/induktiv_sensoren.pptx
+++ b/induktiv_sensoren.pptx
@@ -1,20 +1,24 @@
 
 <file path=ppt/presentation.xml><?xml version="1.0" encoding="utf-8"?>
-<p:presentation xmlns:a="http://schemas.openxmlformats.org/drawingml/2006/main" xmlns:r="http://schemas.openxmlformats.org/officeDocument/2006/relationships" xmlns:p="http://schemas.openxmlformats.org/presentationml/2006/main" saveSubsetFonts="1">
+<p:presentation xmlns:a="http://schemas.openxmlformats.org/drawingml/2006/main" xmlns:r="http://schemas.openxmlformats.org/officeDocument/2006/relationships" xmlns:p="http://schemas.openxmlformats.org/presentationml/2006/main" showSpecialPlsOnTitleSld="0" saveSubsetFonts="1">
   <p:sldMasterIdLst>
     <p:sldMasterId id="2147483912" r:id="rId1"/>
   </p:sldMasterIdLst>
+  <p:notesMasterIdLst>
+    <p:notesMasterId r:id="rId13"/>
+  </p:notesMasterIdLst>
   <p:sldIdLst>
     <p:sldId id="256" r:id="rId2"/>
-    <p:sldId id="257" r:id="rId3"/>
-    <p:sldId id="259" r:id="rId4"/>
-    <p:sldId id="262" r:id="rId5"/>
-    <p:sldId id="258" r:id="rId6"/>
-    <p:sldId id="260" r:id="rId7"/>
-    <p:sldId id="265" r:id="rId8"/>
-    <p:sldId id="263" r:id="rId9"/>
-    <p:sldId id="264" r:id="rId10"/>
-    <p:sldId id="261" r:id="rId11"/>
+    <p:sldId id="266" r:id="rId3"/>
+    <p:sldId id="257" r:id="rId4"/>
+    <p:sldId id="259" r:id="rId5"/>
+    <p:sldId id="262" r:id="rId6"/>
+    <p:sldId id="258" r:id="rId7"/>
+    <p:sldId id="260" r:id="rId8"/>
+    <p:sldId id="265" r:id="rId9"/>
+    <p:sldId id="263" r:id="rId10"/>
+    <p:sldId id="264" r:id="rId11"/>
+    <p:sldId id="261" r:id="rId12"/>
   </p:sldIdLst>
   <p:sldSz cx="9144000" cy="6858000" type="screen4x3"/>
   <p:notesSz cx="6858000" cy="9144000"/>
@@ -116,6 +120,440 @@
 </p:presentation>
 </file>
 
+<file path=ppt/notesMasters/notesMaster1.xml><?xml version="1.0" encoding="utf-8"?>
+<p:notesMaster xmlns:a="http://schemas.openxmlformats.org/drawingml/2006/main" xmlns:r="http://schemas.openxmlformats.org/officeDocument/2006/relationships" xmlns:p="http://schemas.openxmlformats.org/presentationml/2006/main">
+  <p:cSld>
+    <p:bg>
+      <p:bgRef idx="1001">
+        <a:schemeClr val="bg1"/>
+      </p:bgRef>
+    </p:bg>
+    <p:spTree>
+      <p:nvGrpSpPr>
+        <p:cNvPr id="1" name=""/>
+        <p:cNvGrpSpPr/>
+        <p:nvPr/>
+      </p:nvGrpSpPr>
+      <p:grpSpPr>
+        <a:xfrm>
+          <a:off x="0" y="0"/>
+          <a:ext cx="0" cy="0"/>
+          <a:chOff x="0" y="0"/>
+          <a:chExt cx="0" cy="0"/>
+        </a:xfrm>
+      </p:grpSpPr>
+      <p:sp>
+        <p:nvSpPr>
+          <p:cNvPr id="2" name="Kopfzeilenplatzhalter 1"/>
+          <p:cNvSpPr>
+            <a:spLocks noGrp="1"/>
+          </p:cNvSpPr>
+          <p:nvPr>
+            <p:ph type="hdr" sz="quarter"/>
+          </p:nvPr>
+        </p:nvSpPr>
+        <p:spPr>
+          <a:xfrm>
+            <a:off x="0" y="0"/>
+            <a:ext cx="2971800" cy="457200"/>
+          </a:xfrm>
+          <a:prstGeom prst="rect">
+            <a:avLst/>
+          </a:prstGeom>
+        </p:spPr>
+        <p:txBody>
+          <a:bodyPr vert="horz" lIns="91440" tIns="45720" rIns="91440" bIns="45720" rtlCol="0"/>
+          <a:lstStyle>
+            <a:lvl1pPr algn="l">
+              <a:defRPr sz="1200"/>
+            </a:lvl1pPr>
+          </a:lstStyle>
+          <a:p>
+            <a:endParaRPr lang="de-DE"/>
+          </a:p>
+        </p:txBody>
+      </p:sp>
+      <p:sp>
+        <p:nvSpPr>
+          <p:cNvPr id="3" name="Datumsplatzhalter 2"/>
+          <p:cNvSpPr>
+            <a:spLocks noGrp="1"/>
+          </p:cNvSpPr>
+          <p:nvPr>
+            <p:ph type="dt" idx="1"/>
+          </p:nvPr>
+        </p:nvSpPr>
+        <p:spPr>
+          <a:xfrm>
+            <a:off x="3884613" y="0"/>
+            <a:ext cx="2971800" cy="457200"/>
+          </a:xfrm>
+          <a:prstGeom prst="rect">
+            <a:avLst/>
+          </a:prstGeom>
+        </p:spPr>
+        <p:txBody>
+          <a:bodyPr vert="horz" lIns="91440" tIns="45720" rIns="91440" bIns="45720" rtlCol="0"/>
+          <a:lstStyle>
+            <a:lvl1pPr algn="r">
+              <a:defRPr sz="1200"/>
+            </a:lvl1pPr>
+          </a:lstStyle>
+          <a:p>
+            <a:fld id="{073AB8DC-7E7E-4F77-B27B-16CB55942247}" type="datetimeFigureOut">
+              <a:rPr lang="de-DE" smtClean="0"/>
+              <a:t>25.10.2015</a:t>
+            </a:fld>
+            <a:endParaRPr lang="de-DE"/>
+          </a:p>
+        </p:txBody>
+      </p:sp>
+      <p:sp>
+        <p:nvSpPr>
+          <p:cNvPr id="4" name="Folienbildplatzhalter 3"/>
+          <p:cNvSpPr>
+            <a:spLocks noGrp="1" noRot="1" noChangeAspect="1"/>
+          </p:cNvSpPr>
+          <p:nvPr>
+            <p:ph type="sldImg" idx="2"/>
+          </p:nvPr>
+        </p:nvSpPr>
+        <p:spPr>
+          <a:xfrm>
+            <a:off x="1143000" y="685800"/>
+            <a:ext cx="4572000" cy="3429000"/>
+          </a:xfrm>
+          <a:prstGeom prst="rect">
+            <a:avLst/>
+          </a:prstGeom>
+          <a:noFill/>
+          <a:ln w="12700">
+            <a:solidFill>
+              <a:prstClr val="black"/>
+            </a:solidFill>
+          </a:ln>
+        </p:spPr>
+        <p:txBody>
+          <a:bodyPr vert="horz" lIns="91440" tIns="45720" rIns="91440" bIns="45720" rtlCol="0" anchor="ctr"/>
+          <a:lstStyle/>
+          <a:p>
+            <a:endParaRPr lang="de-DE"/>
+          </a:p>
+        </p:txBody>
+      </p:sp>
+      <p:sp>
+        <p:nvSpPr>
+          <p:cNvPr id="5" name="Notizenplatzhalter 4"/>
+          <p:cNvSpPr>
+            <a:spLocks noGrp="1"/>
+          </p:cNvSpPr>
+          <p:nvPr>
+            <p:ph type="body" sz="quarter" idx="3"/>
+          </p:nvPr>
+        </p:nvSpPr>
+        <p:spPr>
+          <a:xfrm>
+            <a:off x="685800" y="4343400"/>
+            <a:ext cx="5486400" cy="4114800"/>
+          </a:xfrm>
+          <a:prstGeom prst="rect">
+            <a:avLst/>
+          </a:prstGeom>
+        </p:spPr>
+        <p:txBody>
+          <a:bodyPr vert="horz" lIns="91440" tIns="45720" rIns="91440" bIns="45720" rtlCol="0"/>
+          <a:lstStyle/>
+          <a:p>
+            <a:pPr lvl="0"/>
+            <a:r>
+              <a:rPr lang="de-DE" smtClean="0"/>
+              <a:t>Textmasterformat bearbeiten</a:t>
+            </a:r>
+          </a:p>
+          <a:p>
+            <a:pPr lvl="1"/>
+            <a:r>
+              <a:rPr lang="de-DE" smtClean="0"/>
+              <a:t>Zweite Ebene</a:t>
+            </a:r>
+          </a:p>
+          <a:p>
+            <a:pPr lvl="2"/>
+            <a:r>
+              <a:rPr lang="de-DE" smtClean="0"/>
+              <a:t>Dritte Ebene</a:t>
+            </a:r>
+          </a:p>
+          <a:p>
+            <a:pPr lvl="3"/>
+            <a:r>
+              <a:rPr lang="de-DE" smtClean="0"/>
+              <a:t>Vierte Ebene</a:t>
+            </a:r>
+          </a:p>
+          <a:p>
+            <a:pPr lvl="4"/>
+            <a:r>
+              <a:rPr lang="de-DE" smtClean="0"/>
+              <a:t>Fünfte Ebene</a:t>
+            </a:r>
+            <a:endParaRPr lang="de-DE"/>
+          </a:p>
+        </p:txBody>
+      </p:sp>
+      <p:sp>
+        <p:nvSpPr>
+          <p:cNvPr id="6" name="Fußzeilenplatzhalter 5"/>
+          <p:cNvSpPr>
+            <a:spLocks noGrp="1"/>
+          </p:cNvSpPr>
+          <p:nvPr>
+            <p:ph type="ftr" sz="quarter" idx="4"/>
+          </p:nvPr>
+        </p:nvSpPr>
+        <p:spPr>
+          <a:xfrm>
+            <a:off x="0" y="8685213"/>
+            <a:ext cx="2971800" cy="457200"/>
+          </a:xfrm>
+          <a:prstGeom prst="rect">
+            <a:avLst/>
+          </a:prstGeom>
+        </p:spPr>
+        <p:txBody>
+          <a:bodyPr vert="horz" lIns="91440" tIns="45720" rIns="91440" bIns="45720" rtlCol="0" anchor="b"/>
+          <a:lstStyle>
+            <a:lvl1pPr algn="l">
+              <a:defRPr sz="1200"/>
+            </a:lvl1pPr>
+          </a:lstStyle>
+          <a:p>
+            <a:endParaRPr lang="de-DE"/>
+          </a:p>
+        </p:txBody>
+      </p:sp>
+      <p:sp>
+        <p:nvSpPr>
+          <p:cNvPr id="7" name="Foliennummernplatzhalter 6"/>
+          <p:cNvSpPr>
+            <a:spLocks noGrp="1"/>
+          </p:cNvSpPr>
+          <p:nvPr>
+            <p:ph type="sldNum" sz="quarter" idx="5"/>
+          </p:nvPr>
+        </p:nvSpPr>
+        <p:spPr>
+          <a:xfrm>
+            <a:off x="3884613" y="8685213"/>
+            <a:ext cx="2971800" cy="457200"/>
+          </a:xfrm>
+          <a:prstGeom prst="rect">
+            <a:avLst/>
+          </a:prstGeom>
+        </p:spPr>
+        <p:txBody>
+          <a:bodyPr vert="horz" lIns="91440" tIns="45720" rIns="91440" bIns="45720" rtlCol="0" anchor="b"/>
+          <a:lstStyle>
+            <a:lvl1pPr algn="r">
+              <a:defRPr sz="1200"/>
+            </a:lvl1pPr>
+          </a:lstStyle>
+          <a:p>
+            <a:fld id="{ACEF6541-0B57-4735-9721-132D0EA6884F}" type="slidenum">
+              <a:rPr lang="de-DE" smtClean="0"/>
+              <a:t>‹Nr.›</a:t>
+            </a:fld>
+            <a:endParaRPr lang="de-DE"/>
+          </a:p>
+        </p:txBody>
+      </p:sp>
+    </p:spTree>
+    <p:extLst>
+      <p:ext uri="{BB962C8B-B14F-4D97-AF65-F5344CB8AC3E}">
+        <p14:creationId xmlns:p14="http://schemas.microsoft.com/office/powerpoint/2010/main" val="880206984"/>
+      </p:ext>
+    </p:extLst>
+  </p:cSld>
+  <p:clrMap bg1="lt1" tx1="dk1" bg2="lt2" tx2="dk2" accent1="accent1" accent2="accent2" accent3="accent3" accent4="accent4" accent5="accent5" accent6="accent6" hlink="hlink" folHlink="folHlink"/>
+  <p:notesStyle>
+    <a:lvl1pPr marL="0" algn="l" defTabSz="914400" rtl="0" eaLnBrk="1" latinLnBrk="0" hangingPunct="1">
+      <a:defRPr sz="1200" kern="1200">
+        <a:solidFill>
+          <a:schemeClr val="tx1"/>
+        </a:solidFill>
+        <a:latin typeface="+mn-lt"/>
+        <a:ea typeface="+mn-ea"/>
+        <a:cs typeface="+mn-cs"/>
+      </a:defRPr>
+    </a:lvl1pPr>
+    <a:lvl2pPr marL="457200" algn="l" defTabSz="914400" rtl="0" eaLnBrk="1" latinLnBrk="0" hangingPunct="1">
+      <a:defRPr sz="1200" kern="1200">
+        <a:solidFill>
+          <a:schemeClr val="tx1"/>
+        </a:solidFill>
+        <a:latin typeface="+mn-lt"/>
+        <a:ea typeface="+mn-ea"/>
+        <a:cs typeface="+mn-cs"/>
+      </a:defRPr>
+    </a:lvl2pPr>
+    <a:lvl3pPr marL="914400" algn="l" defTabSz="914400" rtl="0" eaLnBrk="1" latinLnBrk="0" hangingPunct="1">
+      <a:defRPr sz="1200" kern="1200">
+        <a:solidFill>
+          <a:schemeClr val="tx1"/>
+        </a:solidFill>
+        <a:latin typeface="+mn-lt"/>
+        <a:ea typeface="+mn-ea"/>
+        <a:cs typeface="+mn-cs"/>
+      </a:defRPr>
+    </a:lvl3pPr>
+    <a:lvl4pPr marL="1371600" algn="l" defTabSz="914400" rtl="0" eaLnBrk="1" latinLnBrk="0" hangingPunct="1">
+      <a:defRPr sz="1200" kern="1200">
+        <a:solidFill>
+          <a:schemeClr val="tx1"/>
+        </a:solidFill>
+        <a:latin typeface="+mn-lt"/>
+        <a:ea typeface="+mn-ea"/>
+        <a:cs typeface="+mn-cs"/>
+      </a:defRPr>
+    </a:lvl4pPr>
+    <a:lvl5pPr marL="1828800" algn="l" defTabSz="914400" rtl="0" eaLnBrk="1" latinLnBrk="0" hangingPunct="1">
+      <a:defRPr sz="1200" kern="1200">
+        <a:solidFill>
+          <a:schemeClr val="tx1"/>
+        </a:solidFill>
+        <a:latin typeface="+mn-lt"/>
+        <a:ea typeface="+mn-ea"/>
+        <a:cs typeface="+mn-cs"/>
+      </a:defRPr>
+    </a:lvl5pPr>
+    <a:lvl6pPr marL="2286000" algn="l" defTabSz="914400" rtl="0" eaLnBrk="1" latinLnBrk="0" hangingPunct="1">
+      <a:defRPr sz="1200" kern="1200">
+        <a:solidFill>
+          <a:schemeClr val="tx1"/>
+        </a:solidFill>
+        <a:latin typeface="+mn-lt"/>
+        <a:ea typeface="+mn-ea"/>
+        <a:cs typeface="+mn-cs"/>
+      </a:defRPr>
+    </a:lvl6pPr>
+    <a:lvl7pPr marL="2743200" algn="l" defTabSz="914400" rtl="0" eaLnBrk="1" latinLnBrk="0" hangingPunct="1">
+      <a:defRPr sz="1200" kern="1200">
+        <a:solidFill>
+          <a:schemeClr val="tx1"/>
+        </a:solidFill>
+        <a:latin typeface="+mn-lt"/>
+        <a:ea typeface="+mn-ea"/>
+        <a:cs typeface="+mn-cs"/>
+      </a:defRPr>
+    </a:lvl7pPr>
+    <a:lvl8pPr marL="3200400" algn="l" defTabSz="914400" rtl="0" eaLnBrk="1" latinLnBrk="0" hangingPunct="1">
+      <a:defRPr sz="1200" kern="1200">
+        <a:solidFill>
+          <a:schemeClr val="tx1"/>
+        </a:solidFill>
+        <a:latin typeface="+mn-lt"/>
+        <a:ea typeface="+mn-ea"/>
+        <a:cs typeface="+mn-cs"/>
+      </a:defRPr>
+    </a:lvl8pPr>
+    <a:lvl9pPr marL="3657600" algn="l" defTabSz="914400" rtl="0" eaLnBrk="1" latinLnBrk="0" hangingPunct="1">
+      <a:defRPr sz="1200" kern="1200">
+        <a:solidFill>
+          <a:schemeClr val="tx1"/>
+        </a:solidFill>
+        <a:latin typeface="+mn-lt"/>
+        <a:ea typeface="+mn-ea"/>
+        <a:cs typeface="+mn-cs"/>
+      </a:defRPr>
+    </a:lvl9pPr>
+  </p:notesStyle>
+</p:notesMaster>
+</file>
+
+<file path=ppt/notesSlides/notesSlide1.xml><?xml version="1.0" encoding="utf-8"?>
+<p:notes xmlns:a="http://schemas.openxmlformats.org/drawingml/2006/main" xmlns:r="http://schemas.openxmlformats.org/officeDocument/2006/relationships" xmlns:p="http://schemas.openxmlformats.org/presentationml/2006/main">
+  <p:cSld>
+    <p:spTree>
+      <p:nvGrpSpPr>
+        <p:cNvPr id="1" name=""/>
+        <p:cNvGrpSpPr/>
+        <p:nvPr/>
+      </p:nvGrpSpPr>
+      <p:grpSpPr>
+        <a:xfrm>
+          <a:off x="0" y="0"/>
+          <a:ext cx="0" cy="0"/>
+          <a:chOff x="0" y="0"/>
+          <a:chExt cx="0" cy="0"/>
+        </a:xfrm>
+      </p:grpSpPr>
+      <p:sp>
+        <p:nvSpPr>
+          <p:cNvPr id="2" name="Folienbildplatzhalter 1"/>
+          <p:cNvSpPr>
+            <a:spLocks noGrp="1" noRot="1" noChangeAspect="1"/>
+          </p:cNvSpPr>
+          <p:nvPr>
+            <p:ph type="sldImg"/>
+          </p:nvPr>
+        </p:nvSpPr>
+        <p:spPr/>
+      </p:sp>
+      <p:sp>
+        <p:nvSpPr>
+          <p:cNvPr id="3" name="Notizenplatzhalter 2"/>
+          <p:cNvSpPr>
+            <a:spLocks noGrp="1"/>
+          </p:cNvSpPr>
+          <p:nvPr>
+            <p:ph type="body" idx="1"/>
+          </p:nvPr>
+        </p:nvSpPr>
+        <p:spPr/>
+        <p:txBody>
+          <a:bodyPr/>
+          <a:lstStyle/>
+          <a:p>
+            <a:endParaRPr lang="de-DE"/>
+          </a:p>
+        </p:txBody>
+      </p:sp>
+      <p:sp>
+        <p:nvSpPr>
+          <p:cNvPr id="4" name="Foliennummernplatzhalter 3"/>
+          <p:cNvSpPr>
+            <a:spLocks noGrp="1"/>
+          </p:cNvSpPr>
+          <p:nvPr>
+            <p:ph type="sldNum" sz="quarter" idx="10"/>
+          </p:nvPr>
+        </p:nvSpPr>
+        <p:spPr/>
+        <p:txBody>
+          <a:bodyPr/>
+          <a:lstStyle/>
+          <a:p>
+            <a:fld id="{ACEF6541-0B57-4735-9721-132D0EA6884F}" type="slidenum">
+              <a:rPr lang="de-DE" smtClean="0"/>
+              <a:t>1</a:t>
+            </a:fld>
+            <a:endParaRPr lang="de-DE"/>
+          </a:p>
+        </p:txBody>
+      </p:sp>
+    </p:spTree>
+    <p:extLst>
+      <p:ext uri="{BB962C8B-B14F-4D97-AF65-F5344CB8AC3E}">
+        <p14:creationId xmlns:p14="http://schemas.microsoft.com/office/powerpoint/2010/main" val="2907391949"/>
+      </p:ext>
+    </p:extLst>
+  </p:cSld>
+  <p:clrMapOvr>
+    <a:masterClrMapping/>
+  </p:clrMapOvr>
+</p:notes>
+</file>
+
 <file path=ppt/slideLayouts/slideLayout1.xml><?xml version="1.0" encoding="utf-8"?>
 <p:sldLayout xmlns:a="http://schemas.openxmlformats.org/drawingml/2006/main" xmlns:r="http://schemas.openxmlformats.org/officeDocument/2006/relationships" xmlns:p="http://schemas.openxmlformats.org/presentationml/2006/main" showMasterSp="0" type="title" preserve="1">
   <p:cSld name="Titelfolie">
@@ -307,10 +745,9 @@
           <a:bodyPr/>
           <a:lstStyle/>
           <a:p>
-            <a:fld id="{451DEABC-D766-4322-8E78-B830FAE35C72}" type="datetime4">
+            <a:fld id="{26AAB5AE-EDBA-47FA-A932-3B8483F74A48}" type="datetime4">
               <a:rPr lang="en-US" smtClean="0"/>
-              <a:pPr/>
-              <a:t>Oktober 25, 2015</a:t>
+              <a:t>October 25, 2015</a:t>
             </a:fld>
             <a:endParaRPr lang="en-US" dirty="0"/>
           </a:p>
@@ -574,10 +1011,9 @@
           <a:bodyPr/>
           <a:lstStyle/>
           <a:p>
-            <a:fld id="{F3131F9E-604E-4343-9F29-EF72E8231CAD}" type="datetime4">
+            <a:fld id="{AF5EC155-B568-46B2-924D-46FED40F495C}" type="datetime4">
               <a:rPr lang="en-US" smtClean="0"/>
-              <a:pPr/>
-              <a:t>Oktober 25, 2015</a:t>
+              <a:t>October 25, 2015</a:t>
             </a:fld>
             <a:endParaRPr lang="en-US"/>
           </a:p>
@@ -751,10 +1187,9 @@
           <a:bodyPr/>
           <a:lstStyle/>
           <a:p>
-            <a:fld id="{34A8E1CE-37F8-4102-8DF9-852A0A51F293}" type="datetime4">
+            <a:fld id="{6CC6A14D-158D-4077-829B-2D1DDC7923E6}" type="datetime4">
               <a:rPr lang="en-US" smtClean="0"/>
-              <a:pPr/>
-              <a:t>Oktober 25, 2015</a:t>
+              <a:t>October 25, 2015</a:t>
             </a:fld>
             <a:endParaRPr lang="en-US"/>
           </a:p>
@@ -918,10 +1353,9 @@
           <a:bodyPr/>
           <a:lstStyle/>
           <a:p>
-            <a:fld id="{93333F43-3E86-47E4-BFBB-2476D384E1C6}" type="datetime4">
+            <a:fld id="{64556DE9-9DC2-4D56-AB7D-81252CDA6B9C}" type="datetime4">
               <a:rPr lang="en-US" smtClean="0"/>
-              <a:pPr/>
-              <a:t>Oktober 25, 2015</a:t>
+              <a:t>October 25, 2015</a:t>
             </a:fld>
             <a:endParaRPr lang="en-US"/>
           </a:p>
@@ -1169,10 +1603,9 @@
           <a:bodyPr/>
           <a:lstStyle/>
           <a:p>
-            <a:fld id="{751663BA-01FC-4367-B6F3-ABB2645D55F1}" type="datetime4">
+            <a:fld id="{9D7765A7-0F5A-437B-9A37-BFC98AB18B32}" type="datetime4">
               <a:rPr lang="en-US" smtClean="0"/>
-              <a:pPr/>
-              <a:t>Oktober 25, 2015</a:t>
+              <a:t>October 25, 2015</a:t>
             </a:fld>
             <a:endParaRPr lang="en-US" dirty="0"/>
           </a:p>
@@ -1454,10 +1887,9 @@
           <a:bodyPr/>
           <a:lstStyle/>
           <a:p>
-            <a:fld id="{79B19C71-EC74-44AF-B27E-FC7DC3C3A61D}" type="datetime4">
+            <a:fld id="{74F83D08-AC39-4CB7-9DB9-ED318770A49C}" type="datetime4">
               <a:rPr lang="en-US" smtClean="0"/>
-              <a:pPr/>
-              <a:t>Oktober 25, 2015</a:t>
+              <a:t>October 25, 2015</a:t>
             </a:fld>
             <a:endParaRPr lang="en-US"/>
           </a:p>
@@ -1895,10 +2327,9 @@
           <a:bodyPr/>
           <a:lstStyle/>
           <a:p>
-            <a:fld id="{6A5CDA29-3CBE-48EA-92AE-A996835462BA}" type="datetime4">
+            <a:fld id="{04517CB8-C3F6-448E-AFEF-F1A796D32017}" type="datetime4">
               <a:rPr lang="en-US" smtClean="0"/>
-              <a:pPr/>
-              <a:t>Oktober 25, 2015</a:t>
+              <a:t>October 25, 2015</a:t>
             </a:fld>
             <a:endParaRPr lang="en-US"/>
           </a:p>
@@ -2010,10 +2441,9 @@
           <a:bodyPr/>
           <a:lstStyle/>
           <a:p>
-            <a:fld id="{E29EC054-3869-4501-B163-1BBFDE8DCE04}" type="datetime4">
+            <a:fld id="{B1FB6EE3-B82F-4090-8968-1EC6DF626FDC}" type="datetime4">
               <a:rPr lang="en-US" smtClean="0"/>
-              <a:pPr/>
-              <a:t>Oktober 25, 2015</a:t>
+              <a:t>October 25, 2015</a:t>
             </a:fld>
             <a:endParaRPr lang="en-US"/>
           </a:p>
@@ -2102,10 +2532,9 @@
           <a:bodyPr/>
           <a:lstStyle/>
           <a:p>
-            <a:fld id="{0A63D831-56C1-49CF-8EF7-8B9A98402BCD}" type="datetime4">
+            <a:fld id="{E538492C-12CA-4D8E-AB73-D68EB5429797}" type="datetime4">
               <a:rPr lang="en-US" smtClean="0"/>
-              <a:pPr/>
-              <a:t>Oktober 25, 2015</a:t>
+              <a:t>October 25, 2015</a:t>
             </a:fld>
             <a:endParaRPr lang="en-US"/>
           </a:p>
@@ -2346,10 +2775,9 @@
           <a:bodyPr/>
           <a:lstStyle/>
           <a:p>
-            <a:fld id="{6EAD5615-7F4F-4584-84D5-CC95918C321F}" type="datetime4">
+            <a:fld id="{215C23B5-974B-4F65-85FD-C4494DB439B9}" type="datetime4">
               <a:rPr lang="en-US" smtClean="0"/>
-              <a:pPr/>
-              <a:t>Oktober 25, 2015</a:t>
+              <a:t>October 25, 2015</a:t>
             </a:fld>
             <a:endParaRPr lang="en-US"/>
           </a:p>
@@ -2642,10 +3070,9 @@
           <a:bodyPr/>
           <a:lstStyle/>
           <a:p>
-            <a:fld id="{76EEA923-9BEE-48CE-9F28-5B525F399BAD}" type="datetime4">
+            <a:fld id="{8FB5F24B-0671-493D-982D-10E320082A00}" type="datetime4">
               <a:rPr lang="en-US" smtClean="0"/>
-              <a:pPr/>
-              <a:t>Oktober 25, 2015</a:t>
+              <a:t>October 25, 2015</a:t>
             </a:fld>
             <a:endParaRPr lang="en-US"/>
           </a:p>
@@ -2938,10 +3365,9 @@
             </a:lvl1pPr>
           </a:lstStyle>
           <a:p>
-            <a:fld id="{17D0EFEE-2756-4A20-BF2A-63F0A94F99AC}" type="datetime4">
+            <a:fld id="{25383B18-4F28-4955-B37C-87BB10270D80}" type="datetime4">
               <a:rPr lang="en-US" smtClean="0"/>
-              <a:pPr/>
-              <a:t>Oktober 25, 2015</a:t>
+              <a:t>October 25, 2015</a:t>
             </a:fld>
             <a:endParaRPr lang="en-US" dirty="0"/>
           </a:p>
@@ -3130,7 +3556,7 @@
     <p:sldLayoutId id="2147483922" r:id="rId10"/>
     <p:sldLayoutId id="2147483923" r:id="rId11"/>
   </p:sldLayoutIdLst>
-  <p:hf sldNum="0" hdr="0" ftr="0" dt="0"/>
+  <p:hf hdr="0" ftr="0" dt="0"/>
   <p:txStyles>
     <p:titleStyle>
       <a:lvl1pPr algn="l" defTabSz="914400" rtl="0" eaLnBrk="1" latinLnBrk="0" hangingPunct="1">
@@ -3559,7 +3985,7 @@
   <p:timing>
     <p:tnLst>
       <p:par>
-        <p:cTn xmlns:p14="http://schemas.microsoft.com/office/powerpoint/2010/main" id="1" dur="indefinite" restart="never" nodeType="tmRoot"/>
+        <p:cTn id="1" dur="indefinite" restart="never" nodeType="tmRoot"/>
       </p:par>
     </p:tnLst>
   </p:timing>
@@ -3595,14 +4021,12 @@
         </p:nvSpPr>
         <p:spPr/>
         <p:txBody>
-          <a:bodyPr>
-            <a:normAutofit fontScale="90000"/>
-          </a:bodyPr>
+          <a:bodyPr/>
           <a:lstStyle/>
           <a:p>
             <a:r>
               <a:rPr lang="de-DE" dirty="0" smtClean="0"/>
-              <a:t>Vielen dank für ihre Aufmerksamkeit</a:t>
+              <a:t>Anwendungen</a:t>
             </a:r>
             <a:endParaRPr lang="de-DE" dirty="0"/>
           </a:p>
@@ -3623,53 +4047,34 @@
           <a:bodyPr/>
           <a:lstStyle/>
           <a:p>
+            <a:pPr marL="342900" indent="-342900">
+              <a:buFontTx/>
+              <a:buChar char="-"/>
+            </a:pPr>
             <a:r>
               <a:rPr lang="de-DE" dirty="0" smtClean="0"/>
-              <a:t>Fragen?</a:t>
-            </a:r>
-          </a:p>
-          <a:p>
-            <a:endParaRPr lang="de-DE" dirty="0"/>
-          </a:p>
-          <a:p>
-            <a:endParaRPr lang="de-DE" dirty="0" smtClean="0"/>
-          </a:p>
-          <a:p>
-            <a:endParaRPr lang="de-DE" dirty="0"/>
-          </a:p>
-          <a:p>
-            <a:endParaRPr lang="de-DE" dirty="0" smtClean="0"/>
-          </a:p>
-          <a:p>
+              <a:t>Ersatz von mechanischen Schaltern</a:t>
+            </a:r>
+          </a:p>
+          <a:p>
+            <a:pPr marL="342900" indent="-342900">
+              <a:buFontTx/>
+              <a:buChar char="-"/>
+            </a:pPr>
             <a:r>
               <a:rPr lang="de-DE" dirty="0" smtClean="0"/>
-              <a:t>Kontakt:</a:t>
-            </a:r>
-          </a:p>
-          <a:p>
+              <a:t>Abstandsmessung</a:t>
+            </a:r>
+          </a:p>
+          <a:p>
+            <a:pPr marL="342900" indent="-342900">
+              <a:buFontTx/>
+              <a:buChar char="-"/>
+            </a:pPr>
             <a:r>
               <a:rPr lang="de-DE" dirty="0" smtClean="0"/>
-              <a:t>Ulf Schmelzer (ulscit01@hs-esslingen.de)</a:t>
-            </a:r>
-          </a:p>
-          <a:p>
-            <a:r>
-              <a:rPr lang="de-DE" dirty="0" smtClean="0"/>
-              <a:t>Antonio </a:t>
-            </a:r>
-            <a:r>
-              <a:rPr lang="de-DE" dirty="0" err="1" smtClean="0"/>
-              <a:t>Parrotta</a:t>
-            </a:r>
-            <a:r>
-              <a:rPr lang="de-DE" dirty="0"/>
-              <a:t> </a:t>
-            </a:r>
-            <a:r>
-              <a:rPr lang="de-DE" dirty="0" smtClean="0"/>
-              <a:t>(anpait00@hs-esslingen.de)</a:t>
-            </a:r>
-            <a:endParaRPr lang="de-DE" dirty="0"/>
+              <a:t>Unwucht Erkennung in Waschmaschinen</a:t>
+            </a:r>
           </a:p>
         </p:txBody>
       </p:sp>
@@ -3724,10 +4129,39 @@
           </a:p>
         </p:txBody>
       </p:sp>
+      <p:sp>
+        <p:nvSpPr>
+          <p:cNvPr id="4" name="Foliennummernplatzhalter 3"/>
+          <p:cNvSpPr>
+            <a:spLocks noGrp="1"/>
+          </p:cNvSpPr>
+          <p:nvPr>
+            <p:ph type="sldNum" sz="quarter" idx="12"/>
+          </p:nvPr>
+        </p:nvSpPr>
+        <p:spPr>
+          <a:xfrm>
+            <a:off x="8227377" y="5885497"/>
+            <a:ext cx="1315721" cy="365125"/>
+          </a:xfrm>
+        </p:spPr>
+        <p:txBody>
+          <a:bodyPr/>
+          <a:lstStyle/>
+          <a:p>
+            <a:fld id="{F38DF745-7D3F-47F4-83A3-874385CFAA69}" type="slidenum">
+              <a:rPr lang="en-US" smtClean="0"/>
+              <a:pPr/>
+              <a:t>10</a:t>
+            </a:fld>
+            <a:endParaRPr lang="en-US" dirty="0"/>
+          </a:p>
+        </p:txBody>
+      </p:sp>
     </p:spTree>
     <p:extLst>
       <p:ext uri="{BB962C8B-B14F-4D97-AF65-F5344CB8AC3E}">
-        <p14:creationId xmlns:p14="http://schemas.microsoft.com/office/powerpoint/2010/main" val="202598775"/>
+        <p14:creationId xmlns:p14="http://schemas.microsoft.com/office/powerpoint/2010/main" val="3305900296"/>
       </p:ext>
     </p:extLst>
   </p:cSld>
@@ -3737,7 +4171,7 @@
 </p:sld>
 </file>
 
-<file path=ppt/slides/slide2.xml><?xml version="1.0" encoding="utf-8"?>
+<file path=ppt/slides/slide11.xml><?xml version="1.0" encoding="utf-8"?>
 <p:sld xmlns:a="http://schemas.openxmlformats.org/drawingml/2006/main" xmlns:r="http://schemas.openxmlformats.org/officeDocument/2006/relationships" xmlns:p="http://schemas.openxmlformats.org/presentationml/2006/main">
   <p:cSld>
     <p:spTree>
@@ -3766,12 +4200,14 @@
         </p:nvSpPr>
         <p:spPr/>
         <p:txBody>
-          <a:bodyPr/>
+          <a:bodyPr>
+            <a:normAutofit fontScale="90000"/>
+          </a:bodyPr>
           <a:lstStyle/>
           <a:p>
             <a:r>
               <a:rPr lang="de-DE" dirty="0" smtClean="0"/>
-              <a:t>Geschichte</a:t>
+              <a:t>Vielen dank für ihre Aufmerksamkeit</a:t>
             </a:r>
             <a:endParaRPr lang="de-DE" dirty="0"/>
           </a:p>
@@ -3792,55 +4228,51 @@
           <a:bodyPr/>
           <a:lstStyle/>
           <a:p>
-            <a:pPr marL="342900" indent="-342900">
-              <a:buFontTx/>
-              <a:buChar char="-"/>
-            </a:pPr>
+            <a:r>
+              <a:rPr lang="de-DE" dirty="0" smtClean="0"/>
+              <a:t>Fragen?</a:t>
+            </a:r>
+          </a:p>
+          <a:p>
+            <a:endParaRPr lang="de-DE" dirty="0"/>
+          </a:p>
+          <a:p>
             <a:endParaRPr lang="de-DE" dirty="0" smtClean="0"/>
           </a:p>
           <a:p>
-            <a:pPr marL="342900" indent="-342900">
-              <a:buFontTx/>
-              <a:buChar char="-"/>
-            </a:pPr>
             <a:endParaRPr lang="de-DE" dirty="0"/>
           </a:p>
           <a:p>
-            <a:pPr marL="342900" indent="-342900">
-              <a:buFontTx/>
-              <a:buChar char="-"/>
-            </a:pPr>
+            <a:endParaRPr lang="de-DE" dirty="0" smtClean="0"/>
+          </a:p>
+          <a:p>
             <a:r>
               <a:rPr lang="de-DE" dirty="0" smtClean="0"/>
-              <a:t>Entwicklung durch </a:t>
+              <a:t>Kontakt:</a:t>
+            </a:r>
+          </a:p>
+          <a:p>
+            <a:r>
+              <a:rPr lang="de-DE" dirty="0" smtClean="0"/>
+              <a:t>Ulf Schmelzer (ulscit01@hs-esslingen.de)</a:t>
+            </a:r>
+          </a:p>
+          <a:p>
+            <a:r>
+              <a:rPr lang="de-DE" dirty="0" smtClean="0"/>
+              <a:t>Antonio </a:t>
             </a:r>
             <a:r>
               <a:rPr lang="de-DE" dirty="0" err="1" smtClean="0"/>
-              <a:t>Pepperl</a:t>
+              <a:t>Parrotta</a:t>
+            </a:r>
+            <a:r>
+              <a:rPr lang="de-DE" dirty="0"/>
+              <a:t> </a:t>
             </a:r>
             <a:r>
               <a:rPr lang="de-DE" dirty="0" smtClean="0"/>
-              <a:t> und Fuchs</a:t>
-            </a:r>
-          </a:p>
-          <a:p>
-            <a:pPr marL="342900" indent="-342900">
-              <a:buFontTx/>
-              <a:buChar char="-"/>
-            </a:pPr>
-            <a:r>
-              <a:rPr lang="de-DE" dirty="0" smtClean="0"/>
-              <a:t>Anfrage durch BASF</a:t>
-            </a:r>
-          </a:p>
-          <a:p>
-            <a:pPr marL="342900" indent="-342900">
-              <a:buFontTx/>
-              <a:buChar char="-"/>
-            </a:pPr>
-            <a:r>
-              <a:rPr lang="de-DE" dirty="0" smtClean="0"/>
-              <a:t>Ablösung mechanischer Schalter</a:t>
+              <a:t>(anpait00@hs-esslingen.de)</a:t>
             </a:r>
             <a:endParaRPr lang="de-DE" dirty="0"/>
           </a:p>
@@ -3893,54 +4325,53 @@
             </a:r>
           </a:p>
           <a:p>
-            <a:r>
-              <a:rPr lang="de-DE" sz="900" dirty="0" smtClean="0"/>
-              <a:t>Quelle: </a:t>
-            </a:r>
-            <a:r>
-              <a:rPr lang="de-DE" sz="900" dirty="0" err="1" smtClean="0"/>
-              <a:t>process.vogel</a:t>
-            </a:r>
-            <a:r>
-              <a:rPr lang="de-DE" sz="900" dirty="0" smtClean="0"/>
-              <a:t>, „Vergangenheit und Zukunft des </a:t>
-            </a:r>
-            <a:r>
-              <a:rPr lang="de-DE" sz="900" dirty="0"/>
-              <a:t>induktiven </a:t>
-            </a:r>
-            <a:r>
-              <a:rPr lang="de-DE" sz="900" dirty="0" smtClean="0"/>
-              <a:t>Näherungsschalters“, </a:t>
-            </a:r>
-            <a:r>
-              <a:rPr lang="de-DE" sz="900" dirty="0"/>
-              <a:t>http://www.process.vogel.de/automatisierung_prozessleittechnik/articles/145538/</a:t>
-            </a:r>
+            <a:endParaRPr lang="de-DE" sz="900" dirty="0"/>
+          </a:p>
+        </p:txBody>
+      </p:sp>
+      <p:sp>
+        <p:nvSpPr>
+          <p:cNvPr id="4" name="Foliennummernplatzhalter 3"/>
+          <p:cNvSpPr>
+            <a:spLocks noGrp="1"/>
+          </p:cNvSpPr>
+          <p:nvPr>
+            <p:ph type="sldNum" sz="quarter" idx="12"/>
+          </p:nvPr>
+        </p:nvSpPr>
+        <p:spPr>
+          <a:xfrm>
+            <a:off x="8227377" y="5885497"/>
+            <a:ext cx="1315721" cy="365125"/>
+          </a:xfrm>
+        </p:spPr>
+        <p:txBody>
+          <a:bodyPr/>
+          <a:lstStyle/>
+          <a:p>
+            <a:fld id="{F38DF745-7D3F-47F4-83A3-874385CFAA69}" type="slidenum">
+              <a:rPr lang="en-US" smtClean="0"/>
+              <a:pPr/>
+              <a:t>11</a:t>
+            </a:fld>
+            <a:endParaRPr lang="en-US" dirty="0"/>
           </a:p>
         </p:txBody>
       </p:sp>
     </p:spTree>
     <p:extLst>
       <p:ext uri="{BB962C8B-B14F-4D97-AF65-F5344CB8AC3E}">
-        <p14:creationId xmlns:p14="http://schemas.microsoft.com/office/powerpoint/2010/main" val="2516342943"/>
+        <p14:creationId xmlns:p14="http://schemas.microsoft.com/office/powerpoint/2010/main" val="202598775"/>
       </p:ext>
     </p:extLst>
   </p:cSld>
   <p:clrMapOvr>
     <a:masterClrMapping/>
   </p:clrMapOvr>
-  <p:timing>
-    <p:tnLst>
-      <p:par>
-        <p:cTn xmlns:p14="http://schemas.microsoft.com/office/powerpoint/2010/main" id="1" dur="indefinite" restart="never" nodeType="tmRoot"/>
-      </p:par>
-    </p:tnLst>
-  </p:timing>
 </p:sld>
 </file>
 
-<file path=ppt/slides/slide3.xml><?xml version="1.0" encoding="utf-8"?>
+<file path=ppt/slides/slide2.xml><?xml version="1.0" encoding="utf-8"?>
 <p:sld xmlns:a="http://schemas.openxmlformats.org/drawingml/2006/main" xmlns:r="http://schemas.openxmlformats.org/officeDocument/2006/relationships" xmlns:p="http://schemas.openxmlformats.org/presentationml/2006/main">
   <p:cSld>
     <p:spTree>
@@ -3974,123 +4405,82 @@
           <a:p>
             <a:r>
               <a:rPr lang="de-DE" dirty="0" smtClean="0"/>
+              <a:t>Agenda</a:t>
+            </a:r>
+            <a:endParaRPr lang="de-DE" dirty="0"/>
+          </a:p>
+        </p:txBody>
+      </p:sp>
+      <p:sp>
+        <p:nvSpPr>
+          <p:cNvPr id="3" name="Inhaltsplatzhalter 2"/>
+          <p:cNvSpPr>
+            <a:spLocks noGrp="1"/>
+          </p:cNvSpPr>
+          <p:nvPr>
+            <p:ph idx="1"/>
+          </p:nvPr>
+        </p:nvSpPr>
+        <p:spPr/>
+        <p:txBody>
+          <a:bodyPr/>
+          <a:lstStyle/>
+          <a:p>
+            <a:pPr marL="342900" indent="-342900">
+              <a:buFont typeface="Arial" panose="020B0604020202020204" pitchFamily="34" charset="0"/>
+              <a:buChar char="•"/>
+            </a:pPr>
+            <a:r>
+              <a:rPr lang="de-DE" dirty="0" smtClean="0"/>
+              <a:t>Geschichte</a:t>
+            </a:r>
+          </a:p>
+          <a:p>
+            <a:pPr marL="342900" indent="-342900">
+              <a:buFont typeface="Arial" panose="020B0604020202020204" pitchFamily="34" charset="0"/>
+              <a:buChar char="•"/>
+            </a:pPr>
+            <a:r>
+              <a:rPr lang="de-DE" dirty="0" smtClean="0"/>
               <a:t>Aufbau</a:t>
             </a:r>
+          </a:p>
+          <a:p>
+            <a:pPr marL="342900" indent="-342900">
+              <a:buFont typeface="Arial" panose="020B0604020202020204" pitchFamily="34" charset="0"/>
+              <a:buChar char="•"/>
+            </a:pPr>
+            <a:r>
+              <a:rPr lang="de-DE" dirty="0" smtClean="0"/>
+              <a:t>Funktionsprinzip</a:t>
+            </a:r>
+          </a:p>
+          <a:p>
+            <a:pPr marL="342900" indent="-342900">
+              <a:buFont typeface="Arial" panose="020B0604020202020204" pitchFamily="34" charset="0"/>
+              <a:buChar char="•"/>
+            </a:pPr>
+            <a:r>
+              <a:rPr lang="de-DE" dirty="0" smtClean="0"/>
+              <a:t>Vor- und Nachteile</a:t>
+            </a:r>
+          </a:p>
+          <a:p>
+            <a:pPr marL="342900" indent="-342900">
+              <a:buFont typeface="Arial" panose="020B0604020202020204" pitchFamily="34" charset="0"/>
+              <a:buChar char="•"/>
+            </a:pPr>
+            <a:r>
+              <a:rPr lang="de-DE" dirty="0" smtClean="0"/>
+              <a:t>Anwendung</a:t>
+            </a:r>
             <a:endParaRPr lang="de-DE" dirty="0"/>
           </a:p>
         </p:txBody>
       </p:sp>
       <p:sp>
         <p:nvSpPr>
-          <p:cNvPr id="3" name="Inhaltsplatzhalter 2"/>
-          <p:cNvSpPr>
-            <a:spLocks noGrp="1"/>
-          </p:cNvSpPr>
-          <p:nvPr>
-            <p:ph idx="1"/>
-          </p:nvPr>
-        </p:nvSpPr>
-        <p:spPr>
-          <a:xfrm>
-            <a:off x="457200" y="1752600"/>
-            <a:ext cx="4114800" cy="4373563"/>
-          </a:xfrm>
-        </p:spPr>
-        <p:txBody>
-          <a:bodyPr/>
-          <a:lstStyle/>
-          <a:p>
-            <a:pPr marL="342900" indent="-342900">
-              <a:buFontTx/>
-              <a:buChar char="-"/>
-            </a:pPr>
-            <a:r>
-              <a:rPr lang="de-DE" dirty="0" smtClean="0"/>
-              <a:t>Durch Spule erzeugtes Wechselfeld</a:t>
-            </a:r>
-          </a:p>
-          <a:p>
-            <a:pPr marL="342900" indent="-342900">
-              <a:buFontTx/>
-              <a:buChar char="-"/>
-            </a:pPr>
-            <a:r>
-              <a:rPr lang="de-DE" dirty="0" smtClean="0"/>
-              <a:t>Richten des Magnetfelds </a:t>
-            </a:r>
-          </a:p>
-          <a:p>
-            <a:r>
-              <a:rPr lang="de-DE" dirty="0"/>
-              <a:t> </a:t>
-            </a:r>
-            <a:r>
-              <a:rPr lang="de-DE" dirty="0" smtClean="0"/>
-              <a:t>    Durch Ferrit Kern</a:t>
-            </a:r>
-            <a:endParaRPr lang="de-DE" dirty="0"/>
-          </a:p>
-          <a:p>
-            <a:pPr marL="342900" indent="-342900">
-              <a:buFontTx/>
-              <a:buChar char="-"/>
-            </a:pPr>
-            <a:r>
-              <a:rPr lang="de-DE" dirty="0" smtClean="0"/>
-              <a:t>Gehäuse zum Schutz gegen </a:t>
-            </a:r>
-          </a:p>
-          <a:p>
-            <a:r>
-              <a:rPr lang="de-DE" dirty="0"/>
-              <a:t> </a:t>
-            </a:r>
-            <a:r>
-              <a:rPr lang="de-DE" dirty="0" smtClean="0"/>
-              <a:t>     mechanische Einflüsse</a:t>
-            </a:r>
-          </a:p>
-          <a:p>
-            <a:pPr marL="342900" indent="-342900">
-              <a:buFontTx/>
-              <a:buChar char="-"/>
-            </a:pPr>
-            <a:endParaRPr lang="de-DE" dirty="0" smtClean="0"/>
-          </a:p>
-        </p:txBody>
-      </p:sp>
-      <p:pic>
-        <p:nvPicPr>
-          <p:cNvPr id="4" name="Bild 3" descr="magnetfeld_sensor.PNG"/>
-          <p:cNvPicPr>
-            <a:picLocks noChangeAspect="1"/>
-          </p:cNvPicPr>
-          <p:nvPr/>
-        </p:nvPicPr>
-        <p:blipFill rotWithShape="1">
-          <a:blip r:embed="rId2" cstate="email">
-            <a:extLst>
-              <a:ext uri="{28A0092B-C50C-407E-A947-70E740481C1C}">
-                <a14:useLocalDpi xmlns:a14="http://schemas.microsoft.com/office/drawing/2010/main" val="0"/>
-              </a:ext>
-            </a:extLst>
-          </a:blip>
-          <a:srcRect l="11023" r="8386"/>
-          <a:stretch/>
-        </p:blipFill>
-        <p:spPr>
-          <a:xfrm>
-            <a:off x="4572000" y="1752600"/>
-            <a:ext cx="4102100" cy="4499394"/>
-          </a:xfrm>
-          <a:prstGeom prst="rect">
-            <a:avLst/>
-          </a:prstGeom>
-        </p:spPr>
-      </p:pic>
-      <p:sp>
-        <p:nvSpPr>
-          <p:cNvPr id="6" name="Rechteck 5"/>
+          <p:cNvPr id="4" name="Rechteck 3"/>
           <p:cNvSpPr/>
           <p:nvPr/>
         </p:nvSpPr>
@@ -4135,12 +4525,485 @@
             </a:r>
           </a:p>
           <a:p>
+            <a:endParaRPr lang="de-DE" sz="900" dirty="0"/>
+          </a:p>
+        </p:txBody>
+      </p:sp>
+      <p:sp>
+        <p:nvSpPr>
+          <p:cNvPr id="5" name="Foliennummernplatzhalter 4"/>
+          <p:cNvSpPr>
+            <a:spLocks noGrp="1"/>
+          </p:cNvSpPr>
+          <p:nvPr>
+            <p:ph type="sldNum" sz="quarter" idx="12"/>
+          </p:nvPr>
+        </p:nvSpPr>
+        <p:spPr>
+          <a:xfrm>
+            <a:off x="8227377" y="5885497"/>
+            <a:ext cx="1315721" cy="365125"/>
+          </a:xfrm>
+        </p:spPr>
+        <p:txBody>
+          <a:bodyPr/>
+          <a:lstStyle/>
+          <a:p>
+            <a:fld id="{F38DF745-7D3F-47F4-83A3-874385CFAA69}" type="slidenum">
+              <a:rPr lang="en-US" smtClean="0"/>
+              <a:pPr/>
+              <a:t>2</a:t>
+            </a:fld>
+            <a:endParaRPr lang="en-US" dirty="0"/>
+          </a:p>
+        </p:txBody>
+      </p:sp>
+    </p:spTree>
+    <p:extLst>
+      <p:ext uri="{BB962C8B-B14F-4D97-AF65-F5344CB8AC3E}">
+        <p14:creationId xmlns:p14="http://schemas.microsoft.com/office/powerpoint/2010/main" val="732825044"/>
+      </p:ext>
+    </p:extLst>
+  </p:cSld>
+  <p:clrMapOvr>
+    <a:masterClrMapping/>
+  </p:clrMapOvr>
+</p:sld>
+</file>
+
+<file path=ppt/slides/slide3.xml><?xml version="1.0" encoding="utf-8"?>
+<p:sld xmlns:a="http://schemas.openxmlformats.org/drawingml/2006/main" xmlns:r="http://schemas.openxmlformats.org/officeDocument/2006/relationships" xmlns:p="http://schemas.openxmlformats.org/presentationml/2006/main">
+  <p:cSld>
+    <p:spTree>
+      <p:nvGrpSpPr>
+        <p:cNvPr id="1" name=""/>
+        <p:cNvGrpSpPr/>
+        <p:nvPr/>
+      </p:nvGrpSpPr>
+      <p:grpSpPr>
+        <a:xfrm>
+          <a:off x="0" y="0"/>
+          <a:ext cx="0" cy="0"/>
+          <a:chOff x="0" y="0"/>
+          <a:chExt cx="0" cy="0"/>
+        </a:xfrm>
+      </p:grpSpPr>
+      <p:sp>
+        <p:nvSpPr>
+          <p:cNvPr id="2" name="Titel 1"/>
+          <p:cNvSpPr>
+            <a:spLocks noGrp="1"/>
+          </p:cNvSpPr>
+          <p:nvPr>
+            <p:ph type="title"/>
+          </p:nvPr>
+        </p:nvSpPr>
+        <p:spPr/>
+        <p:txBody>
+          <a:bodyPr/>
+          <a:lstStyle/>
+          <a:p>
+            <a:r>
+              <a:rPr lang="de-DE" dirty="0" smtClean="0"/>
+              <a:t>Geschichte</a:t>
+            </a:r>
+            <a:endParaRPr lang="de-DE" dirty="0"/>
+          </a:p>
+        </p:txBody>
+      </p:sp>
+      <p:sp>
+        <p:nvSpPr>
+          <p:cNvPr id="3" name="Inhaltsplatzhalter 2"/>
+          <p:cNvSpPr>
+            <a:spLocks noGrp="1"/>
+          </p:cNvSpPr>
+          <p:nvPr>
+            <p:ph idx="1"/>
+          </p:nvPr>
+        </p:nvSpPr>
+        <p:spPr/>
+        <p:txBody>
+          <a:bodyPr/>
+          <a:lstStyle/>
+          <a:p>
+            <a:pPr marL="342900" indent="-342900">
+              <a:buFontTx/>
+              <a:buChar char="-"/>
+            </a:pPr>
+            <a:endParaRPr lang="de-DE" dirty="0" smtClean="0"/>
+          </a:p>
+          <a:p>
+            <a:pPr marL="342900" indent="-342900">
+              <a:buFontTx/>
+              <a:buChar char="-"/>
+            </a:pPr>
+            <a:endParaRPr lang="de-DE" dirty="0"/>
+          </a:p>
+          <a:p>
+            <a:pPr marL="342900" indent="-342900">
+              <a:buFontTx/>
+              <a:buChar char="-"/>
+            </a:pPr>
+            <a:r>
+              <a:rPr lang="de-DE" dirty="0" smtClean="0"/>
+              <a:t>Entwicklung durch </a:t>
+            </a:r>
+            <a:r>
+              <a:rPr lang="de-DE" dirty="0" err="1" smtClean="0"/>
+              <a:t>Pepperl</a:t>
+            </a:r>
+            <a:r>
+              <a:rPr lang="de-DE" dirty="0" smtClean="0"/>
+              <a:t> und Fuchs</a:t>
+            </a:r>
+          </a:p>
+          <a:p>
+            <a:pPr marL="342900" indent="-342900">
+              <a:buFontTx/>
+              <a:buChar char="-"/>
+            </a:pPr>
+            <a:r>
+              <a:rPr lang="de-DE" dirty="0" smtClean="0"/>
+              <a:t>Anfrage durch BASF</a:t>
+            </a:r>
+          </a:p>
+          <a:p>
+            <a:pPr marL="342900" indent="-342900">
+              <a:buFontTx/>
+              <a:buChar char="-"/>
+            </a:pPr>
+            <a:r>
+              <a:rPr lang="de-DE" dirty="0" smtClean="0"/>
+              <a:t>Ablösung mechanischer Schalter</a:t>
+            </a:r>
+            <a:endParaRPr lang="de-DE" dirty="0"/>
+          </a:p>
+        </p:txBody>
+      </p:sp>
+      <p:sp>
+        <p:nvSpPr>
+          <p:cNvPr id="5" name="Rechteck 4"/>
+          <p:cNvSpPr/>
+          <p:nvPr/>
+        </p:nvSpPr>
+        <p:spPr>
+          <a:xfrm>
+            <a:off x="0" y="6504971"/>
+            <a:ext cx="9144000" cy="393539"/>
+          </a:xfrm>
+          <a:prstGeom prst="rect">
+            <a:avLst/>
+          </a:prstGeom>
+          <a:solidFill>
+            <a:schemeClr val="tx1"/>
+          </a:solidFill>
+          <a:ln>
+            <a:noFill/>
+          </a:ln>
+        </p:spPr>
+        <p:style>
+          <a:lnRef idx="2">
+            <a:schemeClr val="accent1">
+              <a:shade val="50000"/>
+            </a:schemeClr>
+          </a:lnRef>
+          <a:fillRef idx="1">
+            <a:schemeClr val="accent1"/>
+          </a:fillRef>
+          <a:effectRef idx="0">
+            <a:schemeClr val="accent1"/>
+          </a:effectRef>
+          <a:fontRef idx="minor">
+            <a:schemeClr val="lt1"/>
+          </a:fontRef>
+        </p:style>
+        <p:txBody>
+          <a:bodyPr rtlCol="0" anchor="ctr"/>
+          <a:lstStyle/>
+          <a:p>
+            <a:r>
+              <a:rPr lang="de-DE" sz="900" dirty="0" smtClean="0"/>
+              <a:t>Antonio Parrotta &amp; Ulf Schmelzer, Embedded Systems Software, Vortrag: Induktive Sensoren 26.10.2015</a:t>
+            </a:r>
+          </a:p>
+          <a:p>
             <a:r>
               <a:rPr lang="de-DE" sz="900" dirty="0" smtClean="0"/>
               <a:t>Quelle: </a:t>
             </a:r>
             <a:r>
               <a:rPr lang="de-DE" sz="900" dirty="0" err="1" smtClean="0"/>
+              <a:t>process.vogel</a:t>
+            </a:r>
+            <a:r>
+              <a:rPr lang="de-DE" sz="900" dirty="0" smtClean="0"/>
+              <a:t>, „Vergangenheit und Zukunft des </a:t>
+            </a:r>
+            <a:r>
+              <a:rPr lang="de-DE" sz="900" dirty="0"/>
+              <a:t>induktiven </a:t>
+            </a:r>
+            <a:r>
+              <a:rPr lang="de-DE" sz="900" dirty="0" smtClean="0"/>
+              <a:t>Näherungsschalters“, </a:t>
+            </a:r>
+            <a:r>
+              <a:rPr lang="de-DE" sz="900" dirty="0"/>
+              <a:t>http://www.process.vogel.de/automatisierung_prozessleittechnik/articles/145538/</a:t>
+            </a:r>
+          </a:p>
+        </p:txBody>
+      </p:sp>
+      <p:sp>
+        <p:nvSpPr>
+          <p:cNvPr id="4" name="Foliennummernplatzhalter 3"/>
+          <p:cNvSpPr>
+            <a:spLocks noGrp="1"/>
+          </p:cNvSpPr>
+          <p:nvPr>
+            <p:ph type="sldNum" sz="quarter" idx="12"/>
+          </p:nvPr>
+        </p:nvSpPr>
+        <p:spPr>
+          <a:xfrm>
+            <a:off x="8227377" y="5885497"/>
+            <a:ext cx="1315721" cy="365125"/>
+          </a:xfrm>
+        </p:spPr>
+        <p:txBody>
+          <a:bodyPr/>
+          <a:lstStyle/>
+          <a:p>
+            <a:fld id="{F38DF745-7D3F-47F4-83A3-874385CFAA69}" type="slidenum">
+              <a:rPr lang="en-US" smtClean="0"/>
+              <a:pPr/>
+              <a:t>3</a:t>
+            </a:fld>
+            <a:endParaRPr lang="en-US" dirty="0"/>
+          </a:p>
+        </p:txBody>
+      </p:sp>
+    </p:spTree>
+    <p:extLst>
+      <p:ext uri="{BB962C8B-B14F-4D97-AF65-F5344CB8AC3E}">
+        <p14:creationId xmlns:p14="http://schemas.microsoft.com/office/powerpoint/2010/main" val="2516342943"/>
+      </p:ext>
+    </p:extLst>
+  </p:cSld>
+  <p:clrMapOvr>
+    <a:masterClrMapping/>
+  </p:clrMapOvr>
+  <p:timing>
+    <p:tnLst>
+      <p:par>
+        <p:cTn id="1" dur="indefinite" restart="never" nodeType="tmRoot"/>
+      </p:par>
+    </p:tnLst>
+  </p:timing>
+</p:sld>
+</file>
+
+<file path=ppt/slides/slide4.xml><?xml version="1.0" encoding="utf-8"?>
+<p:sld xmlns:a="http://schemas.openxmlformats.org/drawingml/2006/main" xmlns:r="http://schemas.openxmlformats.org/officeDocument/2006/relationships" xmlns:p="http://schemas.openxmlformats.org/presentationml/2006/main">
+  <p:cSld>
+    <p:spTree>
+      <p:nvGrpSpPr>
+        <p:cNvPr id="1" name=""/>
+        <p:cNvGrpSpPr/>
+        <p:nvPr/>
+      </p:nvGrpSpPr>
+      <p:grpSpPr>
+        <a:xfrm>
+          <a:off x="0" y="0"/>
+          <a:ext cx="0" cy="0"/>
+          <a:chOff x="0" y="0"/>
+          <a:chExt cx="0" cy="0"/>
+        </a:xfrm>
+      </p:grpSpPr>
+      <p:sp>
+        <p:nvSpPr>
+          <p:cNvPr id="2" name="Titel 1"/>
+          <p:cNvSpPr>
+            <a:spLocks noGrp="1"/>
+          </p:cNvSpPr>
+          <p:nvPr>
+            <p:ph type="title"/>
+          </p:nvPr>
+        </p:nvSpPr>
+        <p:spPr/>
+        <p:txBody>
+          <a:bodyPr/>
+          <a:lstStyle/>
+          <a:p>
+            <a:r>
+              <a:rPr lang="de-DE" dirty="0" smtClean="0"/>
+              <a:t>Aufbau</a:t>
+            </a:r>
+            <a:endParaRPr lang="de-DE" dirty="0"/>
+          </a:p>
+        </p:txBody>
+      </p:sp>
+      <p:sp>
+        <p:nvSpPr>
+          <p:cNvPr id="3" name="Inhaltsplatzhalter 2"/>
+          <p:cNvSpPr>
+            <a:spLocks noGrp="1"/>
+          </p:cNvSpPr>
+          <p:nvPr>
+            <p:ph idx="1"/>
+          </p:nvPr>
+        </p:nvSpPr>
+        <p:spPr>
+          <a:xfrm>
+            <a:off x="457200" y="1752600"/>
+            <a:ext cx="4114800" cy="4373563"/>
+          </a:xfrm>
+        </p:spPr>
+        <p:txBody>
+          <a:bodyPr/>
+          <a:lstStyle/>
+          <a:p>
+            <a:pPr marL="342900" indent="-342900">
+              <a:buFontTx/>
+              <a:buChar char="-"/>
+            </a:pPr>
+            <a:r>
+              <a:rPr lang="de-DE" dirty="0" smtClean="0"/>
+              <a:t>Durch Spule erzeugtes Wechselfeld</a:t>
+            </a:r>
+          </a:p>
+          <a:p>
+            <a:pPr marL="342900" indent="-342900">
+              <a:buFontTx/>
+              <a:buChar char="-"/>
+            </a:pPr>
+            <a:r>
+              <a:rPr lang="de-DE" dirty="0" smtClean="0"/>
+              <a:t>Richten des Magnetfelds </a:t>
+            </a:r>
+          </a:p>
+          <a:p>
+            <a:r>
+              <a:rPr lang="de-DE" dirty="0"/>
+              <a:t> </a:t>
+            </a:r>
+            <a:r>
+              <a:rPr lang="de-DE" dirty="0" smtClean="0"/>
+              <a:t>    Durch Ferrit Kern</a:t>
+            </a:r>
+            <a:endParaRPr lang="de-DE" dirty="0"/>
+          </a:p>
+          <a:p>
+            <a:pPr marL="342900" indent="-342900">
+              <a:buFontTx/>
+              <a:buChar char="-"/>
+            </a:pPr>
+            <a:r>
+              <a:rPr lang="de-DE" dirty="0" smtClean="0"/>
+              <a:t>Gehäuse zum Schutz gegen </a:t>
+            </a:r>
+          </a:p>
+          <a:p>
+            <a:r>
+              <a:rPr lang="de-DE" dirty="0"/>
+              <a:t> </a:t>
+            </a:r>
+            <a:r>
+              <a:rPr lang="de-DE" dirty="0" smtClean="0"/>
+              <a:t>     mechanische Einflüsse</a:t>
+            </a:r>
+          </a:p>
+          <a:p>
+            <a:pPr marL="342900" indent="-342900">
+              <a:buFontTx/>
+              <a:buChar char="-"/>
+            </a:pPr>
+            <a:endParaRPr lang="de-DE" dirty="0" smtClean="0"/>
+          </a:p>
+        </p:txBody>
+      </p:sp>
+      <p:pic>
+        <p:nvPicPr>
+          <p:cNvPr id="4" name="Bild 3" descr="magnetfeld_sensor.PNG"/>
+          <p:cNvPicPr>
+            <a:picLocks noChangeAspect="1"/>
+          </p:cNvPicPr>
+          <p:nvPr/>
+        </p:nvPicPr>
+        <p:blipFill rotWithShape="1">
+          <a:blip r:embed="rId2" cstate="email">
+            <a:extLst>
+              <a:ext uri="{28A0092B-C50C-407E-A947-70E740481C1C}">
+                <a14:useLocalDpi xmlns:a14="http://schemas.microsoft.com/office/drawing/2010/main" val="0"/>
+              </a:ext>
+            </a:extLst>
+          </a:blip>
+          <a:srcRect l="11023" r="8386"/>
+          <a:stretch/>
+        </p:blipFill>
+        <p:spPr>
+          <a:xfrm>
+            <a:off x="4572000" y="1752600"/>
+            <a:ext cx="4102100" cy="4499394"/>
+          </a:xfrm>
+          <a:prstGeom prst="rect">
+            <a:avLst/>
+          </a:prstGeom>
+        </p:spPr>
+      </p:pic>
+      <p:sp>
+        <p:nvSpPr>
+          <p:cNvPr id="6" name="Rechteck 5"/>
+          <p:cNvSpPr/>
+          <p:nvPr/>
+        </p:nvSpPr>
+        <p:spPr>
+          <a:xfrm>
+            <a:off x="0" y="6504971"/>
+            <a:ext cx="9144000" cy="393539"/>
+          </a:xfrm>
+          <a:prstGeom prst="rect">
+            <a:avLst/>
+          </a:prstGeom>
+          <a:solidFill>
+            <a:schemeClr val="tx1"/>
+          </a:solidFill>
+          <a:ln>
+            <a:noFill/>
+          </a:ln>
+        </p:spPr>
+        <p:style>
+          <a:lnRef idx="2">
+            <a:schemeClr val="accent1">
+              <a:shade val="50000"/>
+            </a:schemeClr>
+          </a:lnRef>
+          <a:fillRef idx="1">
+            <a:schemeClr val="accent1"/>
+          </a:fillRef>
+          <a:effectRef idx="0">
+            <a:schemeClr val="accent1"/>
+          </a:effectRef>
+          <a:fontRef idx="minor">
+            <a:schemeClr val="lt1"/>
+          </a:fontRef>
+        </p:style>
+        <p:txBody>
+          <a:bodyPr rtlCol="0" anchor="ctr"/>
+          <a:lstStyle/>
+          <a:p>
+            <a:r>
+              <a:rPr lang="de-DE" sz="900" dirty="0" smtClean="0"/>
+              <a:t>Antonio Parrotta &amp; Ulf Schmelzer, Embedded Systems Software, Vortrag: Induktive Sensoren 26.10.2015</a:t>
+            </a:r>
+          </a:p>
+          <a:p>
+            <a:r>
+              <a:rPr lang="de-DE" sz="900" dirty="0" smtClean="0"/>
+              <a:t>Quelle: </a:t>
+            </a:r>
+            <a:r>
+              <a:rPr lang="de-DE" sz="900" dirty="0" err="1" smtClean="0"/>
               <a:t>ifm</a:t>
             </a:r>
             <a:r>
@@ -4151,6 +5014,35 @@
               <a:rPr lang="de-DE" sz="900" dirty="0"/>
               <a:t>://www.ifm.com/obj/S100d.pdf</a:t>
             </a:r>
+          </a:p>
+        </p:txBody>
+      </p:sp>
+      <p:sp>
+        <p:nvSpPr>
+          <p:cNvPr id="5" name="Foliennummernplatzhalter 4"/>
+          <p:cNvSpPr>
+            <a:spLocks noGrp="1"/>
+          </p:cNvSpPr>
+          <p:nvPr>
+            <p:ph type="sldNum" sz="quarter" idx="12"/>
+          </p:nvPr>
+        </p:nvSpPr>
+        <p:spPr>
+          <a:xfrm>
+            <a:off x="8227377" y="5885497"/>
+            <a:ext cx="1315721" cy="365125"/>
+          </a:xfrm>
+        </p:spPr>
+        <p:txBody>
+          <a:bodyPr/>
+          <a:lstStyle/>
+          <a:p>
+            <a:fld id="{F38DF745-7D3F-47F4-83A3-874385CFAA69}" type="slidenum">
+              <a:rPr lang="en-US" smtClean="0"/>
+              <a:pPr/>
+              <a:t>4</a:t>
+            </a:fld>
+            <a:endParaRPr lang="en-US" dirty="0"/>
           </a:p>
         </p:txBody>
       </p:sp>
@@ -4167,14 +5059,14 @@
   <p:timing>
     <p:tnLst>
       <p:par>
-        <p:cTn xmlns:p14="http://schemas.microsoft.com/office/powerpoint/2010/main" id="1" dur="indefinite" restart="never" nodeType="tmRoot"/>
+        <p:cTn id="1" dur="indefinite" restart="never" nodeType="tmRoot"/>
       </p:par>
     </p:tnLst>
   </p:timing>
 </p:sld>
 </file>
 
-<file path=ppt/slides/slide4.xml><?xml version="1.0" encoding="utf-8"?>
+<file path=ppt/slides/slide5.xml><?xml version="1.0" encoding="utf-8"?>
 <p:sld xmlns:a="http://schemas.openxmlformats.org/drawingml/2006/main" xmlns:r="http://schemas.openxmlformats.org/officeDocument/2006/relationships" xmlns:p="http://schemas.openxmlformats.org/presentationml/2006/main">
   <p:cSld>
     <p:spTree>
@@ -4328,6 +5220,35 @@
           </a:p>
         </p:txBody>
       </p:sp>
+      <p:sp>
+        <p:nvSpPr>
+          <p:cNvPr id="3" name="Foliennummernplatzhalter 2"/>
+          <p:cNvSpPr>
+            <a:spLocks noGrp="1"/>
+          </p:cNvSpPr>
+          <p:nvPr>
+            <p:ph type="sldNum" sz="quarter" idx="12"/>
+          </p:nvPr>
+        </p:nvSpPr>
+        <p:spPr>
+          <a:xfrm>
+            <a:off x="8227377" y="5885497"/>
+            <a:ext cx="1315721" cy="365125"/>
+          </a:xfrm>
+        </p:spPr>
+        <p:txBody>
+          <a:bodyPr/>
+          <a:lstStyle/>
+          <a:p>
+            <a:fld id="{F38DF745-7D3F-47F4-83A3-874385CFAA69}" type="slidenum">
+              <a:rPr lang="en-US" smtClean="0"/>
+              <a:pPr/>
+              <a:t>5</a:t>
+            </a:fld>
+            <a:endParaRPr lang="en-US" dirty="0"/>
+          </a:p>
+        </p:txBody>
+      </p:sp>
     </p:spTree>
     <p:extLst>
       <p:ext uri="{BB962C8B-B14F-4D97-AF65-F5344CB8AC3E}">
@@ -4341,7 +5262,7 @@
 </p:sld>
 </file>
 
-<file path=ppt/slides/slide5.xml><?xml version="1.0" encoding="utf-8"?>
+<file path=ppt/slides/slide6.xml><?xml version="1.0" encoding="utf-8"?>
 <p:sld xmlns:a="http://schemas.openxmlformats.org/drawingml/2006/main" xmlns:r="http://schemas.openxmlformats.org/officeDocument/2006/relationships" xmlns:p="http://schemas.openxmlformats.org/presentationml/2006/main">
   <p:cSld>
     <p:spTree>
@@ -4553,6 +5474,35 @@
           </a:p>
         </p:txBody>
       </p:sp>
+      <p:sp>
+        <p:nvSpPr>
+          <p:cNvPr id="4" name="Foliennummernplatzhalter 3"/>
+          <p:cNvSpPr>
+            <a:spLocks noGrp="1"/>
+          </p:cNvSpPr>
+          <p:nvPr>
+            <p:ph type="sldNum" sz="quarter" idx="12"/>
+          </p:nvPr>
+        </p:nvSpPr>
+        <p:spPr>
+          <a:xfrm>
+            <a:off x="8227377" y="5885497"/>
+            <a:ext cx="1315721" cy="365125"/>
+          </a:xfrm>
+        </p:spPr>
+        <p:txBody>
+          <a:bodyPr/>
+          <a:lstStyle/>
+          <a:p>
+            <a:fld id="{F38DF745-7D3F-47F4-83A3-874385CFAA69}" type="slidenum">
+              <a:rPr lang="en-US" smtClean="0"/>
+              <a:pPr/>
+              <a:t>6</a:t>
+            </a:fld>
+            <a:endParaRPr lang="en-US" dirty="0"/>
+          </a:p>
+        </p:txBody>
+      </p:sp>
     </p:spTree>
     <p:extLst>
       <p:ext uri="{BB962C8B-B14F-4D97-AF65-F5344CB8AC3E}">
@@ -4566,7 +5516,7 @@
 </p:sld>
 </file>
 
-<file path=ppt/slides/slide6.xml><?xml version="1.0" encoding="utf-8"?>
+<file path=ppt/slides/slide7.xml><?xml version="1.0" encoding="utf-8"?>
 <p:sld xmlns:a="http://schemas.openxmlformats.org/drawingml/2006/main" xmlns:r="http://schemas.openxmlformats.org/officeDocument/2006/relationships" xmlns:p="http://schemas.openxmlformats.org/presentationml/2006/main">
   <p:cSld>
     <p:spTree>
@@ -4644,7 +5594,6 @@
               <a:rPr lang="de-DE" dirty="0" smtClean="0"/>
               <a:t>Oszillator erzeugt Wechselfeld mit 100 kHz bis 1 MHz</a:t>
             </a:r>
-            <a:endParaRPr lang="de-DE" dirty="0" smtClean="0"/>
           </a:p>
           <a:p>
             <a:pPr marL="457200" indent="-457200">
@@ -4654,7 +5603,6 @@
               <a:rPr lang="de-DE" dirty="0" smtClean="0"/>
               <a:t>Target nähert sich</a:t>
             </a:r>
-            <a:endParaRPr lang="de-DE" dirty="0" smtClean="0"/>
           </a:p>
           <a:p>
             <a:pPr marL="457200" indent="-457200">
@@ -4714,7 +5662,7 @@
         </p:blipFill>
         <p:spPr>
           <a:xfrm flipH="1">
-            <a:off x="6074903" y="1266926"/>
+            <a:off x="6138403" y="1225015"/>
             <a:ext cx="1643624" cy="3923835"/>
           </a:xfrm>
           <a:prstGeom prst="rect">
@@ -4800,7 +5748,7 @@
         </p:blipFill>
         <p:spPr>
           <a:xfrm>
-            <a:off x="5638800" y="4005522"/>
+            <a:off x="5094775" y="4005522"/>
             <a:ext cx="2844800" cy="2402407"/>
           </a:xfrm>
           <a:prstGeom prst="rect">
@@ -4874,6 +5822,35 @@
           </a:p>
         </p:txBody>
       </p:sp>
+      <p:sp>
+        <p:nvSpPr>
+          <p:cNvPr id="6" name="Foliennummernplatzhalter 5"/>
+          <p:cNvSpPr>
+            <a:spLocks noGrp="1"/>
+          </p:cNvSpPr>
+          <p:nvPr>
+            <p:ph type="sldNum" sz="quarter" idx="12"/>
+          </p:nvPr>
+        </p:nvSpPr>
+        <p:spPr>
+          <a:xfrm>
+            <a:off x="8227377" y="5885497"/>
+            <a:ext cx="1315721" cy="365125"/>
+          </a:xfrm>
+        </p:spPr>
+        <p:txBody>
+          <a:bodyPr/>
+          <a:lstStyle/>
+          <a:p>
+            <a:fld id="{F38DF745-7D3F-47F4-83A3-874385CFAA69}" type="slidenum">
+              <a:rPr lang="en-US" smtClean="0"/>
+              <a:pPr/>
+              <a:t>7</a:t>
+            </a:fld>
+            <a:endParaRPr lang="en-US" dirty="0"/>
+          </a:p>
+        </p:txBody>
+      </p:sp>
     </p:spTree>
     <p:extLst>
       <p:ext uri="{BB962C8B-B14F-4D97-AF65-F5344CB8AC3E}">
@@ -4887,7 +5864,7 @@
 </p:sld>
 </file>
 
-<file path=ppt/slides/slide7.xml><?xml version="1.0" encoding="utf-8"?>
+<file path=ppt/slides/slide8.xml><?xml version="1.0" encoding="utf-8"?>
 <p:sld xmlns:a="http://schemas.openxmlformats.org/drawingml/2006/main" xmlns:r="http://schemas.openxmlformats.org/officeDocument/2006/relationships" xmlns:p="http://schemas.openxmlformats.org/presentationml/2006/main">
   <p:cSld>
     <p:spTree>
@@ -5119,11 +6096,7 @@
             </a:r>
             <a:r>
               <a:rPr lang="de-DE" sz="900" dirty="0" smtClean="0"/>
-              <a:t>, „Datenblatt DW-AD-504</a:t>
-            </a:r>
-            <a:r>
-              <a:rPr lang="de-DE" sz="900" dirty="0" smtClean="0"/>
-              <a:t>“, http</a:t>
+              <a:t>, „Datenblatt DW-AD-504“, http</a:t>
             </a:r>
             <a:r>
               <a:rPr lang="de-DE" sz="900" dirty="0"/>
@@ -5153,7 +6126,35 @@
               <a:rPr lang="de-DE" sz="900" dirty="0"/>
               <a:t>=ps_DW-AD-504-M12-120</a:t>
             </a:r>
-            <a:endParaRPr lang="de-DE" sz="900" dirty="0"/>
+          </a:p>
+        </p:txBody>
+      </p:sp>
+      <p:sp>
+        <p:nvSpPr>
+          <p:cNvPr id="3" name="Foliennummernplatzhalter 2"/>
+          <p:cNvSpPr>
+            <a:spLocks noGrp="1"/>
+          </p:cNvSpPr>
+          <p:nvPr>
+            <p:ph type="sldNum" sz="quarter" idx="12"/>
+          </p:nvPr>
+        </p:nvSpPr>
+        <p:spPr>
+          <a:xfrm>
+            <a:off x="8227377" y="5885497"/>
+            <a:ext cx="1315721" cy="365125"/>
+          </a:xfrm>
+        </p:spPr>
+        <p:txBody>
+          <a:bodyPr/>
+          <a:lstStyle/>
+          <a:p>
+            <a:fld id="{F38DF745-7D3F-47F4-83A3-874385CFAA69}" type="slidenum">
+              <a:rPr lang="en-US" smtClean="0"/>
+              <a:pPr/>
+              <a:t>8</a:t>
+            </a:fld>
+            <a:endParaRPr lang="en-US" dirty="0"/>
           </a:p>
         </p:txBody>
       </p:sp>
@@ -5170,7 +6171,7 @@
 </p:sld>
 </file>
 
-<file path=ppt/slides/slide8.xml><?xml version="1.0" encoding="utf-8"?>
+<file path=ppt/slides/slide9.xml><?xml version="1.0" encoding="utf-8"?>
 <p:sld xmlns:a="http://schemas.openxmlformats.org/drawingml/2006/main" xmlns:r="http://schemas.openxmlformats.org/officeDocument/2006/relationships" xmlns:p="http://schemas.openxmlformats.org/presentationml/2006/main">
   <p:cSld>
     <p:spTree>
@@ -5255,11 +6256,7 @@
             </a:pPr>
             <a:r>
               <a:rPr lang="de-DE" dirty="0" smtClean="0"/>
-              <a:t>kompakte </a:t>
-            </a:r>
-            <a:r>
-              <a:rPr lang="de-DE" dirty="0" smtClean="0"/>
-              <a:t>Bauart</a:t>
+              <a:t>kompakte Bauart</a:t>
             </a:r>
           </a:p>
           <a:p>
@@ -5326,7 +6323,6 @@
               <a:rPr lang="de-DE" dirty="0" smtClean="0"/>
               <a:t>schmutz</a:t>
             </a:r>
-            <a:endParaRPr lang="de-DE" dirty="0" smtClean="0"/>
           </a:p>
           <a:p>
             <a:pPr marL="342900" indent="-342900">
@@ -5697,164 +6693,39 @@
           </a:p>
         </p:txBody>
       </p:sp>
+      <p:sp>
+        <p:nvSpPr>
+          <p:cNvPr id="4" name="Foliennummernplatzhalter 3"/>
+          <p:cNvSpPr>
+            <a:spLocks noGrp="1"/>
+          </p:cNvSpPr>
+          <p:nvPr>
+            <p:ph type="sldNum" sz="quarter" idx="12"/>
+          </p:nvPr>
+        </p:nvSpPr>
+        <p:spPr>
+          <a:xfrm>
+            <a:off x="8227377" y="5885497"/>
+            <a:ext cx="1315721" cy="365125"/>
+          </a:xfrm>
+        </p:spPr>
+        <p:txBody>
+          <a:bodyPr/>
+          <a:lstStyle/>
+          <a:p>
+            <a:fld id="{F38DF745-7D3F-47F4-83A3-874385CFAA69}" type="slidenum">
+              <a:rPr lang="en-US" smtClean="0"/>
+              <a:pPr/>
+              <a:t>9</a:t>
+            </a:fld>
+            <a:endParaRPr lang="en-US" dirty="0"/>
+          </a:p>
+        </p:txBody>
+      </p:sp>
     </p:spTree>
     <p:extLst>
       <p:ext uri="{BB962C8B-B14F-4D97-AF65-F5344CB8AC3E}">
         <p14:creationId xmlns:p14="http://schemas.microsoft.com/office/powerpoint/2010/main" val="2931010684"/>
-      </p:ext>
-    </p:extLst>
-  </p:cSld>
-  <p:clrMapOvr>
-    <a:masterClrMapping/>
-  </p:clrMapOvr>
-</p:sld>
-</file>
-
-<file path=ppt/slides/slide9.xml><?xml version="1.0" encoding="utf-8"?>
-<p:sld xmlns:a="http://schemas.openxmlformats.org/drawingml/2006/main" xmlns:r="http://schemas.openxmlformats.org/officeDocument/2006/relationships" xmlns:p="http://schemas.openxmlformats.org/presentationml/2006/main">
-  <p:cSld>
-    <p:spTree>
-      <p:nvGrpSpPr>
-        <p:cNvPr id="1" name=""/>
-        <p:cNvGrpSpPr/>
-        <p:nvPr/>
-      </p:nvGrpSpPr>
-      <p:grpSpPr>
-        <a:xfrm>
-          <a:off x="0" y="0"/>
-          <a:ext cx="0" cy="0"/>
-          <a:chOff x="0" y="0"/>
-          <a:chExt cx="0" cy="0"/>
-        </a:xfrm>
-      </p:grpSpPr>
-      <p:sp>
-        <p:nvSpPr>
-          <p:cNvPr id="2" name="Titel 1"/>
-          <p:cNvSpPr>
-            <a:spLocks noGrp="1"/>
-          </p:cNvSpPr>
-          <p:nvPr>
-            <p:ph type="title"/>
-          </p:nvPr>
-        </p:nvSpPr>
-        <p:spPr/>
-        <p:txBody>
-          <a:bodyPr/>
-          <a:lstStyle/>
-          <a:p>
-            <a:r>
-              <a:rPr lang="de-DE" dirty="0" smtClean="0"/>
-              <a:t>Anwendungen</a:t>
-            </a:r>
-            <a:endParaRPr lang="de-DE" dirty="0"/>
-          </a:p>
-        </p:txBody>
-      </p:sp>
-      <p:sp>
-        <p:nvSpPr>
-          <p:cNvPr id="3" name="Inhaltsplatzhalter 2"/>
-          <p:cNvSpPr>
-            <a:spLocks noGrp="1"/>
-          </p:cNvSpPr>
-          <p:nvPr>
-            <p:ph idx="1"/>
-          </p:nvPr>
-        </p:nvSpPr>
-        <p:spPr/>
-        <p:txBody>
-          <a:bodyPr/>
-          <a:lstStyle/>
-          <a:p>
-            <a:pPr marL="342900" indent="-342900">
-              <a:buFontTx/>
-              <a:buChar char="-"/>
-            </a:pPr>
-            <a:r>
-              <a:rPr lang="de-DE" dirty="0" smtClean="0"/>
-              <a:t>Ersatz von mechanischen Schaltern</a:t>
-            </a:r>
-          </a:p>
-          <a:p>
-            <a:pPr marL="342900" indent="-342900">
-              <a:buFontTx/>
-              <a:buChar char="-"/>
-            </a:pPr>
-            <a:r>
-              <a:rPr lang="de-DE" dirty="0" smtClean="0"/>
-              <a:t>Abstandsmessung</a:t>
-            </a:r>
-          </a:p>
-          <a:p>
-            <a:pPr marL="342900" indent="-342900">
-              <a:buFontTx/>
-              <a:buChar char="-"/>
-            </a:pPr>
-            <a:r>
-              <a:rPr lang="de-DE" dirty="0" smtClean="0"/>
-              <a:t>Unwucht Erkennung in </a:t>
-            </a:r>
-            <a:r>
-              <a:rPr lang="de-DE" dirty="0" smtClean="0"/>
-              <a:t>Waschmaschinen</a:t>
-            </a:r>
-          </a:p>
-        </p:txBody>
-      </p:sp>
-      <p:sp>
-        <p:nvSpPr>
-          <p:cNvPr id="5" name="Rechteck 4"/>
-          <p:cNvSpPr/>
-          <p:nvPr/>
-        </p:nvSpPr>
-        <p:spPr>
-          <a:xfrm>
-            <a:off x="0" y="6504971"/>
-            <a:ext cx="9144000" cy="393539"/>
-          </a:xfrm>
-          <a:prstGeom prst="rect">
-            <a:avLst/>
-          </a:prstGeom>
-          <a:solidFill>
-            <a:schemeClr val="tx1"/>
-          </a:solidFill>
-          <a:ln>
-            <a:noFill/>
-          </a:ln>
-        </p:spPr>
-        <p:style>
-          <a:lnRef idx="2">
-            <a:schemeClr val="accent1">
-              <a:shade val="50000"/>
-            </a:schemeClr>
-          </a:lnRef>
-          <a:fillRef idx="1">
-            <a:schemeClr val="accent1"/>
-          </a:fillRef>
-          <a:effectRef idx="0">
-            <a:schemeClr val="accent1"/>
-          </a:effectRef>
-          <a:fontRef idx="minor">
-            <a:schemeClr val="lt1"/>
-          </a:fontRef>
-        </p:style>
-        <p:txBody>
-          <a:bodyPr rtlCol="0" anchor="ctr"/>
-          <a:lstStyle/>
-          <a:p>
-            <a:r>
-              <a:rPr lang="de-DE" sz="900" dirty="0" smtClean="0"/>
-              <a:t>Antonio Parrotta &amp; Ulf Schmelzer, Embedded Systems Software, Vortrag: Induktive Sensoren 26.10.2015</a:t>
-            </a:r>
-          </a:p>
-          <a:p>
-            <a:endParaRPr lang="de-DE" sz="900" dirty="0"/>
-          </a:p>
-        </p:txBody>
-      </p:sp>
-    </p:spTree>
-    <p:extLst>
-      <p:ext uri="{BB962C8B-B14F-4D97-AF65-F5344CB8AC3E}">
-        <p14:creationId xmlns:p14="http://schemas.microsoft.com/office/powerpoint/2010/main" val="3305900296"/>
       </p:ext>
     </p:extLst>
   </p:cSld>
@@ -6115,4 +6986,289 @@
   <a:objectDefaults/>
   <a:extraClrSchemeLst/>
 </a:theme>
+</file>
+
+<file path=ppt/theme/theme2.xml><?xml version="1.0" encoding="utf-8"?>
+<a:theme xmlns:a="http://schemas.openxmlformats.org/drawingml/2006/main" name="Larissa">
+  <a:themeElements>
+    <a:clrScheme name="Larissa">
+      <a:dk1>
+        <a:sysClr val="windowText" lastClr="000000"/>
+      </a:dk1>
+      <a:lt1>
+        <a:sysClr val="window" lastClr="FFFFFF"/>
+      </a:lt1>
+      <a:dk2>
+        <a:srgbClr val="1F497D"/>
+      </a:dk2>
+      <a:lt2>
+        <a:srgbClr val="EEECE1"/>
+      </a:lt2>
+      <a:accent1>
+        <a:srgbClr val="4F81BD"/>
+      </a:accent1>
+      <a:accent2>
+        <a:srgbClr val="C0504D"/>
+      </a:accent2>
+      <a:accent3>
+        <a:srgbClr val="9BBB59"/>
+      </a:accent3>
+      <a:accent4>
+        <a:srgbClr val="8064A2"/>
+      </a:accent4>
+      <a:accent5>
+        <a:srgbClr val="4BACC6"/>
+      </a:accent5>
+      <a:accent6>
+        <a:srgbClr val="F79646"/>
+      </a:accent6>
+      <a:hlink>
+        <a:srgbClr val="0000FF"/>
+      </a:hlink>
+      <a:folHlink>
+        <a:srgbClr val="800080"/>
+      </a:folHlink>
+    </a:clrScheme>
+    <a:fontScheme name="Larissa">
+      <a:majorFont>
+        <a:latin typeface="Calibri"/>
+        <a:ea typeface=""/>
+        <a:cs typeface=""/>
+        <a:font script="Jpan" typeface="ＭＳ Ｐゴシック"/>
+        <a:font script="Hang" typeface="맑은 고딕"/>
+        <a:font script="Hans" typeface="宋体"/>
+        <a:font script="Hant" typeface="新細明體"/>
+        <a:font script="Arab" typeface="Times New Roman"/>
+        <a:font script="Hebr" typeface="Times New Roman"/>
+        <a:font script="Thai" typeface="Angsana New"/>
+        <a:font script="Ethi" typeface="Nyala"/>
+        <a:font script="Beng" typeface="Vrinda"/>
+        <a:font script="Gujr" typeface="Shruti"/>
+        <a:font script="Khmr" typeface="MoolBoran"/>
+        <a:font script="Knda" typeface="Tunga"/>
+        <a:font script="Guru" typeface="Raavi"/>
+        <a:font script="Cans" typeface="Euphemia"/>
+        <a:font script="Cher" typeface="Plantagenet Cherokee"/>
+        <a:font script="Yiii" typeface="Microsoft Yi Baiti"/>
+        <a:font script="Tibt" typeface="Microsoft Himalaya"/>
+        <a:font script="Thaa" typeface="MV Boli"/>
+        <a:font script="Deva" typeface="Mangal"/>
+        <a:font script="Telu" typeface="Gautami"/>
+        <a:font script="Taml" typeface="Latha"/>
+        <a:font script="Syrc" typeface="Estrangelo Edessa"/>
+        <a:font script="Orya" typeface="Kalinga"/>
+        <a:font script="Mlym" typeface="Kartika"/>
+        <a:font script="Laoo" typeface="DokChampa"/>
+        <a:font script="Sinh" typeface="Iskoola Pota"/>
+        <a:font script="Mong" typeface="Mongolian Baiti"/>
+        <a:font script="Viet" typeface="Times New Roman"/>
+        <a:font script="Uigh" typeface="Microsoft Uighur"/>
+        <a:font script="Geor" typeface="Sylfaen"/>
+      </a:majorFont>
+      <a:minorFont>
+        <a:latin typeface="Calibri"/>
+        <a:ea typeface=""/>
+        <a:cs typeface=""/>
+        <a:font script="Jpan" typeface="ＭＳ Ｐゴシック"/>
+        <a:font script="Hang" typeface="맑은 고딕"/>
+        <a:font script="Hans" typeface="宋体"/>
+        <a:font script="Hant" typeface="新細明體"/>
+        <a:font script="Arab" typeface="Arial"/>
+        <a:font script="Hebr" typeface="Arial"/>
+        <a:font script="Thai" typeface="Cordia New"/>
+        <a:font script="Ethi" typeface="Nyala"/>
+        <a:font script="Beng" typeface="Vrinda"/>
+        <a:font script="Gujr" typeface="Shruti"/>
+        <a:font script="Khmr" typeface="DaunPenh"/>
+        <a:font script="Knda" typeface="Tunga"/>
+        <a:font script="Guru" typeface="Raavi"/>
+        <a:font script="Cans" typeface="Euphemia"/>
+        <a:font script="Cher" typeface="Plantagenet Cherokee"/>
+        <a:font script="Yiii" typeface="Microsoft Yi Baiti"/>
+        <a:font script="Tibt" typeface="Microsoft Himalaya"/>
+        <a:font script="Thaa" typeface="MV Boli"/>
+        <a:font script="Deva" typeface="Mangal"/>
+        <a:font script="Telu" typeface="Gautami"/>
+        <a:font script="Taml" typeface="Latha"/>
+        <a:font script="Syrc" typeface="Estrangelo Edessa"/>
+        <a:font script="Orya" typeface="Kalinga"/>
+        <a:font script="Mlym" typeface="Kartika"/>
+        <a:font script="Laoo" typeface="DokChampa"/>
+        <a:font script="Sinh" typeface="Iskoola Pota"/>
+        <a:font script="Mong" typeface="Mongolian Baiti"/>
+        <a:font script="Viet" typeface="Arial"/>
+        <a:font script="Uigh" typeface="Microsoft Uighur"/>
+        <a:font script="Geor" typeface="Sylfaen"/>
+      </a:minorFont>
+    </a:fontScheme>
+    <a:fmtScheme name="Larissa">
+      <a:fillStyleLst>
+        <a:solidFill>
+          <a:schemeClr val="phClr"/>
+        </a:solidFill>
+        <a:gradFill rotWithShape="1">
+          <a:gsLst>
+            <a:gs pos="0">
+              <a:schemeClr val="phClr">
+                <a:tint val="50000"/>
+                <a:satMod val="300000"/>
+              </a:schemeClr>
+            </a:gs>
+            <a:gs pos="35000">
+              <a:schemeClr val="phClr">
+                <a:tint val="37000"/>
+                <a:satMod val="300000"/>
+              </a:schemeClr>
+            </a:gs>
+            <a:gs pos="100000">
+              <a:schemeClr val="phClr">
+                <a:tint val="15000"/>
+                <a:satMod val="350000"/>
+              </a:schemeClr>
+            </a:gs>
+          </a:gsLst>
+          <a:lin ang="16200000" scaled="1"/>
+        </a:gradFill>
+        <a:gradFill rotWithShape="1">
+          <a:gsLst>
+            <a:gs pos="0">
+              <a:schemeClr val="phClr">
+                <a:shade val="51000"/>
+                <a:satMod val="130000"/>
+              </a:schemeClr>
+            </a:gs>
+            <a:gs pos="80000">
+              <a:schemeClr val="phClr">
+                <a:shade val="93000"/>
+                <a:satMod val="130000"/>
+              </a:schemeClr>
+            </a:gs>
+            <a:gs pos="100000">
+              <a:schemeClr val="phClr">
+                <a:shade val="94000"/>
+                <a:satMod val="135000"/>
+              </a:schemeClr>
+            </a:gs>
+          </a:gsLst>
+          <a:lin ang="16200000" scaled="0"/>
+        </a:gradFill>
+      </a:fillStyleLst>
+      <a:lnStyleLst>
+        <a:ln w="9525" cap="flat" cmpd="sng" algn="ctr">
+          <a:solidFill>
+            <a:schemeClr val="phClr">
+              <a:shade val="95000"/>
+              <a:satMod val="105000"/>
+            </a:schemeClr>
+          </a:solidFill>
+          <a:prstDash val="solid"/>
+        </a:ln>
+        <a:ln w="25400" cap="flat" cmpd="sng" algn="ctr">
+          <a:solidFill>
+            <a:schemeClr val="phClr"/>
+          </a:solidFill>
+          <a:prstDash val="solid"/>
+        </a:ln>
+        <a:ln w="38100" cap="flat" cmpd="sng" algn="ctr">
+          <a:solidFill>
+            <a:schemeClr val="phClr"/>
+          </a:solidFill>
+          <a:prstDash val="solid"/>
+        </a:ln>
+      </a:lnStyleLst>
+      <a:effectStyleLst>
+        <a:effectStyle>
+          <a:effectLst>
+            <a:outerShdw blurRad="40000" dist="20000" dir="5400000" rotWithShape="0">
+              <a:srgbClr val="000000">
+                <a:alpha val="38000"/>
+              </a:srgbClr>
+            </a:outerShdw>
+          </a:effectLst>
+        </a:effectStyle>
+        <a:effectStyle>
+          <a:effectLst>
+            <a:outerShdw blurRad="40000" dist="23000" dir="5400000" rotWithShape="0">
+              <a:srgbClr val="000000">
+                <a:alpha val="35000"/>
+              </a:srgbClr>
+            </a:outerShdw>
+          </a:effectLst>
+        </a:effectStyle>
+        <a:effectStyle>
+          <a:effectLst>
+            <a:outerShdw blurRad="40000" dist="23000" dir="5400000" rotWithShape="0">
+              <a:srgbClr val="000000">
+                <a:alpha val="35000"/>
+              </a:srgbClr>
+            </a:outerShdw>
+          </a:effectLst>
+          <a:scene3d>
+            <a:camera prst="orthographicFront">
+              <a:rot lat="0" lon="0" rev="0"/>
+            </a:camera>
+            <a:lightRig rig="threePt" dir="t">
+              <a:rot lat="0" lon="0" rev="1200000"/>
+            </a:lightRig>
+          </a:scene3d>
+          <a:sp3d>
+            <a:bevelT w="63500" h="25400"/>
+          </a:sp3d>
+        </a:effectStyle>
+      </a:effectStyleLst>
+      <a:bgFillStyleLst>
+        <a:solidFill>
+          <a:schemeClr val="phClr"/>
+        </a:solidFill>
+        <a:gradFill rotWithShape="1">
+          <a:gsLst>
+            <a:gs pos="0">
+              <a:schemeClr val="phClr">
+                <a:tint val="40000"/>
+                <a:satMod val="350000"/>
+              </a:schemeClr>
+            </a:gs>
+            <a:gs pos="40000">
+              <a:schemeClr val="phClr">
+                <a:tint val="45000"/>
+                <a:shade val="99000"/>
+                <a:satMod val="350000"/>
+              </a:schemeClr>
+            </a:gs>
+            <a:gs pos="100000">
+              <a:schemeClr val="phClr">
+                <a:shade val="20000"/>
+                <a:satMod val="255000"/>
+              </a:schemeClr>
+            </a:gs>
+          </a:gsLst>
+          <a:path path="circle">
+            <a:fillToRect l="50000" t="-80000" r="50000" b="180000"/>
+          </a:path>
+        </a:gradFill>
+        <a:gradFill rotWithShape="1">
+          <a:gsLst>
+            <a:gs pos="0">
+              <a:schemeClr val="phClr">
+                <a:tint val="80000"/>
+                <a:satMod val="300000"/>
+              </a:schemeClr>
+            </a:gs>
+            <a:gs pos="100000">
+              <a:schemeClr val="phClr">
+                <a:shade val="30000"/>
+                <a:satMod val="200000"/>
+              </a:schemeClr>
+            </a:gs>
+          </a:gsLst>
+          <a:path path="circle">
+            <a:fillToRect l="50000" t="50000" r="50000" b="50000"/>
+          </a:path>
+        </a:gradFill>
+      </a:bgFillStyleLst>
+    </a:fmtScheme>
+  </a:themeElements>
+  <a:objectDefaults/>
+  <a:extraClrSchemeLst/>
+</a:theme>
 </file>
</xml_diff>